<commit_message>
DMaaP adapter, support for shared Kafka topics
If several PM subscribers specify the same Kafka ouput topic, the
ouput objects will contain the sum of all filtered output data.

Added info type if to the kafka header

Signed-off-by: PatrikBuhr <patrik.buhr@est.tech>
Issue-ID: NONRTRIC-820
Change-Id: I33e6950f91fa0088658f463506a7c70670cc6e42
</commit_message>
<xml_diff>
--- a/docs/Pictures.pptx
+++ b/docs/Pictures.pptx
@@ -3,11 +3,13 @@
 <p:presentation xmlns:a="http://schemas.openxmlformats.org/drawingml/2006/main" xmlns:p="http://schemas.openxmlformats.org/presentationml/2006/main" xmlns:r="http://schemas.openxmlformats.org/officeDocument/2006/relationships" xmlns:p14="http://schemas.microsoft.com/office/powerpoint/2010/main" xmlns:p15="http://schemas.microsoft.com/office/powerpoint/2012/main" xmlns:mc="http://schemas.openxmlformats.org/markup-compatibility/2006">
   <p:sldMasterIdLst>
     <p:sldMasterId id="2147483648" r:id="rId2"/>
+    <p:sldMasterId id="2147483661" r:id="rId3"/>
   </p:sldMasterIdLst>
   <p:sldIdLst>
-    <p:sldId id="256" r:id="rId3"/>
-    <p:sldId id="257" r:id="rId4"/>
-    <p:sldId id="258" r:id="rId5"/>
+    <p:sldId id="256" r:id="rId4"/>
+    <p:sldId id="257" r:id="rId5"/>
+    <p:sldId id="258" r:id="rId6"/>
+    <p:sldId id="259" r:id="rId7"/>
   </p:sldIdLst>
   <p:sldSz cx="12192000" cy="6858000"/>
   <p:notesSz cx="7559675" cy="10691812"/>
@@ -555,6 +557,557 @@
 </p:sldLayout>
 </file>
 
+<file path=ppt/slideLayouts/slideLayout13.xml><?xml version="1.0" encoding="utf-8"?>
+<p:sldLayout xmlns:a="http://schemas.openxmlformats.org/drawingml/2006/main" xmlns:p="http://schemas.openxmlformats.org/presentationml/2006/main" xmlns:r="http://schemas.openxmlformats.org/officeDocument/2006/relationships" xmlns:p14="http://schemas.microsoft.com/office/powerpoint/2010/main" xmlns:p15="http://schemas.microsoft.com/office/powerpoint/2012/main" xmlns:mc="http://schemas.openxmlformats.org/markup-compatibility/2006" type="blank" preserve="1">
+  <p:cSld name="Blank Slide">
+    <p:spTree>
+      <p:nvGrpSpPr>
+        <p:cNvPr id="1" name=""/>
+        <p:cNvGrpSpPr/>
+        <p:nvPr/>
+      </p:nvGrpSpPr>
+      <p:grpSpPr>
+        <a:xfrm>
+          <a:off x="0" y="0"/>
+          <a:ext cx="0" cy="0"/>
+          <a:chOff x="0" y="0"/>
+          <a:chExt cx="0" cy="0"/>
+        </a:xfrm>
+      </p:grpSpPr>
+    </p:spTree>
+  </p:cSld>
+</p:sldLayout>
+</file>
+
+<file path=ppt/slideLayouts/slideLayout14.xml><?xml version="1.0" encoding="utf-8"?>
+<p:sldLayout xmlns:a="http://schemas.openxmlformats.org/drawingml/2006/main" xmlns:p="http://schemas.openxmlformats.org/presentationml/2006/main" xmlns:r="http://schemas.openxmlformats.org/officeDocument/2006/relationships" xmlns:p14="http://schemas.microsoft.com/office/powerpoint/2010/main" xmlns:p15="http://schemas.microsoft.com/office/powerpoint/2012/main" xmlns:mc="http://schemas.openxmlformats.org/markup-compatibility/2006" type="tx" preserve="1">
+  <p:cSld name="Title Slide">
+    <p:spTree>
+      <p:nvGrpSpPr>
+        <p:cNvPr id="1" name=""/>
+        <p:cNvGrpSpPr/>
+        <p:nvPr/>
+      </p:nvGrpSpPr>
+      <p:grpSpPr>
+        <a:xfrm>
+          <a:off x="0" y="0"/>
+          <a:ext cx="0" cy="0"/>
+          <a:chOff x="0" y="0"/>
+          <a:chExt cx="0" cy="0"/>
+        </a:xfrm>
+      </p:grpSpPr>
+      <p:sp>
+        <p:nvSpPr>
+          <p:cNvPr id="40" name="PlaceHolder 1"/>
+          <p:cNvSpPr>
+            <a:spLocks noGrp="1"/>
+          </p:cNvSpPr>
+          <p:nvPr>
+            <p:ph type="title"/>
+          </p:nvPr>
+        </p:nvSpPr>
+        <p:spPr>
+          <a:xfrm>
+            <a:off x="609480" y="273600"/>
+            <a:ext cx="10972440" cy="1144800"/>
+          </a:xfrm>
+          <a:prstGeom prst="rect">
+            <a:avLst/>
+          </a:prstGeom>
+        </p:spPr>
+        <p:txBody>
+          <a:bodyPr lIns="0" rIns="0" tIns="0" bIns="0" anchor="ctr">
+            <a:noAutofit/>
+          </a:bodyPr>
+          <a:p>
+            <a:pPr algn="ctr"/>
+            <a:endParaRPr b="0" lang="sv-SE" sz="4400" spc="-1" strike="noStrike">
+              <a:latin typeface="Arial"/>
+            </a:endParaRPr>
+          </a:p>
+        </p:txBody>
+      </p:sp>
+      <p:sp>
+        <p:nvSpPr>
+          <p:cNvPr id="41" name="PlaceHolder 2"/>
+          <p:cNvSpPr>
+            <a:spLocks noGrp="1"/>
+          </p:cNvSpPr>
+          <p:nvPr>
+            <p:ph type="subTitle"/>
+          </p:nvPr>
+        </p:nvSpPr>
+        <p:spPr>
+          <a:xfrm>
+            <a:off x="609480" y="1604520"/>
+            <a:ext cx="10972440" cy="3977280"/>
+          </a:xfrm>
+          <a:prstGeom prst="rect">
+            <a:avLst/>
+          </a:prstGeom>
+        </p:spPr>
+        <p:txBody>
+          <a:bodyPr lIns="0" rIns="0" tIns="0" bIns="0" anchor="ctr">
+            <a:noAutofit/>
+          </a:bodyPr>
+          <a:p>
+            <a:pPr algn="ctr"/>
+            <a:endParaRPr b="0" lang="sv-SE" sz="3200" spc="-1" strike="noStrike">
+              <a:latin typeface="Arial"/>
+            </a:endParaRPr>
+          </a:p>
+        </p:txBody>
+      </p:sp>
+    </p:spTree>
+  </p:cSld>
+</p:sldLayout>
+</file>
+
+<file path=ppt/slideLayouts/slideLayout15.xml><?xml version="1.0" encoding="utf-8"?>
+<p:sldLayout xmlns:a="http://schemas.openxmlformats.org/drawingml/2006/main" xmlns:p="http://schemas.openxmlformats.org/presentationml/2006/main" xmlns:r="http://schemas.openxmlformats.org/officeDocument/2006/relationships" xmlns:p14="http://schemas.microsoft.com/office/powerpoint/2010/main" xmlns:p15="http://schemas.microsoft.com/office/powerpoint/2012/main" xmlns:mc="http://schemas.openxmlformats.org/markup-compatibility/2006" type="obj" preserve="1">
+  <p:cSld name="Title, Content">
+    <p:spTree>
+      <p:nvGrpSpPr>
+        <p:cNvPr id="1" name=""/>
+        <p:cNvGrpSpPr/>
+        <p:nvPr/>
+      </p:nvGrpSpPr>
+      <p:grpSpPr>
+        <a:xfrm>
+          <a:off x="0" y="0"/>
+          <a:ext cx="0" cy="0"/>
+          <a:chOff x="0" y="0"/>
+          <a:chExt cx="0" cy="0"/>
+        </a:xfrm>
+      </p:grpSpPr>
+      <p:sp>
+        <p:nvSpPr>
+          <p:cNvPr id="42" name="PlaceHolder 1"/>
+          <p:cNvSpPr>
+            <a:spLocks noGrp="1"/>
+          </p:cNvSpPr>
+          <p:nvPr>
+            <p:ph type="title"/>
+          </p:nvPr>
+        </p:nvSpPr>
+        <p:spPr>
+          <a:xfrm>
+            <a:off x="609480" y="273600"/>
+            <a:ext cx="10972440" cy="1144800"/>
+          </a:xfrm>
+          <a:prstGeom prst="rect">
+            <a:avLst/>
+          </a:prstGeom>
+        </p:spPr>
+        <p:txBody>
+          <a:bodyPr lIns="0" rIns="0" tIns="0" bIns="0" anchor="ctr">
+            <a:noAutofit/>
+          </a:bodyPr>
+          <a:p>
+            <a:pPr algn="ctr"/>
+            <a:endParaRPr b="0" lang="sv-SE" sz="4400" spc="-1" strike="noStrike">
+              <a:latin typeface="Arial"/>
+            </a:endParaRPr>
+          </a:p>
+        </p:txBody>
+      </p:sp>
+      <p:sp>
+        <p:nvSpPr>
+          <p:cNvPr id="43" name="PlaceHolder 2"/>
+          <p:cNvSpPr>
+            <a:spLocks noGrp="1"/>
+          </p:cNvSpPr>
+          <p:nvPr>
+            <p:ph type="body"/>
+          </p:nvPr>
+        </p:nvSpPr>
+        <p:spPr>
+          <a:xfrm>
+            <a:off x="609480" y="1604520"/>
+            <a:ext cx="10972440" cy="3977280"/>
+          </a:xfrm>
+          <a:prstGeom prst="rect">
+            <a:avLst/>
+          </a:prstGeom>
+        </p:spPr>
+        <p:txBody>
+          <a:bodyPr lIns="0" rIns="0" tIns="0" bIns="0">
+            <a:normAutofit/>
+          </a:bodyPr>
+          <a:p>
+            <a:endParaRPr b="0" lang="sv-SE" sz="3200" spc="-1" strike="noStrike">
+              <a:latin typeface="Arial"/>
+            </a:endParaRPr>
+          </a:p>
+        </p:txBody>
+      </p:sp>
+    </p:spTree>
+  </p:cSld>
+</p:sldLayout>
+</file>
+
+<file path=ppt/slideLayouts/slideLayout16.xml><?xml version="1.0" encoding="utf-8"?>
+<p:sldLayout xmlns:a="http://schemas.openxmlformats.org/drawingml/2006/main" xmlns:p="http://schemas.openxmlformats.org/presentationml/2006/main" xmlns:r="http://schemas.openxmlformats.org/officeDocument/2006/relationships" xmlns:p14="http://schemas.microsoft.com/office/powerpoint/2010/main" xmlns:p15="http://schemas.microsoft.com/office/powerpoint/2012/main" xmlns:mc="http://schemas.openxmlformats.org/markup-compatibility/2006" type="twoObj" preserve="1">
+  <p:cSld name="Title, 2 Content">
+    <p:spTree>
+      <p:nvGrpSpPr>
+        <p:cNvPr id="1" name=""/>
+        <p:cNvGrpSpPr/>
+        <p:nvPr/>
+      </p:nvGrpSpPr>
+      <p:grpSpPr>
+        <a:xfrm>
+          <a:off x="0" y="0"/>
+          <a:ext cx="0" cy="0"/>
+          <a:chOff x="0" y="0"/>
+          <a:chExt cx="0" cy="0"/>
+        </a:xfrm>
+      </p:grpSpPr>
+      <p:sp>
+        <p:nvSpPr>
+          <p:cNvPr id="44" name="PlaceHolder 1"/>
+          <p:cNvSpPr>
+            <a:spLocks noGrp="1"/>
+          </p:cNvSpPr>
+          <p:nvPr>
+            <p:ph type="title"/>
+          </p:nvPr>
+        </p:nvSpPr>
+        <p:spPr>
+          <a:xfrm>
+            <a:off x="609480" y="273600"/>
+            <a:ext cx="10972440" cy="1144800"/>
+          </a:xfrm>
+          <a:prstGeom prst="rect">
+            <a:avLst/>
+          </a:prstGeom>
+        </p:spPr>
+        <p:txBody>
+          <a:bodyPr lIns="0" rIns="0" tIns="0" bIns="0" anchor="ctr">
+            <a:noAutofit/>
+          </a:bodyPr>
+          <a:p>
+            <a:pPr algn="ctr"/>
+            <a:endParaRPr b="0" lang="sv-SE" sz="4400" spc="-1" strike="noStrike">
+              <a:latin typeface="Arial"/>
+            </a:endParaRPr>
+          </a:p>
+        </p:txBody>
+      </p:sp>
+      <p:sp>
+        <p:nvSpPr>
+          <p:cNvPr id="45" name="PlaceHolder 2"/>
+          <p:cNvSpPr>
+            <a:spLocks noGrp="1"/>
+          </p:cNvSpPr>
+          <p:nvPr>
+            <p:ph type="body"/>
+          </p:nvPr>
+        </p:nvSpPr>
+        <p:spPr>
+          <a:xfrm>
+            <a:off x="609480" y="1604520"/>
+            <a:ext cx="5354280" cy="3977280"/>
+          </a:xfrm>
+          <a:prstGeom prst="rect">
+            <a:avLst/>
+          </a:prstGeom>
+        </p:spPr>
+        <p:txBody>
+          <a:bodyPr lIns="0" rIns="0" tIns="0" bIns="0">
+            <a:normAutofit/>
+          </a:bodyPr>
+          <a:p>
+            <a:endParaRPr b="0" lang="sv-SE" sz="3200" spc="-1" strike="noStrike">
+              <a:latin typeface="Arial"/>
+            </a:endParaRPr>
+          </a:p>
+        </p:txBody>
+      </p:sp>
+      <p:sp>
+        <p:nvSpPr>
+          <p:cNvPr id="46" name="PlaceHolder 3"/>
+          <p:cNvSpPr>
+            <a:spLocks noGrp="1"/>
+          </p:cNvSpPr>
+          <p:nvPr>
+            <p:ph type="body"/>
+          </p:nvPr>
+        </p:nvSpPr>
+        <p:spPr>
+          <a:xfrm>
+            <a:off x="6231960" y="1604520"/>
+            <a:ext cx="5354280" cy="3977280"/>
+          </a:xfrm>
+          <a:prstGeom prst="rect">
+            <a:avLst/>
+          </a:prstGeom>
+        </p:spPr>
+        <p:txBody>
+          <a:bodyPr lIns="0" rIns="0" tIns="0" bIns="0">
+            <a:normAutofit/>
+          </a:bodyPr>
+          <a:p>
+            <a:endParaRPr b="0" lang="sv-SE" sz="3200" spc="-1" strike="noStrike">
+              <a:latin typeface="Arial"/>
+            </a:endParaRPr>
+          </a:p>
+        </p:txBody>
+      </p:sp>
+    </p:spTree>
+  </p:cSld>
+</p:sldLayout>
+</file>
+
+<file path=ppt/slideLayouts/slideLayout17.xml><?xml version="1.0" encoding="utf-8"?>
+<p:sldLayout xmlns:a="http://schemas.openxmlformats.org/drawingml/2006/main" xmlns:p="http://schemas.openxmlformats.org/presentationml/2006/main" xmlns:r="http://schemas.openxmlformats.org/officeDocument/2006/relationships" xmlns:p14="http://schemas.microsoft.com/office/powerpoint/2010/main" xmlns:p15="http://schemas.microsoft.com/office/powerpoint/2012/main" xmlns:mc="http://schemas.openxmlformats.org/markup-compatibility/2006" type="titleOnly" preserve="1">
+  <p:cSld name="Title Only">
+    <p:spTree>
+      <p:nvGrpSpPr>
+        <p:cNvPr id="1" name=""/>
+        <p:cNvGrpSpPr/>
+        <p:nvPr/>
+      </p:nvGrpSpPr>
+      <p:grpSpPr>
+        <a:xfrm>
+          <a:off x="0" y="0"/>
+          <a:ext cx="0" cy="0"/>
+          <a:chOff x="0" y="0"/>
+          <a:chExt cx="0" cy="0"/>
+        </a:xfrm>
+      </p:grpSpPr>
+      <p:sp>
+        <p:nvSpPr>
+          <p:cNvPr id="47" name="PlaceHolder 1"/>
+          <p:cNvSpPr>
+            <a:spLocks noGrp="1"/>
+          </p:cNvSpPr>
+          <p:nvPr>
+            <p:ph type="title"/>
+          </p:nvPr>
+        </p:nvSpPr>
+        <p:spPr>
+          <a:xfrm>
+            <a:off x="609480" y="273600"/>
+            <a:ext cx="10972440" cy="1144800"/>
+          </a:xfrm>
+          <a:prstGeom prst="rect">
+            <a:avLst/>
+          </a:prstGeom>
+        </p:spPr>
+        <p:txBody>
+          <a:bodyPr lIns="0" rIns="0" tIns="0" bIns="0" anchor="ctr">
+            <a:noAutofit/>
+          </a:bodyPr>
+          <a:p>
+            <a:pPr algn="ctr"/>
+            <a:endParaRPr b="0" lang="sv-SE" sz="4400" spc="-1" strike="noStrike">
+              <a:latin typeface="Arial"/>
+            </a:endParaRPr>
+          </a:p>
+        </p:txBody>
+      </p:sp>
+    </p:spTree>
+  </p:cSld>
+</p:sldLayout>
+</file>
+
+<file path=ppt/slideLayouts/slideLayout18.xml><?xml version="1.0" encoding="utf-8"?>
+<p:sldLayout xmlns:a="http://schemas.openxmlformats.org/drawingml/2006/main" xmlns:p="http://schemas.openxmlformats.org/presentationml/2006/main" xmlns:r="http://schemas.openxmlformats.org/officeDocument/2006/relationships" xmlns:p14="http://schemas.microsoft.com/office/powerpoint/2010/main" xmlns:p15="http://schemas.microsoft.com/office/powerpoint/2012/main" xmlns:mc="http://schemas.openxmlformats.org/markup-compatibility/2006" type="objOnly" preserve="1">
+  <p:cSld name="Centered Text">
+    <p:spTree>
+      <p:nvGrpSpPr>
+        <p:cNvPr id="1" name=""/>
+        <p:cNvGrpSpPr/>
+        <p:nvPr/>
+      </p:nvGrpSpPr>
+      <p:grpSpPr>
+        <a:xfrm>
+          <a:off x="0" y="0"/>
+          <a:ext cx="0" cy="0"/>
+          <a:chOff x="0" y="0"/>
+          <a:chExt cx="0" cy="0"/>
+        </a:xfrm>
+      </p:grpSpPr>
+      <p:sp>
+        <p:nvSpPr>
+          <p:cNvPr id="48" name="PlaceHolder 1"/>
+          <p:cNvSpPr>
+            <a:spLocks noGrp="1"/>
+          </p:cNvSpPr>
+          <p:nvPr>
+            <p:ph type="subTitle"/>
+          </p:nvPr>
+        </p:nvSpPr>
+        <p:spPr>
+          <a:xfrm>
+            <a:off x="609480" y="273600"/>
+            <a:ext cx="10972440" cy="5307840"/>
+          </a:xfrm>
+          <a:prstGeom prst="rect">
+            <a:avLst/>
+          </a:prstGeom>
+        </p:spPr>
+        <p:txBody>
+          <a:bodyPr lIns="0" rIns="0" tIns="0" bIns="0" anchor="ctr">
+            <a:noAutofit/>
+          </a:bodyPr>
+          <a:p>
+            <a:pPr algn="ctr"/>
+            <a:endParaRPr b="0" lang="sv-SE" sz="3200" spc="-1" strike="noStrike">
+              <a:latin typeface="Arial"/>
+            </a:endParaRPr>
+          </a:p>
+        </p:txBody>
+      </p:sp>
+    </p:spTree>
+  </p:cSld>
+</p:sldLayout>
+</file>
+
+<file path=ppt/slideLayouts/slideLayout19.xml><?xml version="1.0" encoding="utf-8"?>
+<p:sldLayout xmlns:a="http://schemas.openxmlformats.org/drawingml/2006/main" xmlns:p="http://schemas.openxmlformats.org/presentationml/2006/main" xmlns:r="http://schemas.openxmlformats.org/officeDocument/2006/relationships" xmlns:p14="http://schemas.microsoft.com/office/powerpoint/2010/main" xmlns:p15="http://schemas.microsoft.com/office/powerpoint/2012/main" xmlns:mc="http://schemas.openxmlformats.org/markup-compatibility/2006" type="twoObjAndObj" preserve="1">
+  <p:cSld name="Title, 2 Content and Content">
+    <p:spTree>
+      <p:nvGrpSpPr>
+        <p:cNvPr id="1" name=""/>
+        <p:cNvGrpSpPr/>
+        <p:nvPr/>
+      </p:nvGrpSpPr>
+      <p:grpSpPr>
+        <a:xfrm>
+          <a:off x="0" y="0"/>
+          <a:ext cx="0" cy="0"/>
+          <a:chOff x="0" y="0"/>
+          <a:chExt cx="0" cy="0"/>
+        </a:xfrm>
+      </p:grpSpPr>
+      <p:sp>
+        <p:nvSpPr>
+          <p:cNvPr id="49" name="PlaceHolder 1"/>
+          <p:cNvSpPr>
+            <a:spLocks noGrp="1"/>
+          </p:cNvSpPr>
+          <p:nvPr>
+            <p:ph type="title"/>
+          </p:nvPr>
+        </p:nvSpPr>
+        <p:spPr>
+          <a:xfrm>
+            <a:off x="609480" y="273600"/>
+            <a:ext cx="10972440" cy="1144800"/>
+          </a:xfrm>
+          <a:prstGeom prst="rect">
+            <a:avLst/>
+          </a:prstGeom>
+        </p:spPr>
+        <p:txBody>
+          <a:bodyPr lIns="0" rIns="0" tIns="0" bIns="0" anchor="ctr">
+            <a:noAutofit/>
+          </a:bodyPr>
+          <a:p>
+            <a:pPr algn="ctr"/>
+            <a:endParaRPr b="0" lang="sv-SE" sz="4400" spc="-1" strike="noStrike">
+              <a:latin typeface="Arial"/>
+            </a:endParaRPr>
+          </a:p>
+        </p:txBody>
+      </p:sp>
+      <p:sp>
+        <p:nvSpPr>
+          <p:cNvPr id="50" name="PlaceHolder 2"/>
+          <p:cNvSpPr>
+            <a:spLocks noGrp="1"/>
+          </p:cNvSpPr>
+          <p:nvPr>
+            <p:ph type="body"/>
+          </p:nvPr>
+        </p:nvSpPr>
+        <p:spPr>
+          <a:xfrm>
+            <a:off x="609480" y="1604520"/>
+            <a:ext cx="5354280" cy="1896840"/>
+          </a:xfrm>
+          <a:prstGeom prst="rect">
+            <a:avLst/>
+          </a:prstGeom>
+        </p:spPr>
+        <p:txBody>
+          <a:bodyPr lIns="0" rIns="0" tIns="0" bIns="0">
+            <a:normAutofit/>
+          </a:bodyPr>
+          <a:p>
+            <a:endParaRPr b="0" lang="sv-SE" sz="3200" spc="-1" strike="noStrike">
+              <a:latin typeface="Arial"/>
+            </a:endParaRPr>
+          </a:p>
+        </p:txBody>
+      </p:sp>
+      <p:sp>
+        <p:nvSpPr>
+          <p:cNvPr id="51" name="PlaceHolder 3"/>
+          <p:cNvSpPr>
+            <a:spLocks noGrp="1"/>
+          </p:cNvSpPr>
+          <p:nvPr>
+            <p:ph type="body"/>
+          </p:nvPr>
+        </p:nvSpPr>
+        <p:spPr>
+          <a:xfrm>
+            <a:off x="6231960" y="1604520"/>
+            <a:ext cx="5354280" cy="3977280"/>
+          </a:xfrm>
+          <a:prstGeom prst="rect">
+            <a:avLst/>
+          </a:prstGeom>
+        </p:spPr>
+        <p:txBody>
+          <a:bodyPr lIns="0" rIns="0" tIns="0" bIns="0">
+            <a:normAutofit/>
+          </a:bodyPr>
+          <a:p>
+            <a:endParaRPr b="0" lang="sv-SE" sz="3200" spc="-1" strike="noStrike">
+              <a:latin typeface="Arial"/>
+            </a:endParaRPr>
+          </a:p>
+        </p:txBody>
+      </p:sp>
+      <p:sp>
+        <p:nvSpPr>
+          <p:cNvPr id="52" name="PlaceHolder 4"/>
+          <p:cNvSpPr>
+            <a:spLocks noGrp="1"/>
+          </p:cNvSpPr>
+          <p:nvPr>
+            <p:ph type="body"/>
+          </p:nvPr>
+        </p:nvSpPr>
+        <p:spPr>
+          <a:xfrm>
+            <a:off x="609480" y="3682080"/>
+            <a:ext cx="5354280" cy="1896840"/>
+          </a:xfrm>
+          <a:prstGeom prst="rect">
+            <a:avLst/>
+          </a:prstGeom>
+        </p:spPr>
+        <p:txBody>
+          <a:bodyPr lIns="0" rIns="0" tIns="0" bIns="0">
+            <a:normAutofit/>
+          </a:bodyPr>
+          <a:p>
+            <a:endParaRPr b="0" lang="sv-SE" sz="3200" spc="-1" strike="noStrike">
+              <a:latin typeface="Arial"/>
+            </a:endParaRPr>
+          </a:p>
+        </p:txBody>
+      </p:sp>
+    </p:spTree>
+  </p:cSld>
+</p:sldLayout>
+</file>
+
 <file path=ppt/slideLayouts/slideLayout2.xml><?xml version="1.0" encoding="utf-8"?>
 <p:sldLayout xmlns:a="http://schemas.openxmlformats.org/drawingml/2006/main" xmlns:p="http://schemas.openxmlformats.org/presentationml/2006/main" xmlns:r="http://schemas.openxmlformats.org/officeDocument/2006/relationships" xmlns:p14="http://schemas.microsoft.com/office/powerpoint/2010/main" xmlns:p15="http://schemas.microsoft.com/office/powerpoint/2012/main" xmlns:mc="http://schemas.openxmlformats.org/markup-compatibility/2006" type="tx" preserve="1">
   <p:cSld name="Title Slide">
@@ -628,6 +1181,811 @@
           </a:bodyPr>
           <a:p>
             <a:pPr algn="ctr"/>
+            <a:endParaRPr b="0" lang="sv-SE" sz="3200" spc="-1" strike="noStrike">
+              <a:latin typeface="Arial"/>
+            </a:endParaRPr>
+          </a:p>
+        </p:txBody>
+      </p:sp>
+    </p:spTree>
+  </p:cSld>
+</p:sldLayout>
+</file>
+
+<file path=ppt/slideLayouts/slideLayout20.xml><?xml version="1.0" encoding="utf-8"?>
+<p:sldLayout xmlns:a="http://schemas.openxmlformats.org/drawingml/2006/main" xmlns:p="http://schemas.openxmlformats.org/presentationml/2006/main" xmlns:r="http://schemas.openxmlformats.org/officeDocument/2006/relationships" xmlns:p14="http://schemas.microsoft.com/office/powerpoint/2010/main" xmlns:p15="http://schemas.microsoft.com/office/powerpoint/2012/main" xmlns:mc="http://schemas.openxmlformats.org/markup-compatibility/2006" type="objAndTwoObj" preserve="1">
+  <p:cSld name="Title Content and 2 Content">
+    <p:spTree>
+      <p:nvGrpSpPr>
+        <p:cNvPr id="1" name=""/>
+        <p:cNvGrpSpPr/>
+        <p:nvPr/>
+      </p:nvGrpSpPr>
+      <p:grpSpPr>
+        <a:xfrm>
+          <a:off x="0" y="0"/>
+          <a:ext cx="0" cy="0"/>
+          <a:chOff x="0" y="0"/>
+          <a:chExt cx="0" cy="0"/>
+        </a:xfrm>
+      </p:grpSpPr>
+      <p:sp>
+        <p:nvSpPr>
+          <p:cNvPr id="53" name="PlaceHolder 1"/>
+          <p:cNvSpPr>
+            <a:spLocks noGrp="1"/>
+          </p:cNvSpPr>
+          <p:nvPr>
+            <p:ph type="title"/>
+          </p:nvPr>
+        </p:nvSpPr>
+        <p:spPr>
+          <a:xfrm>
+            <a:off x="609480" y="273600"/>
+            <a:ext cx="10972440" cy="1144800"/>
+          </a:xfrm>
+          <a:prstGeom prst="rect">
+            <a:avLst/>
+          </a:prstGeom>
+        </p:spPr>
+        <p:txBody>
+          <a:bodyPr lIns="0" rIns="0" tIns="0" bIns="0" anchor="ctr">
+            <a:noAutofit/>
+          </a:bodyPr>
+          <a:p>
+            <a:pPr algn="ctr"/>
+            <a:endParaRPr b="0" lang="sv-SE" sz="4400" spc="-1" strike="noStrike">
+              <a:latin typeface="Arial"/>
+            </a:endParaRPr>
+          </a:p>
+        </p:txBody>
+      </p:sp>
+      <p:sp>
+        <p:nvSpPr>
+          <p:cNvPr id="54" name="PlaceHolder 2"/>
+          <p:cNvSpPr>
+            <a:spLocks noGrp="1"/>
+          </p:cNvSpPr>
+          <p:nvPr>
+            <p:ph type="body"/>
+          </p:nvPr>
+        </p:nvSpPr>
+        <p:spPr>
+          <a:xfrm>
+            <a:off x="609480" y="1604520"/>
+            <a:ext cx="5354280" cy="3977280"/>
+          </a:xfrm>
+          <a:prstGeom prst="rect">
+            <a:avLst/>
+          </a:prstGeom>
+        </p:spPr>
+        <p:txBody>
+          <a:bodyPr lIns="0" rIns="0" tIns="0" bIns="0">
+            <a:normAutofit/>
+          </a:bodyPr>
+          <a:p>
+            <a:endParaRPr b="0" lang="sv-SE" sz="3200" spc="-1" strike="noStrike">
+              <a:latin typeface="Arial"/>
+            </a:endParaRPr>
+          </a:p>
+        </p:txBody>
+      </p:sp>
+      <p:sp>
+        <p:nvSpPr>
+          <p:cNvPr id="55" name="PlaceHolder 3"/>
+          <p:cNvSpPr>
+            <a:spLocks noGrp="1"/>
+          </p:cNvSpPr>
+          <p:nvPr>
+            <p:ph type="body"/>
+          </p:nvPr>
+        </p:nvSpPr>
+        <p:spPr>
+          <a:xfrm>
+            <a:off x="6231960" y="1604520"/>
+            <a:ext cx="5354280" cy="1896840"/>
+          </a:xfrm>
+          <a:prstGeom prst="rect">
+            <a:avLst/>
+          </a:prstGeom>
+        </p:spPr>
+        <p:txBody>
+          <a:bodyPr lIns="0" rIns="0" tIns="0" bIns="0">
+            <a:normAutofit/>
+          </a:bodyPr>
+          <a:p>
+            <a:endParaRPr b="0" lang="sv-SE" sz="3200" spc="-1" strike="noStrike">
+              <a:latin typeface="Arial"/>
+            </a:endParaRPr>
+          </a:p>
+        </p:txBody>
+      </p:sp>
+      <p:sp>
+        <p:nvSpPr>
+          <p:cNvPr id="56" name="PlaceHolder 4"/>
+          <p:cNvSpPr>
+            <a:spLocks noGrp="1"/>
+          </p:cNvSpPr>
+          <p:nvPr>
+            <p:ph type="body"/>
+          </p:nvPr>
+        </p:nvSpPr>
+        <p:spPr>
+          <a:xfrm>
+            <a:off x="6231960" y="3682080"/>
+            <a:ext cx="5354280" cy="1896840"/>
+          </a:xfrm>
+          <a:prstGeom prst="rect">
+            <a:avLst/>
+          </a:prstGeom>
+        </p:spPr>
+        <p:txBody>
+          <a:bodyPr lIns="0" rIns="0" tIns="0" bIns="0">
+            <a:normAutofit/>
+          </a:bodyPr>
+          <a:p>
+            <a:endParaRPr b="0" lang="sv-SE" sz="3200" spc="-1" strike="noStrike">
+              <a:latin typeface="Arial"/>
+            </a:endParaRPr>
+          </a:p>
+        </p:txBody>
+      </p:sp>
+    </p:spTree>
+  </p:cSld>
+</p:sldLayout>
+</file>
+
+<file path=ppt/slideLayouts/slideLayout21.xml><?xml version="1.0" encoding="utf-8"?>
+<p:sldLayout xmlns:a="http://schemas.openxmlformats.org/drawingml/2006/main" xmlns:p="http://schemas.openxmlformats.org/presentationml/2006/main" xmlns:r="http://schemas.openxmlformats.org/officeDocument/2006/relationships" xmlns:p14="http://schemas.microsoft.com/office/powerpoint/2010/main" xmlns:p15="http://schemas.microsoft.com/office/powerpoint/2012/main" xmlns:mc="http://schemas.openxmlformats.org/markup-compatibility/2006" type="twoObjOverTx" preserve="1">
+  <p:cSld name="Title, 2 Content over Content">
+    <p:spTree>
+      <p:nvGrpSpPr>
+        <p:cNvPr id="1" name=""/>
+        <p:cNvGrpSpPr/>
+        <p:nvPr/>
+      </p:nvGrpSpPr>
+      <p:grpSpPr>
+        <a:xfrm>
+          <a:off x="0" y="0"/>
+          <a:ext cx="0" cy="0"/>
+          <a:chOff x="0" y="0"/>
+          <a:chExt cx="0" cy="0"/>
+        </a:xfrm>
+      </p:grpSpPr>
+      <p:sp>
+        <p:nvSpPr>
+          <p:cNvPr id="57" name="PlaceHolder 1"/>
+          <p:cNvSpPr>
+            <a:spLocks noGrp="1"/>
+          </p:cNvSpPr>
+          <p:nvPr>
+            <p:ph type="title"/>
+          </p:nvPr>
+        </p:nvSpPr>
+        <p:spPr>
+          <a:xfrm>
+            <a:off x="609480" y="273600"/>
+            <a:ext cx="10972440" cy="1144800"/>
+          </a:xfrm>
+          <a:prstGeom prst="rect">
+            <a:avLst/>
+          </a:prstGeom>
+        </p:spPr>
+        <p:txBody>
+          <a:bodyPr lIns="0" rIns="0" tIns="0" bIns="0" anchor="ctr">
+            <a:noAutofit/>
+          </a:bodyPr>
+          <a:p>
+            <a:pPr algn="ctr"/>
+            <a:endParaRPr b="0" lang="sv-SE" sz="4400" spc="-1" strike="noStrike">
+              <a:latin typeface="Arial"/>
+            </a:endParaRPr>
+          </a:p>
+        </p:txBody>
+      </p:sp>
+      <p:sp>
+        <p:nvSpPr>
+          <p:cNvPr id="58" name="PlaceHolder 2"/>
+          <p:cNvSpPr>
+            <a:spLocks noGrp="1"/>
+          </p:cNvSpPr>
+          <p:nvPr>
+            <p:ph type="body"/>
+          </p:nvPr>
+        </p:nvSpPr>
+        <p:spPr>
+          <a:xfrm>
+            <a:off x="609480" y="1604520"/>
+            <a:ext cx="5354280" cy="1896840"/>
+          </a:xfrm>
+          <a:prstGeom prst="rect">
+            <a:avLst/>
+          </a:prstGeom>
+        </p:spPr>
+        <p:txBody>
+          <a:bodyPr lIns="0" rIns="0" tIns="0" bIns="0">
+            <a:normAutofit/>
+          </a:bodyPr>
+          <a:p>
+            <a:endParaRPr b="0" lang="sv-SE" sz="3200" spc="-1" strike="noStrike">
+              <a:latin typeface="Arial"/>
+            </a:endParaRPr>
+          </a:p>
+        </p:txBody>
+      </p:sp>
+      <p:sp>
+        <p:nvSpPr>
+          <p:cNvPr id="59" name="PlaceHolder 3"/>
+          <p:cNvSpPr>
+            <a:spLocks noGrp="1"/>
+          </p:cNvSpPr>
+          <p:nvPr>
+            <p:ph type="body"/>
+          </p:nvPr>
+        </p:nvSpPr>
+        <p:spPr>
+          <a:xfrm>
+            <a:off x="6231960" y="1604520"/>
+            <a:ext cx="5354280" cy="1896840"/>
+          </a:xfrm>
+          <a:prstGeom prst="rect">
+            <a:avLst/>
+          </a:prstGeom>
+        </p:spPr>
+        <p:txBody>
+          <a:bodyPr lIns="0" rIns="0" tIns="0" bIns="0">
+            <a:normAutofit/>
+          </a:bodyPr>
+          <a:p>
+            <a:endParaRPr b="0" lang="sv-SE" sz="3200" spc="-1" strike="noStrike">
+              <a:latin typeface="Arial"/>
+            </a:endParaRPr>
+          </a:p>
+        </p:txBody>
+      </p:sp>
+      <p:sp>
+        <p:nvSpPr>
+          <p:cNvPr id="60" name="PlaceHolder 4"/>
+          <p:cNvSpPr>
+            <a:spLocks noGrp="1"/>
+          </p:cNvSpPr>
+          <p:nvPr>
+            <p:ph type="body"/>
+          </p:nvPr>
+        </p:nvSpPr>
+        <p:spPr>
+          <a:xfrm>
+            <a:off x="609480" y="3682080"/>
+            <a:ext cx="10972440" cy="1896840"/>
+          </a:xfrm>
+          <a:prstGeom prst="rect">
+            <a:avLst/>
+          </a:prstGeom>
+        </p:spPr>
+        <p:txBody>
+          <a:bodyPr lIns="0" rIns="0" tIns="0" bIns="0">
+            <a:normAutofit/>
+          </a:bodyPr>
+          <a:p>
+            <a:endParaRPr b="0" lang="sv-SE" sz="3200" spc="-1" strike="noStrike">
+              <a:latin typeface="Arial"/>
+            </a:endParaRPr>
+          </a:p>
+        </p:txBody>
+      </p:sp>
+    </p:spTree>
+  </p:cSld>
+</p:sldLayout>
+</file>
+
+<file path=ppt/slideLayouts/slideLayout22.xml><?xml version="1.0" encoding="utf-8"?>
+<p:sldLayout xmlns:a="http://schemas.openxmlformats.org/drawingml/2006/main" xmlns:p="http://schemas.openxmlformats.org/presentationml/2006/main" xmlns:r="http://schemas.openxmlformats.org/officeDocument/2006/relationships" xmlns:p14="http://schemas.microsoft.com/office/powerpoint/2010/main" xmlns:p15="http://schemas.microsoft.com/office/powerpoint/2012/main" xmlns:mc="http://schemas.openxmlformats.org/markup-compatibility/2006" type="objOverTx" preserve="1">
+  <p:cSld name="Title, Content over Content">
+    <p:spTree>
+      <p:nvGrpSpPr>
+        <p:cNvPr id="1" name=""/>
+        <p:cNvGrpSpPr/>
+        <p:nvPr/>
+      </p:nvGrpSpPr>
+      <p:grpSpPr>
+        <a:xfrm>
+          <a:off x="0" y="0"/>
+          <a:ext cx="0" cy="0"/>
+          <a:chOff x="0" y="0"/>
+          <a:chExt cx="0" cy="0"/>
+        </a:xfrm>
+      </p:grpSpPr>
+      <p:sp>
+        <p:nvSpPr>
+          <p:cNvPr id="61" name="PlaceHolder 1"/>
+          <p:cNvSpPr>
+            <a:spLocks noGrp="1"/>
+          </p:cNvSpPr>
+          <p:nvPr>
+            <p:ph type="title"/>
+          </p:nvPr>
+        </p:nvSpPr>
+        <p:spPr>
+          <a:xfrm>
+            <a:off x="609480" y="273600"/>
+            <a:ext cx="10972440" cy="1144800"/>
+          </a:xfrm>
+          <a:prstGeom prst="rect">
+            <a:avLst/>
+          </a:prstGeom>
+        </p:spPr>
+        <p:txBody>
+          <a:bodyPr lIns="0" rIns="0" tIns="0" bIns="0" anchor="ctr">
+            <a:noAutofit/>
+          </a:bodyPr>
+          <a:p>
+            <a:pPr algn="ctr"/>
+            <a:endParaRPr b="0" lang="sv-SE" sz="4400" spc="-1" strike="noStrike">
+              <a:latin typeface="Arial"/>
+            </a:endParaRPr>
+          </a:p>
+        </p:txBody>
+      </p:sp>
+      <p:sp>
+        <p:nvSpPr>
+          <p:cNvPr id="62" name="PlaceHolder 2"/>
+          <p:cNvSpPr>
+            <a:spLocks noGrp="1"/>
+          </p:cNvSpPr>
+          <p:nvPr>
+            <p:ph type="body"/>
+          </p:nvPr>
+        </p:nvSpPr>
+        <p:spPr>
+          <a:xfrm>
+            <a:off x="609480" y="1604520"/>
+            <a:ext cx="10972440" cy="1896840"/>
+          </a:xfrm>
+          <a:prstGeom prst="rect">
+            <a:avLst/>
+          </a:prstGeom>
+        </p:spPr>
+        <p:txBody>
+          <a:bodyPr lIns="0" rIns="0" tIns="0" bIns="0">
+            <a:normAutofit/>
+          </a:bodyPr>
+          <a:p>
+            <a:endParaRPr b="0" lang="sv-SE" sz="3200" spc="-1" strike="noStrike">
+              <a:latin typeface="Arial"/>
+            </a:endParaRPr>
+          </a:p>
+        </p:txBody>
+      </p:sp>
+      <p:sp>
+        <p:nvSpPr>
+          <p:cNvPr id="63" name="PlaceHolder 3"/>
+          <p:cNvSpPr>
+            <a:spLocks noGrp="1"/>
+          </p:cNvSpPr>
+          <p:nvPr>
+            <p:ph type="body"/>
+          </p:nvPr>
+        </p:nvSpPr>
+        <p:spPr>
+          <a:xfrm>
+            <a:off x="609480" y="3682080"/>
+            <a:ext cx="10972440" cy="1896840"/>
+          </a:xfrm>
+          <a:prstGeom prst="rect">
+            <a:avLst/>
+          </a:prstGeom>
+        </p:spPr>
+        <p:txBody>
+          <a:bodyPr lIns="0" rIns="0" tIns="0" bIns="0">
+            <a:normAutofit/>
+          </a:bodyPr>
+          <a:p>
+            <a:endParaRPr b="0" lang="sv-SE" sz="3200" spc="-1" strike="noStrike">
+              <a:latin typeface="Arial"/>
+            </a:endParaRPr>
+          </a:p>
+        </p:txBody>
+      </p:sp>
+    </p:spTree>
+  </p:cSld>
+</p:sldLayout>
+</file>
+
+<file path=ppt/slideLayouts/slideLayout23.xml><?xml version="1.0" encoding="utf-8"?>
+<p:sldLayout xmlns:a="http://schemas.openxmlformats.org/drawingml/2006/main" xmlns:p="http://schemas.openxmlformats.org/presentationml/2006/main" xmlns:r="http://schemas.openxmlformats.org/officeDocument/2006/relationships" xmlns:p14="http://schemas.microsoft.com/office/powerpoint/2010/main" xmlns:p15="http://schemas.microsoft.com/office/powerpoint/2012/main" xmlns:mc="http://schemas.openxmlformats.org/markup-compatibility/2006" type="fourObj" preserve="1">
+  <p:cSld name="Title, 4 Content">
+    <p:spTree>
+      <p:nvGrpSpPr>
+        <p:cNvPr id="1" name=""/>
+        <p:cNvGrpSpPr/>
+        <p:nvPr/>
+      </p:nvGrpSpPr>
+      <p:grpSpPr>
+        <a:xfrm>
+          <a:off x="0" y="0"/>
+          <a:ext cx="0" cy="0"/>
+          <a:chOff x="0" y="0"/>
+          <a:chExt cx="0" cy="0"/>
+        </a:xfrm>
+      </p:grpSpPr>
+      <p:sp>
+        <p:nvSpPr>
+          <p:cNvPr id="64" name="PlaceHolder 1"/>
+          <p:cNvSpPr>
+            <a:spLocks noGrp="1"/>
+          </p:cNvSpPr>
+          <p:nvPr>
+            <p:ph type="title"/>
+          </p:nvPr>
+        </p:nvSpPr>
+        <p:spPr>
+          <a:xfrm>
+            <a:off x="609480" y="273600"/>
+            <a:ext cx="10972440" cy="1144800"/>
+          </a:xfrm>
+          <a:prstGeom prst="rect">
+            <a:avLst/>
+          </a:prstGeom>
+        </p:spPr>
+        <p:txBody>
+          <a:bodyPr lIns="0" rIns="0" tIns="0" bIns="0" anchor="ctr">
+            <a:noAutofit/>
+          </a:bodyPr>
+          <a:p>
+            <a:pPr algn="ctr"/>
+            <a:endParaRPr b="0" lang="sv-SE" sz="4400" spc="-1" strike="noStrike">
+              <a:latin typeface="Arial"/>
+            </a:endParaRPr>
+          </a:p>
+        </p:txBody>
+      </p:sp>
+      <p:sp>
+        <p:nvSpPr>
+          <p:cNvPr id="65" name="PlaceHolder 2"/>
+          <p:cNvSpPr>
+            <a:spLocks noGrp="1"/>
+          </p:cNvSpPr>
+          <p:nvPr>
+            <p:ph type="body"/>
+          </p:nvPr>
+        </p:nvSpPr>
+        <p:spPr>
+          <a:xfrm>
+            <a:off x="609480" y="1604520"/>
+            <a:ext cx="5354280" cy="1896840"/>
+          </a:xfrm>
+          <a:prstGeom prst="rect">
+            <a:avLst/>
+          </a:prstGeom>
+        </p:spPr>
+        <p:txBody>
+          <a:bodyPr lIns="0" rIns="0" tIns="0" bIns="0">
+            <a:normAutofit/>
+          </a:bodyPr>
+          <a:p>
+            <a:endParaRPr b="0" lang="sv-SE" sz="3200" spc="-1" strike="noStrike">
+              <a:latin typeface="Arial"/>
+            </a:endParaRPr>
+          </a:p>
+        </p:txBody>
+      </p:sp>
+      <p:sp>
+        <p:nvSpPr>
+          <p:cNvPr id="66" name="PlaceHolder 3"/>
+          <p:cNvSpPr>
+            <a:spLocks noGrp="1"/>
+          </p:cNvSpPr>
+          <p:nvPr>
+            <p:ph type="body"/>
+          </p:nvPr>
+        </p:nvSpPr>
+        <p:spPr>
+          <a:xfrm>
+            <a:off x="6231960" y="1604520"/>
+            <a:ext cx="5354280" cy="1896840"/>
+          </a:xfrm>
+          <a:prstGeom prst="rect">
+            <a:avLst/>
+          </a:prstGeom>
+        </p:spPr>
+        <p:txBody>
+          <a:bodyPr lIns="0" rIns="0" tIns="0" bIns="0">
+            <a:normAutofit/>
+          </a:bodyPr>
+          <a:p>
+            <a:endParaRPr b="0" lang="sv-SE" sz="3200" spc="-1" strike="noStrike">
+              <a:latin typeface="Arial"/>
+            </a:endParaRPr>
+          </a:p>
+        </p:txBody>
+      </p:sp>
+      <p:sp>
+        <p:nvSpPr>
+          <p:cNvPr id="67" name="PlaceHolder 4"/>
+          <p:cNvSpPr>
+            <a:spLocks noGrp="1"/>
+          </p:cNvSpPr>
+          <p:nvPr>
+            <p:ph type="body"/>
+          </p:nvPr>
+        </p:nvSpPr>
+        <p:spPr>
+          <a:xfrm>
+            <a:off x="609480" y="3682080"/>
+            <a:ext cx="5354280" cy="1896840"/>
+          </a:xfrm>
+          <a:prstGeom prst="rect">
+            <a:avLst/>
+          </a:prstGeom>
+        </p:spPr>
+        <p:txBody>
+          <a:bodyPr lIns="0" rIns="0" tIns="0" bIns="0">
+            <a:normAutofit/>
+          </a:bodyPr>
+          <a:p>
+            <a:endParaRPr b="0" lang="sv-SE" sz="3200" spc="-1" strike="noStrike">
+              <a:latin typeface="Arial"/>
+            </a:endParaRPr>
+          </a:p>
+        </p:txBody>
+      </p:sp>
+      <p:sp>
+        <p:nvSpPr>
+          <p:cNvPr id="68" name="PlaceHolder 5"/>
+          <p:cNvSpPr>
+            <a:spLocks noGrp="1"/>
+          </p:cNvSpPr>
+          <p:nvPr>
+            <p:ph type="body"/>
+          </p:nvPr>
+        </p:nvSpPr>
+        <p:spPr>
+          <a:xfrm>
+            <a:off x="6231960" y="3682080"/>
+            <a:ext cx="5354280" cy="1896840"/>
+          </a:xfrm>
+          <a:prstGeom prst="rect">
+            <a:avLst/>
+          </a:prstGeom>
+        </p:spPr>
+        <p:txBody>
+          <a:bodyPr lIns="0" rIns="0" tIns="0" bIns="0">
+            <a:normAutofit/>
+          </a:bodyPr>
+          <a:p>
+            <a:endParaRPr b="0" lang="sv-SE" sz="3200" spc="-1" strike="noStrike">
+              <a:latin typeface="Arial"/>
+            </a:endParaRPr>
+          </a:p>
+        </p:txBody>
+      </p:sp>
+    </p:spTree>
+  </p:cSld>
+</p:sldLayout>
+</file>
+
+<file path=ppt/slideLayouts/slideLayout24.xml><?xml version="1.0" encoding="utf-8"?>
+<p:sldLayout xmlns:a="http://schemas.openxmlformats.org/drawingml/2006/main" xmlns:p="http://schemas.openxmlformats.org/presentationml/2006/main" xmlns:r="http://schemas.openxmlformats.org/officeDocument/2006/relationships" xmlns:p14="http://schemas.microsoft.com/office/powerpoint/2010/main" xmlns:p15="http://schemas.microsoft.com/office/powerpoint/2012/main" xmlns:mc="http://schemas.openxmlformats.org/markup-compatibility/2006" type="blank" preserve="1">
+  <p:cSld name="Title, 6 Content">
+    <p:spTree>
+      <p:nvGrpSpPr>
+        <p:cNvPr id="1" name=""/>
+        <p:cNvGrpSpPr/>
+        <p:nvPr/>
+      </p:nvGrpSpPr>
+      <p:grpSpPr>
+        <a:xfrm>
+          <a:off x="0" y="0"/>
+          <a:ext cx="0" cy="0"/>
+          <a:chOff x="0" y="0"/>
+          <a:chExt cx="0" cy="0"/>
+        </a:xfrm>
+      </p:grpSpPr>
+      <p:sp>
+        <p:nvSpPr>
+          <p:cNvPr id="69" name="PlaceHolder 1"/>
+          <p:cNvSpPr>
+            <a:spLocks noGrp="1"/>
+          </p:cNvSpPr>
+          <p:nvPr>
+            <p:ph type="title"/>
+          </p:nvPr>
+        </p:nvSpPr>
+        <p:spPr>
+          <a:xfrm>
+            <a:off x="609480" y="273600"/>
+            <a:ext cx="10972440" cy="1144800"/>
+          </a:xfrm>
+          <a:prstGeom prst="rect">
+            <a:avLst/>
+          </a:prstGeom>
+        </p:spPr>
+        <p:txBody>
+          <a:bodyPr lIns="0" rIns="0" tIns="0" bIns="0" anchor="ctr">
+            <a:noAutofit/>
+          </a:bodyPr>
+          <a:p>
+            <a:pPr algn="ctr"/>
+            <a:endParaRPr b="0" lang="sv-SE" sz="4400" spc="-1" strike="noStrike">
+              <a:latin typeface="Arial"/>
+            </a:endParaRPr>
+          </a:p>
+        </p:txBody>
+      </p:sp>
+      <p:sp>
+        <p:nvSpPr>
+          <p:cNvPr id="70" name="PlaceHolder 2"/>
+          <p:cNvSpPr>
+            <a:spLocks noGrp="1"/>
+          </p:cNvSpPr>
+          <p:nvPr>
+            <p:ph type="body"/>
+          </p:nvPr>
+        </p:nvSpPr>
+        <p:spPr>
+          <a:xfrm>
+            <a:off x="609480" y="1604520"/>
+            <a:ext cx="3533040" cy="1896840"/>
+          </a:xfrm>
+          <a:prstGeom prst="rect">
+            <a:avLst/>
+          </a:prstGeom>
+        </p:spPr>
+        <p:txBody>
+          <a:bodyPr lIns="0" rIns="0" tIns="0" bIns="0">
+            <a:normAutofit/>
+          </a:bodyPr>
+          <a:p>
+            <a:endParaRPr b="0" lang="sv-SE" sz="3200" spc="-1" strike="noStrike">
+              <a:latin typeface="Arial"/>
+            </a:endParaRPr>
+          </a:p>
+        </p:txBody>
+      </p:sp>
+      <p:sp>
+        <p:nvSpPr>
+          <p:cNvPr id="71" name="PlaceHolder 3"/>
+          <p:cNvSpPr>
+            <a:spLocks noGrp="1"/>
+          </p:cNvSpPr>
+          <p:nvPr>
+            <p:ph type="body"/>
+          </p:nvPr>
+        </p:nvSpPr>
+        <p:spPr>
+          <a:xfrm>
+            <a:off x="4319640" y="1604520"/>
+            <a:ext cx="3533040" cy="1896840"/>
+          </a:xfrm>
+          <a:prstGeom prst="rect">
+            <a:avLst/>
+          </a:prstGeom>
+        </p:spPr>
+        <p:txBody>
+          <a:bodyPr lIns="0" rIns="0" tIns="0" bIns="0">
+            <a:normAutofit/>
+          </a:bodyPr>
+          <a:p>
+            <a:endParaRPr b="0" lang="sv-SE" sz="3200" spc="-1" strike="noStrike">
+              <a:latin typeface="Arial"/>
+            </a:endParaRPr>
+          </a:p>
+        </p:txBody>
+      </p:sp>
+      <p:sp>
+        <p:nvSpPr>
+          <p:cNvPr id="72" name="PlaceHolder 4"/>
+          <p:cNvSpPr>
+            <a:spLocks noGrp="1"/>
+          </p:cNvSpPr>
+          <p:nvPr>
+            <p:ph type="body"/>
+          </p:nvPr>
+        </p:nvSpPr>
+        <p:spPr>
+          <a:xfrm>
+            <a:off x="8029800" y="1604520"/>
+            <a:ext cx="3533040" cy="1896840"/>
+          </a:xfrm>
+          <a:prstGeom prst="rect">
+            <a:avLst/>
+          </a:prstGeom>
+        </p:spPr>
+        <p:txBody>
+          <a:bodyPr lIns="0" rIns="0" tIns="0" bIns="0">
+            <a:normAutofit/>
+          </a:bodyPr>
+          <a:p>
+            <a:endParaRPr b="0" lang="sv-SE" sz="3200" spc="-1" strike="noStrike">
+              <a:latin typeface="Arial"/>
+            </a:endParaRPr>
+          </a:p>
+        </p:txBody>
+      </p:sp>
+      <p:sp>
+        <p:nvSpPr>
+          <p:cNvPr id="73" name="PlaceHolder 5"/>
+          <p:cNvSpPr>
+            <a:spLocks noGrp="1"/>
+          </p:cNvSpPr>
+          <p:nvPr>
+            <p:ph type="body"/>
+          </p:nvPr>
+        </p:nvSpPr>
+        <p:spPr>
+          <a:xfrm>
+            <a:off x="609480" y="3682080"/>
+            <a:ext cx="3533040" cy="1896840"/>
+          </a:xfrm>
+          <a:prstGeom prst="rect">
+            <a:avLst/>
+          </a:prstGeom>
+        </p:spPr>
+        <p:txBody>
+          <a:bodyPr lIns="0" rIns="0" tIns="0" bIns="0">
+            <a:normAutofit/>
+          </a:bodyPr>
+          <a:p>
+            <a:endParaRPr b="0" lang="sv-SE" sz="3200" spc="-1" strike="noStrike">
+              <a:latin typeface="Arial"/>
+            </a:endParaRPr>
+          </a:p>
+        </p:txBody>
+      </p:sp>
+      <p:sp>
+        <p:nvSpPr>
+          <p:cNvPr id="74" name="PlaceHolder 6"/>
+          <p:cNvSpPr>
+            <a:spLocks noGrp="1"/>
+          </p:cNvSpPr>
+          <p:nvPr>
+            <p:ph type="body"/>
+          </p:nvPr>
+        </p:nvSpPr>
+        <p:spPr>
+          <a:xfrm>
+            <a:off x="4319640" y="3682080"/>
+            <a:ext cx="3533040" cy="1896840"/>
+          </a:xfrm>
+          <a:prstGeom prst="rect">
+            <a:avLst/>
+          </a:prstGeom>
+        </p:spPr>
+        <p:txBody>
+          <a:bodyPr lIns="0" rIns="0" tIns="0" bIns="0">
+            <a:normAutofit/>
+          </a:bodyPr>
+          <a:p>
+            <a:endParaRPr b="0" lang="sv-SE" sz="3200" spc="-1" strike="noStrike">
+              <a:latin typeface="Arial"/>
+            </a:endParaRPr>
+          </a:p>
+        </p:txBody>
+      </p:sp>
+      <p:sp>
+        <p:nvSpPr>
+          <p:cNvPr id="75" name="PlaceHolder 7"/>
+          <p:cNvSpPr>
+            <a:spLocks noGrp="1"/>
+          </p:cNvSpPr>
+          <p:nvPr>
+            <p:ph type="body"/>
+          </p:nvPr>
+        </p:nvSpPr>
+        <p:spPr>
+          <a:xfrm>
+            <a:off x="8029800" y="3682080"/>
+            <a:ext cx="3533040" cy="1896840"/>
+          </a:xfrm>
+          <a:prstGeom prst="rect">
+            <a:avLst/>
+          </a:prstGeom>
+        </p:spPr>
+        <p:txBody>
+          <a:bodyPr lIns="0" rIns="0" tIns="0" bIns="0">
+            <a:normAutofit/>
+          </a:bodyPr>
+          <a:p>
             <a:endParaRPr b="0" lang="sv-SE" sz="3200" spc="-1" strike="noStrike">
               <a:latin typeface="Arial"/>
             </a:endParaRPr>
@@ -1423,19 +2781,31 @@
               <a:rPr b="0" lang="sv-SE" sz="4400" spc="-1" strike="noStrike">
                 <a:latin typeface="Arial"/>
               </a:rPr>
-              <a:t>Click to </a:t>
+              <a:t>Click </a:t>
             </a:r>
             <a:r>
               <a:rPr b="0" lang="sv-SE" sz="4400" spc="-1" strike="noStrike">
                 <a:latin typeface="Arial"/>
               </a:rPr>
-              <a:t>edit the </a:t>
+              <a:t>to edit </a:t>
             </a:r>
             <a:r>
               <a:rPr b="0" lang="sv-SE" sz="4400" spc="-1" strike="noStrike">
                 <a:latin typeface="Arial"/>
               </a:rPr>
-              <a:t>title text </a:t>
+              <a:t>the </a:t>
+            </a:r>
+            <a:r>
+              <a:rPr b="0" lang="sv-SE" sz="4400" spc="-1" strike="noStrike">
+                <a:latin typeface="Arial"/>
+              </a:rPr>
+              <a:t>title </a:t>
+            </a:r>
+            <a:r>
+              <a:rPr b="0" lang="sv-SE" sz="4400" spc="-1" strike="noStrike">
+                <a:latin typeface="Arial"/>
+              </a:rPr>
+              <a:t>text </a:t>
             </a:r>
             <a:r>
               <a:rPr b="0" lang="sv-SE" sz="4400" spc="-1" strike="noStrike">
@@ -1644,6 +3014,266 @@
     <p:sldLayoutId id="2147483658" r:id="rId11"/>
     <p:sldLayoutId id="2147483659" r:id="rId12"/>
     <p:sldLayoutId id="2147483660" r:id="rId13"/>
+  </p:sldLayoutIdLst>
+</p:sldMaster>
+</file>
+
+<file path=ppt/slideMasters/slideMaster2.xml><?xml version="1.0" encoding="utf-8"?>
+<p:sldMaster xmlns:a="http://schemas.openxmlformats.org/drawingml/2006/main" xmlns:p="http://schemas.openxmlformats.org/presentationml/2006/main" xmlns:r="http://schemas.openxmlformats.org/officeDocument/2006/relationships" xmlns:p14="http://schemas.microsoft.com/office/powerpoint/2010/main" xmlns:p15="http://schemas.microsoft.com/office/powerpoint/2012/main" xmlns:mc="http://schemas.openxmlformats.org/markup-compatibility/2006">
+  <p:cSld>
+    <p:bg>
+      <p:bgPr>
+        <a:solidFill>
+          <a:srgbClr val="ffffff"/>
+        </a:solidFill>
+      </p:bgPr>
+    </p:bg>
+    <p:spTree>
+      <p:nvGrpSpPr>
+        <p:cNvPr id="1" name=""/>
+        <p:cNvGrpSpPr/>
+        <p:nvPr/>
+      </p:nvGrpSpPr>
+      <p:grpSpPr>
+        <a:xfrm>
+          <a:off x="0" y="0"/>
+          <a:ext cx="0" cy="0"/>
+          <a:chOff x="0" y="0"/>
+          <a:chExt cx="0" cy="0"/>
+        </a:xfrm>
+      </p:grpSpPr>
+      <p:sp>
+        <p:nvSpPr>
+          <p:cNvPr id="38" name="PlaceHolder 1"/>
+          <p:cNvSpPr>
+            <a:spLocks noGrp="1"/>
+          </p:cNvSpPr>
+          <p:nvPr>
+            <p:ph type="title"/>
+          </p:nvPr>
+        </p:nvSpPr>
+        <p:spPr>
+          <a:xfrm>
+            <a:off x="609480" y="273600"/>
+            <a:ext cx="10972440" cy="1144800"/>
+          </a:xfrm>
+          <a:prstGeom prst="rect">
+            <a:avLst/>
+          </a:prstGeom>
+        </p:spPr>
+        <p:txBody>
+          <a:bodyPr lIns="0" rIns="0" tIns="0" bIns="0" anchor="ctr">
+            <a:noAutofit/>
+          </a:bodyPr>
+          <a:p>
+            <a:pPr algn="ctr"/>
+            <a:r>
+              <a:rPr b="0" lang="sv-SE" sz="4400" spc="-1" strike="noStrike">
+                <a:latin typeface="Arial"/>
+              </a:rPr>
+              <a:t>Click to edit the title text format</a:t>
+            </a:r>
+            <a:endParaRPr b="0" lang="sv-SE" sz="4400" spc="-1" strike="noStrike">
+              <a:latin typeface="Arial"/>
+            </a:endParaRPr>
+          </a:p>
+        </p:txBody>
+      </p:sp>
+      <p:sp>
+        <p:nvSpPr>
+          <p:cNvPr id="39" name="PlaceHolder 2"/>
+          <p:cNvSpPr>
+            <a:spLocks noGrp="1"/>
+          </p:cNvSpPr>
+          <p:nvPr>
+            <p:ph type="body"/>
+          </p:nvPr>
+        </p:nvSpPr>
+        <p:spPr>
+          <a:xfrm>
+            <a:off x="609480" y="1604520"/>
+            <a:ext cx="10972440" cy="3977280"/>
+          </a:xfrm>
+          <a:prstGeom prst="rect">
+            <a:avLst/>
+          </a:prstGeom>
+        </p:spPr>
+        <p:txBody>
+          <a:bodyPr lIns="0" rIns="0" tIns="0" bIns="0">
+            <a:normAutofit/>
+          </a:bodyPr>
+          <a:p>
+            <a:pPr marL="432000" indent="-324000">
+              <a:spcBef>
+                <a:spcPts val="1417"/>
+              </a:spcBef>
+              <a:buClr>
+                <a:srgbClr val="000000"/>
+              </a:buClr>
+              <a:buSzPct val="45000"/>
+              <a:buFont typeface="Wingdings" charset="2"/>
+              <a:buChar char=""/>
+            </a:pPr>
+            <a:r>
+              <a:rPr b="0" lang="sv-SE" sz="3200" spc="-1" strike="noStrike">
+                <a:latin typeface="Arial"/>
+              </a:rPr>
+              <a:t>Click to edit the outline text format</a:t>
+            </a:r>
+            <a:endParaRPr b="0" lang="sv-SE" sz="3200" spc="-1" strike="noStrike">
+              <a:latin typeface="Arial"/>
+            </a:endParaRPr>
+          </a:p>
+          <a:p>
+            <a:pPr lvl="1" marL="864000" indent="-324000">
+              <a:spcBef>
+                <a:spcPts val="1134"/>
+              </a:spcBef>
+              <a:buClr>
+                <a:srgbClr val="000000"/>
+              </a:buClr>
+              <a:buSzPct val="75000"/>
+              <a:buFont typeface="Symbol" charset="2"/>
+              <a:buChar char=""/>
+            </a:pPr>
+            <a:r>
+              <a:rPr b="0" lang="sv-SE" sz="2800" spc="-1" strike="noStrike">
+                <a:latin typeface="Arial"/>
+              </a:rPr>
+              <a:t>Second Outline Level</a:t>
+            </a:r>
+            <a:endParaRPr b="0" lang="sv-SE" sz="2800" spc="-1" strike="noStrike">
+              <a:latin typeface="Arial"/>
+            </a:endParaRPr>
+          </a:p>
+          <a:p>
+            <a:pPr lvl="2" marL="1296000" indent="-288000">
+              <a:spcBef>
+                <a:spcPts val="850"/>
+              </a:spcBef>
+              <a:buClr>
+                <a:srgbClr val="000000"/>
+              </a:buClr>
+              <a:buSzPct val="45000"/>
+              <a:buFont typeface="Wingdings" charset="2"/>
+              <a:buChar char=""/>
+            </a:pPr>
+            <a:r>
+              <a:rPr b="0" lang="sv-SE" sz="2400" spc="-1" strike="noStrike">
+                <a:latin typeface="Arial"/>
+              </a:rPr>
+              <a:t>Third Outline Level</a:t>
+            </a:r>
+            <a:endParaRPr b="0" lang="sv-SE" sz="2400" spc="-1" strike="noStrike">
+              <a:latin typeface="Arial"/>
+            </a:endParaRPr>
+          </a:p>
+          <a:p>
+            <a:pPr lvl="3" marL="1728000" indent="-216000">
+              <a:spcBef>
+                <a:spcPts val="567"/>
+              </a:spcBef>
+              <a:buClr>
+                <a:srgbClr val="000000"/>
+              </a:buClr>
+              <a:buSzPct val="75000"/>
+              <a:buFont typeface="Symbol" charset="2"/>
+              <a:buChar char=""/>
+            </a:pPr>
+            <a:r>
+              <a:rPr b="0" lang="sv-SE" sz="2000" spc="-1" strike="noStrike">
+                <a:latin typeface="Arial"/>
+              </a:rPr>
+              <a:t>Fourth Outline Level</a:t>
+            </a:r>
+            <a:endParaRPr b="0" lang="sv-SE" sz="2000" spc="-1" strike="noStrike">
+              <a:latin typeface="Arial"/>
+            </a:endParaRPr>
+          </a:p>
+          <a:p>
+            <a:pPr lvl="4" marL="2160000" indent="-216000">
+              <a:spcBef>
+                <a:spcPts val="283"/>
+              </a:spcBef>
+              <a:buClr>
+                <a:srgbClr val="000000"/>
+              </a:buClr>
+              <a:buSzPct val="45000"/>
+              <a:buFont typeface="Wingdings" charset="2"/>
+              <a:buChar char=""/>
+            </a:pPr>
+            <a:r>
+              <a:rPr b="0" lang="sv-SE" sz="2000" spc="-1" strike="noStrike">
+                <a:latin typeface="Arial"/>
+              </a:rPr>
+              <a:t>Fifth Outline Level</a:t>
+            </a:r>
+            <a:endParaRPr b="0" lang="sv-SE" sz="2000" spc="-1" strike="noStrike">
+              <a:latin typeface="Arial"/>
+            </a:endParaRPr>
+          </a:p>
+          <a:p>
+            <a:pPr lvl="5" marL="2592000" indent="-216000">
+              <a:spcBef>
+                <a:spcPts val="283"/>
+              </a:spcBef>
+              <a:buClr>
+                <a:srgbClr val="000000"/>
+              </a:buClr>
+              <a:buSzPct val="45000"/>
+              <a:buFont typeface="Wingdings" charset="2"/>
+              <a:buChar char=""/>
+            </a:pPr>
+            <a:r>
+              <a:rPr b="0" lang="sv-SE" sz="2000" spc="-1" strike="noStrike">
+                <a:latin typeface="Arial"/>
+              </a:rPr>
+              <a:t>Sixth Outline Level</a:t>
+            </a:r>
+            <a:endParaRPr b="0" lang="sv-SE" sz="2000" spc="-1" strike="noStrike">
+              <a:latin typeface="Arial"/>
+            </a:endParaRPr>
+          </a:p>
+          <a:p>
+            <a:pPr lvl="6" marL="3024000" indent="-216000">
+              <a:spcBef>
+                <a:spcPts val="283"/>
+              </a:spcBef>
+              <a:buClr>
+                <a:srgbClr val="000000"/>
+              </a:buClr>
+              <a:buSzPct val="45000"/>
+              <a:buFont typeface="Wingdings" charset="2"/>
+              <a:buChar char=""/>
+            </a:pPr>
+            <a:r>
+              <a:rPr b="0" lang="sv-SE" sz="2000" spc="-1" strike="noStrike">
+                <a:latin typeface="Arial"/>
+              </a:rPr>
+              <a:t>Seventh Outline Level</a:t>
+            </a:r>
+            <a:endParaRPr b="0" lang="sv-SE" sz="2000" spc="-1" strike="noStrike">
+              <a:latin typeface="Arial"/>
+            </a:endParaRPr>
+          </a:p>
+        </p:txBody>
+      </p:sp>
+    </p:spTree>
+  </p:cSld>
+  <p:clrMap bg1="lt1" bg2="lt2" tx1="dk1" tx2="dk2" accent1="accent1" accent2="accent2" accent3="accent3" accent4="accent4" accent5="accent5" accent6="accent6" hlink="hlink" folHlink="folHlink"/>
+  <p:sldLayoutIdLst>
+    <p:sldLayoutId id="2147483662" r:id="rId2"/>
+    <p:sldLayoutId id="2147483663" r:id="rId3"/>
+    <p:sldLayoutId id="2147483664" r:id="rId4"/>
+    <p:sldLayoutId id="2147483665" r:id="rId5"/>
+    <p:sldLayoutId id="2147483666" r:id="rId6"/>
+    <p:sldLayoutId id="2147483667" r:id="rId7"/>
+    <p:sldLayoutId id="2147483668" r:id="rId8"/>
+    <p:sldLayoutId id="2147483669" r:id="rId9"/>
+    <p:sldLayoutId id="2147483670" r:id="rId10"/>
+    <p:sldLayoutId id="2147483671" r:id="rId11"/>
+    <p:sldLayoutId id="2147483672" r:id="rId12"/>
+    <p:sldLayoutId id="2147483673" r:id="rId13"/>
   </p:sldLayoutIdLst>
 </p:sldMaster>
 </file>
@@ -1667,14 +3297,14 @@
       </p:grpSpPr>
       <p:sp>
         <p:nvSpPr>
-          <p:cNvPr id="38" name="CustomShape 1"/>
+          <p:cNvPr id="76" name="CustomShape 1"/>
           <p:cNvSpPr/>
           <p:nvPr/>
         </p:nvSpPr>
         <p:spPr>
           <a:xfrm>
             <a:off x="3564360" y="3875400"/>
-            <a:ext cx="1510200" cy="515880"/>
+            <a:ext cx="1509840" cy="515880"/>
           </a:xfrm>
           <a:prstGeom prst="rect">
             <a:avLst/>
@@ -1718,14 +3348,14 @@
       </p:sp>
       <p:sp>
         <p:nvSpPr>
-          <p:cNvPr id="39" name="CustomShape 2"/>
+          <p:cNvPr id="77" name="CustomShape 2"/>
           <p:cNvSpPr/>
           <p:nvPr/>
         </p:nvSpPr>
         <p:spPr>
           <a:xfrm>
             <a:off x="72000" y="81000"/>
-            <a:ext cx="2232000" cy="363960"/>
+            <a:ext cx="2231640" cy="363960"/>
           </a:xfrm>
           <a:prstGeom prst="rect">
             <a:avLst/>
@@ -1771,14 +3401,14 @@
       </p:sp>
       <p:sp>
         <p:nvSpPr>
-          <p:cNvPr id="40" name="CustomShape 3"/>
+          <p:cNvPr id="78" name="CustomShape 3"/>
           <p:cNvSpPr/>
           <p:nvPr/>
         </p:nvSpPr>
         <p:spPr>
           <a:xfrm>
             <a:off x="7812000" y="1188000"/>
-            <a:ext cx="1996200" cy="987480"/>
+            <a:ext cx="1995840" cy="987120"/>
           </a:xfrm>
           <a:prstGeom prst="roundRect">
             <a:avLst>
@@ -1836,14 +3466,14 @@
       </p:sp>
       <p:sp>
         <p:nvSpPr>
-          <p:cNvPr id="41" name="CustomShape 4"/>
+          <p:cNvPr id="79" name="CustomShape 4"/>
           <p:cNvSpPr/>
           <p:nvPr/>
         </p:nvSpPr>
         <p:spPr>
           <a:xfrm>
             <a:off x="4176000" y="1512720"/>
-            <a:ext cx="3382920" cy="430200"/>
+            <a:ext cx="3382560" cy="429840"/>
           </a:xfrm>
           <a:custGeom>
             <a:avLst/>
@@ -1897,14 +3527,14 @@
       </p:sp>
       <p:sp>
         <p:nvSpPr>
-          <p:cNvPr id="42" name="CustomShape 5"/>
+          <p:cNvPr id="80" name="CustomShape 5"/>
           <p:cNvSpPr/>
           <p:nvPr/>
         </p:nvSpPr>
         <p:spPr>
           <a:xfrm>
             <a:off x="6804000" y="3875400"/>
-            <a:ext cx="1773000" cy="515880"/>
+            <a:ext cx="1772640" cy="515880"/>
           </a:xfrm>
           <a:prstGeom prst="rect">
             <a:avLst/>
@@ -1948,7 +3578,7 @@
       </p:sp>
       <p:sp>
         <p:nvSpPr>
-          <p:cNvPr id="43" name="Line 6"/>
+          <p:cNvPr id="81" name="Line 6"/>
           <p:cNvSpPr/>
           <p:nvPr/>
         </p:nvSpPr>
@@ -1976,7 +3606,7 @@
       </p:sp>
       <p:sp>
         <p:nvSpPr>
-          <p:cNvPr id="44" name="Line 7"/>
+          <p:cNvPr id="82" name="Line 7"/>
           <p:cNvSpPr/>
           <p:nvPr/>
         </p:nvSpPr>
@@ -2005,7 +3635,7 @@
       </p:sp>
       <p:sp>
         <p:nvSpPr>
-          <p:cNvPr id="45" name="Line 8"/>
+          <p:cNvPr id="83" name="Line 8"/>
           <p:cNvSpPr/>
           <p:nvPr/>
         </p:nvSpPr>
@@ -2033,14 +3663,14 @@
       </p:sp>
       <p:sp>
         <p:nvSpPr>
-          <p:cNvPr id="46" name="CustomShape 9"/>
+          <p:cNvPr id="84" name="CustomShape 9"/>
           <p:cNvSpPr/>
           <p:nvPr/>
         </p:nvSpPr>
         <p:spPr>
           <a:xfrm>
             <a:off x="8604000" y="3600000"/>
-            <a:ext cx="3105000" cy="302760"/>
+            <a:ext cx="3104640" cy="302760"/>
           </a:xfrm>
           <a:prstGeom prst="rect">
             <a:avLst/>
@@ -2084,14 +3714,14 @@
       </p:sp>
       <p:sp>
         <p:nvSpPr>
-          <p:cNvPr id="47" name="CustomShape 10"/>
+          <p:cNvPr id="85" name="CustomShape 10"/>
           <p:cNvSpPr/>
           <p:nvPr/>
         </p:nvSpPr>
         <p:spPr>
           <a:xfrm>
             <a:off x="5022360" y="4668120"/>
-            <a:ext cx="2284200" cy="1414440"/>
+            <a:ext cx="2283840" cy="1414080"/>
           </a:xfrm>
           <a:prstGeom prst="roundRect">
             <a:avLst>
@@ -2167,14 +3797,14 @@
       </p:sp>
       <p:sp>
         <p:nvSpPr>
-          <p:cNvPr id="48" name="CustomShape 11"/>
+          <p:cNvPr id="86" name="CustomShape 11"/>
           <p:cNvSpPr/>
           <p:nvPr/>
         </p:nvSpPr>
         <p:spPr>
           <a:xfrm>
             <a:off x="5022360" y="4668120"/>
-            <a:ext cx="2284200" cy="1414440"/>
+            <a:ext cx="2283840" cy="1414080"/>
           </a:xfrm>
           <a:prstGeom prst="roundRect">
             <a:avLst>
@@ -2250,14 +3880,14 @@
       </p:sp>
       <p:sp>
         <p:nvSpPr>
-          <p:cNvPr id="49" name="CustomShape 12"/>
+          <p:cNvPr id="87" name="CustomShape 12"/>
           <p:cNvSpPr/>
           <p:nvPr/>
         </p:nvSpPr>
         <p:spPr>
           <a:xfrm>
             <a:off x="1890720" y="5760000"/>
-            <a:ext cx="1996200" cy="987480"/>
+            <a:ext cx="1995840" cy="987120"/>
           </a:xfrm>
           <a:prstGeom prst="roundRect">
             <a:avLst>
@@ -2315,14 +3945,14 @@
       </p:sp>
       <p:sp>
         <p:nvSpPr>
-          <p:cNvPr id="50" name="CustomShape 13"/>
+          <p:cNvPr id="88" name="CustomShape 13"/>
           <p:cNvSpPr/>
           <p:nvPr/>
         </p:nvSpPr>
         <p:spPr>
           <a:xfrm>
             <a:off x="3276000" y="4952520"/>
-            <a:ext cx="1773000" cy="302760"/>
+            <a:ext cx="1772640" cy="302760"/>
           </a:xfrm>
           <a:prstGeom prst="rect">
             <a:avLst/>
@@ -2366,7 +3996,7 @@
       </p:sp>
       <p:sp>
         <p:nvSpPr>
-          <p:cNvPr id="51" name="Line 14"/>
+          <p:cNvPr id="89" name="Line 14"/>
           <p:cNvSpPr/>
           <p:nvPr/>
         </p:nvSpPr>
@@ -2394,7 +4024,7 @@
       </p:sp>
       <p:sp>
         <p:nvSpPr>
-          <p:cNvPr id="52" name="Line 15"/>
+          <p:cNvPr id="90" name="Line 15"/>
           <p:cNvSpPr/>
           <p:nvPr/>
         </p:nvSpPr>
@@ -2423,14 +4053,14 @@
       </p:sp>
       <p:sp>
         <p:nvSpPr>
-          <p:cNvPr id="53" name="CustomShape 16"/>
+          <p:cNvPr id="91" name="CustomShape 16"/>
           <p:cNvSpPr/>
           <p:nvPr/>
         </p:nvSpPr>
         <p:spPr>
           <a:xfrm flipH="1" rot="16305600">
-            <a:off x="1412280" y="3830040"/>
-            <a:ext cx="3122280" cy="288000"/>
+            <a:off x="1411920" y="3830040"/>
+            <a:ext cx="3121920" cy="287280"/>
           </a:xfrm>
           <a:custGeom>
             <a:avLst/>
@@ -2484,14 +4114,14 @@
       </p:sp>
       <p:sp>
         <p:nvSpPr>
-          <p:cNvPr id="54" name="CustomShape 17"/>
+          <p:cNvPr id="92" name="CustomShape 17"/>
           <p:cNvSpPr/>
           <p:nvPr/>
         </p:nvSpPr>
         <p:spPr>
           <a:xfrm>
             <a:off x="1682280" y="655920"/>
-            <a:ext cx="2284200" cy="1414440"/>
+            <a:ext cx="2283840" cy="1414080"/>
           </a:xfrm>
           <a:prstGeom prst="roundRect">
             <a:avLst>
@@ -2545,14 +4175,14 @@
       </p:sp>
       <p:sp>
         <p:nvSpPr>
-          <p:cNvPr id="55" name="CustomShape 18"/>
+          <p:cNvPr id="93" name="CustomShape 18"/>
           <p:cNvSpPr/>
           <p:nvPr/>
         </p:nvSpPr>
         <p:spPr>
           <a:xfrm>
             <a:off x="162720" y="2683440"/>
-            <a:ext cx="1060200" cy="987480"/>
+            <a:ext cx="1059840" cy="987120"/>
           </a:xfrm>
           <a:prstGeom prst="roundRect">
             <a:avLst>
@@ -2610,14 +4240,14 @@
       </p:sp>
       <p:sp>
         <p:nvSpPr>
-          <p:cNvPr id="56" name="CustomShape 19"/>
+          <p:cNvPr id="94" name="CustomShape 19"/>
           <p:cNvSpPr/>
           <p:nvPr/>
         </p:nvSpPr>
         <p:spPr>
           <a:xfrm>
             <a:off x="1368000" y="2664000"/>
-            <a:ext cx="1222920" cy="987480"/>
+            <a:ext cx="1222560" cy="987120"/>
           </a:xfrm>
           <a:prstGeom prst="roundRect">
             <a:avLst>
@@ -2675,7 +4305,7 @@
       </p:sp>
       <p:sp>
         <p:nvSpPr>
-          <p:cNvPr id="57" name="Line 20"/>
+          <p:cNvPr id="95" name="Line 20"/>
           <p:cNvSpPr/>
           <p:nvPr/>
         </p:nvSpPr>
@@ -2704,7 +4334,7 @@
       </p:sp>
       <p:sp>
         <p:nvSpPr>
-          <p:cNvPr id="58" name="Line 21"/>
+          <p:cNvPr id="96" name="Line 21"/>
           <p:cNvSpPr/>
           <p:nvPr/>
         </p:nvSpPr>
@@ -2733,14 +4363,14 @@
       </p:sp>
       <p:sp>
         <p:nvSpPr>
-          <p:cNvPr id="59" name="CustomShape 22"/>
+          <p:cNvPr id="97" name="CustomShape 22"/>
           <p:cNvSpPr/>
           <p:nvPr/>
         </p:nvSpPr>
         <p:spPr>
           <a:xfrm>
             <a:off x="5040000" y="541080"/>
-            <a:ext cx="2232000" cy="912960"/>
+            <a:ext cx="2231640" cy="912600"/>
           </a:xfrm>
           <a:prstGeom prst="rect">
             <a:avLst/>
@@ -2826,14 +4456,14 @@
       </p:sp>
       <p:sp>
         <p:nvSpPr>
-          <p:cNvPr id="60" name="CustomShape 23"/>
+          <p:cNvPr id="98" name="CustomShape 23"/>
           <p:cNvSpPr/>
           <p:nvPr/>
         </p:nvSpPr>
         <p:spPr>
           <a:xfrm>
             <a:off x="1512000" y="4329720"/>
-            <a:ext cx="1224000" cy="638280"/>
+            <a:ext cx="1223640" cy="638280"/>
           </a:xfrm>
           <a:prstGeom prst="rect">
             <a:avLst/>
@@ -2909,14 +4539,14 @@
       </p:grpSpPr>
       <p:sp>
         <p:nvSpPr>
-          <p:cNvPr id="61" name="CustomShape 1"/>
+          <p:cNvPr id="99" name="CustomShape 1"/>
           <p:cNvSpPr/>
           <p:nvPr/>
         </p:nvSpPr>
         <p:spPr>
           <a:xfrm>
             <a:off x="10584000" y="4700160"/>
-            <a:ext cx="1492920" cy="987480"/>
+            <a:ext cx="1492560" cy="987120"/>
           </a:xfrm>
           <a:prstGeom prst="roundRect">
             <a:avLst>
@@ -2974,14 +4604,14 @@
       </p:sp>
       <p:sp>
         <p:nvSpPr>
-          <p:cNvPr id="62" name="CustomShape 2"/>
+          <p:cNvPr id="100" name="CustomShape 2"/>
           <p:cNvSpPr/>
           <p:nvPr/>
         </p:nvSpPr>
         <p:spPr>
           <a:xfrm>
             <a:off x="10410840" y="4484160"/>
-            <a:ext cx="1492920" cy="987480"/>
+            <a:ext cx="1492560" cy="987120"/>
           </a:xfrm>
           <a:prstGeom prst="roundRect">
             <a:avLst>
@@ -3039,14 +4669,14 @@
       </p:sp>
       <p:sp>
         <p:nvSpPr>
-          <p:cNvPr id="63" name="CustomShape 3"/>
+          <p:cNvPr id="101" name="CustomShape 3"/>
           <p:cNvSpPr/>
           <p:nvPr/>
         </p:nvSpPr>
         <p:spPr>
           <a:xfrm>
             <a:off x="72000" y="81000"/>
-            <a:ext cx="2232000" cy="363960"/>
+            <a:ext cx="2231640" cy="363960"/>
           </a:xfrm>
           <a:prstGeom prst="rect">
             <a:avLst/>
@@ -3092,14 +4722,14 @@
       </p:sp>
       <p:sp>
         <p:nvSpPr>
-          <p:cNvPr id="64" name="CustomShape 4"/>
+          <p:cNvPr id="102" name="CustomShape 4"/>
           <p:cNvSpPr/>
           <p:nvPr/>
         </p:nvSpPr>
         <p:spPr>
           <a:xfrm>
             <a:off x="3132000" y="792000"/>
-            <a:ext cx="5327640" cy="5471640"/>
+            <a:ext cx="5327280" cy="5471280"/>
           </a:xfrm>
           <a:prstGeom prst="roundRect">
             <a:avLst>
@@ -3151,14 +4781,14 @@
       </p:sp>
       <p:sp>
         <p:nvSpPr>
-          <p:cNvPr id="65" name="CustomShape 5"/>
+          <p:cNvPr id="103" name="CustomShape 5"/>
           <p:cNvSpPr/>
           <p:nvPr/>
         </p:nvSpPr>
         <p:spPr>
           <a:xfrm>
             <a:off x="144000" y="3043800"/>
-            <a:ext cx="1492920" cy="987480"/>
+            <a:ext cx="1492560" cy="987120"/>
           </a:xfrm>
           <a:prstGeom prst="roundRect">
             <a:avLst>
@@ -3216,7 +4846,7 @@
       </p:sp>
       <p:pic>
         <p:nvPicPr>
-          <p:cNvPr id="66" name="" descr=""/>
+          <p:cNvPr id="104" name="" descr=""/>
           <p:cNvPicPr/>
           <p:nvPr/>
         </p:nvPicPr>
@@ -3229,7 +4859,7 @@
         <p:spPr>
           <a:xfrm>
             <a:off x="1548000" y="2736000"/>
-            <a:ext cx="3995640" cy="2673000"/>
+            <a:ext cx="3995280" cy="2672640"/>
           </a:xfrm>
           <a:prstGeom prst="rect">
             <a:avLst/>
@@ -3241,14 +4871,14 @@
       </p:pic>
       <p:sp>
         <p:nvSpPr>
-          <p:cNvPr id="67" name="CustomShape 6"/>
+          <p:cNvPr id="105" name="CustomShape 6"/>
           <p:cNvSpPr/>
           <p:nvPr/>
         </p:nvSpPr>
         <p:spPr>
           <a:xfrm>
             <a:off x="144360" y="4196160"/>
-            <a:ext cx="1636560" cy="987480"/>
+            <a:ext cx="1636200" cy="987120"/>
           </a:xfrm>
           <a:prstGeom prst="roundRect">
             <a:avLst>
@@ -3306,14 +4936,14 @@
       </p:sp>
       <p:sp>
         <p:nvSpPr>
-          <p:cNvPr id="68" name="CustomShape 7"/>
+          <p:cNvPr id="106" name="CustomShape 7"/>
           <p:cNvSpPr/>
           <p:nvPr/>
         </p:nvSpPr>
         <p:spPr>
           <a:xfrm>
             <a:off x="5669280" y="2520000"/>
-            <a:ext cx="2538360" cy="1512000"/>
+            <a:ext cx="2538000" cy="1511640"/>
           </a:xfrm>
           <a:prstGeom prst="rect">
             <a:avLst/>
@@ -3348,7 +4978,11 @@
             </a:pPr>
             <a:r>
               <a:rPr b="0" lang="sv-SE" sz="1800" spc="-1" strike="noStrike">
+                <a:solidFill>
+                  <a:srgbClr val="000000"/>
+                </a:solidFill>
                 <a:latin typeface="Arial"/>
+                <a:ea typeface="DejaVu Sans"/>
               </a:rPr>
               <a:t>Filtering</a:t>
             </a:r>
@@ -3364,7 +4998,11 @@
             </a:pPr>
             <a:r>
               <a:rPr b="0" lang="sv-SE" sz="1800" spc="-1" strike="noStrike">
+                <a:solidFill>
+                  <a:srgbClr val="000000"/>
+                </a:solidFill>
                 <a:latin typeface="Arial"/>
+                <a:ea typeface="DejaVu Sans"/>
               </a:rPr>
               <a:t>Data transformation</a:t>
             </a:r>
@@ -3380,7 +5018,11 @@
             </a:pPr>
             <a:r>
               <a:rPr b="0" lang="sv-SE" sz="1800" spc="-1" strike="noStrike">
+                <a:solidFill>
+                  <a:srgbClr val="000000"/>
+                </a:solidFill>
                 <a:latin typeface="Arial"/>
+                <a:ea typeface="DejaVu Sans"/>
               </a:rPr>
               <a:t>Data aggregation</a:t>
             </a:r>
@@ -3396,7 +5038,11 @@
             </a:pPr>
             <a:r>
               <a:rPr b="0" lang="sv-SE" sz="1800" spc="-1" strike="noStrike">
+                <a:solidFill>
+                  <a:srgbClr val="000000"/>
+                </a:solidFill>
                 <a:latin typeface="Arial"/>
+                <a:ea typeface="DejaVu Sans"/>
               </a:rPr>
               <a:t>(per Job)</a:t>
             </a:r>
@@ -3408,7 +5054,7 @@
       </p:sp>
       <p:pic>
         <p:nvPicPr>
-          <p:cNvPr id="69" name="" descr=""/>
+          <p:cNvPr id="107" name="" descr=""/>
           <p:cNvPicPr/>
           <p:nvPr/>
         </p:nvPicPr>
@@ -3421,7 +5067,7 @@
         <p:spPr>
           <a:xfrm>
             <a:off x="8208000" y="2880720"/>
-            <a:ext cx="1955520" cy="430920"/>
+            <a:ext cx="1955160" cy="430560"/>
           </a:xfrm>
           <a:prstGeom prst="rect">
             <a:avLst/>
@@ -3433,7 +5079,7 @@
       </p:pic>
       <p:pic>
         <p:nvPicPr>
-          <p:cNvPr id="70" name="" descr=""/>
+          <p:cNvPr id="108" name="" descr=""/>
           <p:cNvPicPr/>
           <p:nvPr/>
         </p:nvPicPr>
@@ -3446,7 +5092,7 @@
         <p:spPr>
           <a:xfrm>
             <a:off x="8268120" y="4536720"/>
-            <a:ext cx="1955520" cy="430920"/>
+            <a:ext cx="1955160" cy="430560"/>
           </a:xfrm>
           <a:prstGeom prst="rect">
             <a:avLst/>
@@ -3458,14 +5104,14 @@
       </p:pic>
       <p:sp>
         <p:nvSpPr>
-          <p:cNvPr id="71" name="CustomShape 8"/>
+          <p:cNvPr id="109" name="CustomShape 8"/>
           <p:cNvSpPr/>
           <p:nvPr/>
         </p:nvSpPr>
         <p:spPr>
           <a:xfrm>
             <a:off x="8639640" y="2443320"/>
-            <a:ext cx="2232000" cy="364320"/>
+            <a:ext cx="2231640" cy="363960"/>
           </a:xfrm>
           <a:prstGeom prst="rect">
             <a:avLst/>
@@ -3511,14 +5157,14 @@
       </p:sp>
       <p:sp>
         <p:nvSpPr>
-          <p:cNvPr id="72" name="CustomShape 9"/>
+          <p:cNvPr id="110" name="CustomShape 9"/>
           <p:cNvSpPr/>
           <p:nvPr/>
         </p:nvSpPr>
         <p:spPr>
           <a:xfrm>
             <a:off x="10152000" y="2592000"/>
-            <a:ext cx="1492920" cy="987480"/>
+            <a:ext cx="1492560" cy="987120"/>
           </a:xfrm>
           <a:prstGeom prst="roundRect">
             <a:avLst>
@@ -3596,14 +5242,14 @@
       </p:sp>
       <p:sp>
         <p:nvSpPr>
-          <p:cNvPr id="73" name="CustomShape 10"/>
+          <p:cNvPr id="111" name="CustomShape 10"/>
           <p:cNvSpPr/>
           <p:nvPr/>
         </p:nvSpPr>
         <p:spPr>
           <a:xfrm>
             <a:off x="8639640" y="4207320"/>
-            <a:ext cx="2232000" cy="364320"/>
+            <a:ext cx="2231640" cy="363960"/>
           </a:xfrm>
           <a:prstGeom prst="rect">
             <a:avLst/>
@@ -3649,14 +5295,14 @@
       </p:sp>
       <p:sp>
         <p:nvSpPr>
-          <p:cNvPr id="74" name="CustomShape 11"/>
+          <p:cNvPr id="112" name="CustomShape 11"/>
           <p:cNvSpPr/>
           <p:nvPr/>
         </p:nvSpPr>
         <p:spPr>
           <a:xfrm>
             <a:off x="10224000" y="4248000"/>
-            <a:ext cx="1492920" cy="987480"/>
+            <a:ext cx="1492560" cy="987120"/>
           </a:xfrm>
           <a:prstGeom prst="roundRect">
             <a:avLst>
@@ -3714,14 +5360,14 @@
       </p:sp>
       <p:sp>
         <p:nvSpPr>
-          <p:cNvPr id="75" name="CustomShape 12"/>
+          <p:cNvPr id="113" name="CustomShape 12"/>
           <p:cNvSpPr/>
           <p:nvPr/>
         </p:nvSpPr>
         <p:spPr>
           <a:xfrm>
             <a:off x="3671640" y="936000"/>
-            <a:ext cx="2232000" cy="363960"/>
+            <a:ext cx="2231640" cy="363960"/>
           </a:xfrm>
           <a:prstGeom prst="rect">
             <a:avLst/>
@@ -3767,14 +5413,14 @@
       </p:sp>
       <p:sp>
         <p:nvSpPr>
-          <p:cNvPr id="76" name="CustomShape 13"/>
+          <p:cNvPr id="114" name="CustomShape 13"/>
           <p:cNvSpPr/>
           <p:nvPr/>
         </p:nvSpPr>
         <p:spPr>
           <a:xfrm>
             <a:off x="5669280" y="4104000"/>
-            <a:ext cx="2538360" cy="1512000"/>
+            <a:ext cx="2538000" cy="1511640"/>
           </a:xfrm>
           <a:prstGeom prst="rect">
             <a:avLst/>
@@ -3809,7 +5455,11 @@
             </a:pPr>
             <a:r>
               <a:rPr b="0" lang="sv-SE" sz="1800" spc="-1" strike="noStrike">
+                <a:solidFill>
+                  <a:srgbClr val="000000"/>
+                </a:solidFill>
                 <a:latin typeface="Arial"/>
+                <a:ea typeface="DejaVu Sans"/>
               </a:rPr>
               <a:t>Filtering</a:t>
             </a:r>
@@ -3825,7 +5475,11 @@
             </a:pPr>
             <a:r>
               <a:rPr b="0" lang="sv-SE" sz="1800" spc="-1" strike="noStrike">
+                <a:solidFill>
+                  <a:srgbClr val="000000"/>
+                </a:solidFill>
                 <a:latin typeface="Arial"/>
+                <a:ea typeface="DejaVu Sans"/>
               </a:rPr>
               <a:t>Data transformation</a:t>
             </a:r>
@@ -3841,7 +5495,11 @@
             </a:pPr>
             <a:r>
               <a:rPr b="0" lang="sv-SE" sz="1800" spc="-1" strike="noStrike">
+                <a:solidFill>
+                  <a:srgbClr val="000000"/>
+                </a:solidFill>
                 <a:latin typeface="Arial"/>
+                <a:ea typeface="DejaVu Sans"/>
               </a:rPr>
               <a:t>Data aggregation</a:t>
             </a:r>
@@ -3857,7 +5515,11 @@
             </a:pPr>
             <a:r>
               <a:rPr b="0" lang="sv-SE" sz="1800" spc="-1" strike="noStrike">
+                <a:solidFill>
+                  <a:srgbClr val="000000"/>
+                </a:solidFill>
                 <a:latin typeface="Arial"/>
+                <a:ea typeface="DejaVu Sans"/>
               </a:rPr>
               <a:t>(per Job)</a:t>
             </a:r>
@@ -3901,6 +5563,1767 @@
           <a:chExt cx="0" cy="0"/>
         </a:xfrm>
       </p:grpSpPr>
+      <p:sp>
+        <p:nvSpPr>
+          <p:cNvPr id="115" name="CustomShape 1"/>
+          <p:cNvSpPr/>
+          <p:nvPr/>
+        </p:nvSpPr>
+        <p:spPr>
+          <a:xfrm>
+            <a:off x="9631080" y="271800"/>
+            <a:ext cx="1994400" cy="985680"/>
+          </a:xfrm>
+          <a:prstGeom prst="roundRect">
+            <a:avLst>
+              <a:gd name="adj" fmla="val 16667"/>
+            </a:avLst>
+          </a:prstGeom>
+          <a:solidFill>
+            <a:srgbClr val="7030a0"/>
+          </a:solidFill>
+          <a:ln>
+            <a:solidFill>
+              <a:srgbClr val="7030a0"/>
+            </a:solidFill>
+          </a:ln>
+        </p:spPr>
+        <p:style>
+          <a:lnRef idx="2">
+            <a:schemeClr val="accent1">
+              <a:shade val="50000"/>
+            </a:schemeClr>
+          </a:lnRef>
+          <a:fillRef idx="1">
+            <a:schemeClr val="accent1"/>
+          </a:fillRef>
+          <a:effectRef idx="0">
+            <a:schemeClr val="accent1"/>
+          </a:effectRef>
+          <a:fontRef idx="minor"/>
+        </p:style>
+        <p:txBody>
+          <a:bodyPr lIns="90000" rIns="90000" tIns="45000" bIns="45000" anchor="ctr">
+            <a:noAutofit/>
+          </a:bodyPr>
+          <a:p>
+            <a:pPr algn="ctr">
+              <a:lnSpc>
+                <a:spcPct val="100000"/>
+              </a:lnSpc>
+            </a:pPr>
+            <a:r>
+              <a:rPr b="0" lang="sv-SE" sz="1800" spc="-1" strike="noStrike">
+                <a:solidFill>
+                  <a:srgbClr val="ffffff"/>
+                </a:solidFill>
+                <a:latin typeface="Calibri"/>
+                <a:ea typeface="DejaVu Sans"/>
+              </a:rPr>
+              <a:t>PM Data Consumer</a:t>
+            </a:r>
+            <a:endParaRPr b="0" lang="sv-SE" sz="1800" spc="-1" strike="noStrike">
+              <a:latin typeface="Arial"/>
+            </a:endParaRPr>
+          </a:p>
+        </p:txBody>
+      </p:sp>
+      <p:sp>
+        <p:nvSpPr>
+          <p:cNvPr id="116" name="CustomShape 2"/>
+          <p:cNvSpPr/>
+          <p:nvPr/>
+        </p:nvSpPr>
+        <p:spPr>
+          <a:xfrm>
+            <a:off x="2844000" y="127800"/>
+            <a:ext cx="4101480" cy="4657680"/>
+          </a:xfrm>
+          <a:prstGeom prst="roundRect">
+            <a:avLst>
+              <a:gd name="adj" fmla="val 16667"/>
+            </a:avLst>
+          </a:prstGeom>
+          <a:solidFill>
+            <a:srgbClr val="7030a0"/>
+          </a:solidFill>
+          <a:ln>
+            <a:solidFill>
+              <a:srgbClr val="7030a0"/>
+            </a:solidFill>
+          </a:ln>
+        </p:spPr>
+        <p:style>
+          <a:lnRef idx="2">
+            <a:schemeClr val="accent1">
+              <a:shade val="50000"/>
+            </a:schemeClr>
+          </a:lnRef>
+          <a:fillRef idx="1">
+            <a:schemeClr val="accent1"/>
+          </a:fillRef>
+          <a:effectRef idx="0">
+            <a:schemeClr val="accent1"/>
+          </a:effectRef>
+          <a:fontRef idx="minor"/>
+        </p:style>
+      </p:sp>
+      <p:sp>
+        <p:nvSpPr>
+          <p:cNvPr id="117" name="CustomShape 3"/>
+          <p:cNvSpPr/>
+          <p:nvPr/>
+        </p:nvSpPr>
+        <p:spPr>
+          <a:xfrm>
+            <a:off x="9775080" y="1927800"/>
+            <a:ext cx="1994400" cy="985680"/>
+          </a:xfrm>
+          <a:prstGeom prst="roundRect">
+            <a:avLst>
+              <a:gd name="adj" fmla="val 16667"/>
+            </a:avLst>
+          </a:prstGeom>
+          <a:solidFill>
+            <a:srgbClr val="7030a0"/>
+          </a:solidFill>
+          <a:ln>
+            <a:solidFill>
+              <a:srgbClr val="7030a0"/>
+            </a:solidFill>
+          </a:ln>
+        </p:spPr>
+        <p:style>
+          <a:lnRef idx="2">
+            <a:schemeClr val="accent1">
+              <a:shade val="50000"/>
+            </a:schemeClr>
+          </a:lnRef>
+          <a:fillRef idx="1">
+            <a:schemeClr val="accent1"/>
+          </a:fillRef>
+          <a:effectRef idx="0">
+            <a:schemeClr val="accent1"/>
+          </a:effectRef>
+          <a:fontRef idx="minor"/>
+        </p:style>
+        <p:txBody>
+          <a:bodyPr lIns="90000" rIns="90000" tIns="45000" bIns="45000" anchor="ctr">
+            <a:noAutofit/>
+          </a:bodyPr>
+          <a:p>
+            <a:pPr algn="ctr">
+              <a:lnSpc>
+                <a:spcPct val="100000"/>
+              </a:lnSpc>
+            </a:pPr>
+            <a:r>
+              <a:rPr b="0" lang="sv-SE" sz="1800" spc="-1" strike="noStrike">
+                <a:solidFill>
+                  <a:srgbClr val="ffffff"/>
+                </a:solidFill>
+                <a:latin typeface="Calibri"/>
+                <a:ea typeface="DejaVu Sans"/>
+              </a:rPr>
+              <a:t>PM Data Consumer</a:t>
+            </a:r>
+            <a:endParaRPr b="0" lang="sv-SE" sz="1800" spc="-1" strike="noStrike">
+              <a:latin typeface="Arial"/>
+            </a:endParaRPr>
+          </a:p>
+        </p:txBody>
+      </p:sp>
+      <p:sp>
+        <p:nvSpPr>
+          <p:cNvPr id="118" name="CustomShape 4"/>
+          <p:cNvSpPr/>
+          <p:nvPr/>
+        </p:nvSpPr>
+        <p:spPr>
+          <a:xfrm>
+            <a:off x="9703080" y="3511800"/>
+            <a:ext cx="1994400" cy="985680"/>
+          </a:xfrm>
+          <a:prstGeom prst="roundRect">
+            <a:avLst>
+              <a:gd name="adj" fmla="val 16667"/>
+            </a:avLst>
+          </a:prstGeom>
+          <a:solidFill>
+            <a:srgbClr val="7030a0"/>
+          </a:solidFill>
+          <a:ln>
+            <a:solidFill>
+              <a:srgbClr val="7030a0"/>
+            </a:solidFill>
+          </a:ln>
+        </p:spPr>
+        <p:style>
+          <a:lnRef idx="2">
+            <a:schemeClr val="accent1">
+              <a:shade val="50000"/>
+            </a:schemeClr>
+          </a:lnRef>
+          <a:fillRef idx="1">
+            <a:schemeClr val="accent1"/>
+          </a:fillRef>
+          <a:effectRef idx="0">
+            <a:schemeClr val="accent1"/>
+          </a:effectRef>
+          <a:fontRef idx="minor"/>
+        </p:style>
+        <p:txBody>
+          <a:bodyPr lIns="90000" rIns="90000" tIns="45000" bIns="45000" anchor="ctr">
+            <a:noAutofit/>
+          </a:bodyPr>
+          <a:p>
+            <a:pPr algn="ctr">
+              <a:lnSpc>
+                <a:spcPct val="100000"/>
+              </a:lnSpc>
+            </a:pPr>
+            <a:r>
+              <a:rPr b="0" lang="sv-SE" sz="1800" spc="-1" strike="noStrike">
+                <a:solidFill>
+                  <a:srgbClr val="ffffff"/>
+                </a:solidFill>
+                <a:latin typeface="Calibri"/>
+                <a:ea typeface="DejaVu Sans"/>
+              </a:rPr>
+              <a:t>PM Data Consumer</a:t>
+            </a:r>
+            <a:endParaRPr b="0" lang="sv-SE" sz="1800" spc="-1" strike="noStrike">
+              <a:latin typeface="Arial"/>
+            </a:endParaRPr>
+          </a:p>
+        </p:txBody>
+      </p:sp>
+      <p:sp>
+        <p:nvSpPr>
+          <p:cNvPr id="119" name="CustomShape 5"/>
+          <p:cNvSpPr/>
+          <p:nvPr/>
+        </p:nvSpPr>
+        <p:spPr>
+          <a:xfrm>
+            <a:off x="7650360" y="180000"/>
+            <a:ext cx="1455120" cy="1182960"/>
+          </a:xfrm>
+          <a:prstGeom prst="rect">
+            <a:avLst/>
+          </a:prstGeom>
+          <a:blipFill rotWithShape="0">
+            <a:blip r:embed="rId1"/>
+            <a:stretch>
+              <a:fillRect/>
+            </a:stretch>
+          </a:blipFill>
+          <a:ln>
+            <a:noFill/>
+          </a:ln>
+        </p:spPr>
+        <p:style>
+          <a:lnRef idx="0"/>
+          <a:fillRef idx="0"/>
+          <a:effectRef idx="0"/>
+          <a:fontRef idx="minor"/>
+        </p:style>
+        <p:txBody>
+          <a:bodyPr lIns="0" rIns="0" tIns="45000" bIns="45000" anchor="ctr" anchorCtr="1">
+            <a:noAutofit/>
+          </a:bodyPr>
+          <a:p>
+            <a:pPr algn="ctr">
+              <a:lnSpc>
+                <a:spcPct val="100000"/>
+              </a:lnSpc>
+            </a:pPr>
+            <a:r>
+              <a:rPr b="0" lang="sv-SE" sz="1800" spc="-1" strike="noStrike">
+                <a:solidFill>
+                  <a:srgbClr val="000000"/>
+                </a:solidFill>
+                <a:latin typeface="Arial"/>
+                <a:ea typeface="DejaVu Sans"/>
+              </a:rPr>
+              <a:t>Topic A</a:t>
+            </a:r>
+            <a:endParaRPr b="0" lang="sv-SE" sz="1800" spc="-1" strike="noStrike">
+              <a:latin typeface="Arial"/>
+            </a:endParaRPr>
+          </a:p>
+        </p:txBody>
+      </p:sp>
+      <p:sp>
+        <p:nvSpPr>
+          <p:cNvPr id="120" name="CustomShape 6"/>
+          <p:cNvSpPr/>
+          <p:nvPr/>
+        </p:nvSpPr>
+        <p:spPr>
+          <a:xfrm>
+            <a:off x="7578360" y="1764000"/>
+            <a:ext cx="1455120" cy="1182960"/>
+          </a:xfrm>
+          <a:prstGeom prst="rect">
+            <a:avLst/>
+          </a:prstGeom>
+          <a:blipFill rotWithShape="0">
+            <a:blip r:embed="rId2"/>
+            <a:stretch>
+              <a:fillRect/>
+            </a:stretch>
+          </a:blipFill>
+          <a:ln>
+            <a:noFill/>
+          </a:ln>
+        </p:spPr>
+        <p:style>
+          <a:lnRef idx="0"/>
+          <a:fillRef idx="0"/>
+          <a:effectRef idx="0"/>
+          <a:fontRef idx="minor"/>
+        </p:style>
+        <p:txBody>
+          <a:bodyPr lIns="0" rIns="0" tIns="45000" bIns="45000" anchor="ctr" anchorCtr="1">
+            <a:noAutofit/>
+          </a:bodyPr>
+          <a:p>
+            <a:pPr algn="ctr">
+              <a:lnSpc>
+                <a:spcPct val="100000"/>
+              </a:lnSpc>
+            </a:pPr>
+            <a:r>
+              <a:rPr b="0" lang="sv-SE" sz="1800" spc="-1" strike="noStrike">
+                <a:solidFill>
+                  <a:srgbClr val="000000"/>
+                </a:solidFill>
+                <a:latin typeface="Arial"/>
+                <a:ea typeface="DejaVu Sans"/>
+              </a:rPr>
+              <a:t>Topic C</a:t>
+            </a:r>
+            <a:endParaRPr b="0" lang="sv-SE" sz="1800" spc="-1" strike="noStrike">
+              <a:latin typeface="Arial"/>
+            </a:endParaRPr>
+          </a:p>
+        </p:txBody>
+      </p:sp>
+      <p:sp>
+        <p:nvSpPr>
+          <p:cNvPr id="121" name="CustomShape 7"/>
+          <p:cNvSpPr/>
+          <p:nvPr/>
+        </p:nvSpPr>
+        <p:spPr>
+          <a:xfrm>
+            <a:off x="7614720" y="3420360"/>
+            <a:ext cx="1455120" cy="1182960"/>
+          </a:xfrm>
+          <a:prstGeom prst="rect">
+            <a:avLst/>
+          </a:prstGeom>
+          <a:blipFill rotWithShape="0">
+            <a:blip r:embed="rId3"/>
+            <a:stretch>
+              <a:fillRect/>
+            </a:stretch>
+          </a:blipFill>
+          <a:ln>
+            <a:noFill/>
+          </a:ln>
+        </p:spPr>
+        <p:style>
+          <a:lnRef idx="0"/>
+          <a:fillRef idx="0"/>
+          <a:effectRef idx="0"/>
+          <a:fontRef idx="minor"/>
+        </p:style>
+        <p:txBody>
+          <a:bodyPr lIns="0" rIns="0" tIns="45000" bIns="45000" anchor="ctr" anchorCtr="1">
+            <a:noAutofit/>
+          </a:bodyPr>
+          <a:p>
+            <a:pPr algn="ctr">
+              <a:lnSpc>
+                <a:spcPct val="100000"/>
+              </a:lnSpc>
+            </a:pPr>
+            <a:r>
+              <a:rPr b="0" lang="sv-SE" sz="1800" spc="-1" strike="noStrike">
+                <a:solidFill>
+                  <a:srgbClr val="000000"/>
+                </a:solidFill>
+                <a:latin typeface="Arial"/>
+                <a:ea typeface="DejaVu Sans"/>
+              </a:rPr>
+              <a:t>Topic C</a:t>
+            </a:r>
+            <a:endParaRPr b="0" lang="sv-SE" sz="1800" spc="-1" strike="noStrike">
+              <a:latin typeface="Arial"/>
+            </a:endParaRPr>
+          </a:p>
+        </p:txBody>
+      </p:sp>
+      <p:sp>
+        <p:nvSpPr>
+          <p:cNvPr id="122" name="CustomShape 8"/>
+          <p:cNvSpPr/>
+          <p:nvPr/>
+        </p:nvSpPr>
+        <p:spPr>
+          <a:xfrm>
+            <a:off x="5195880" y="191880"/>
+            <a:ext cx="1461600" cy="1425600"/>
+          </a:xfrm>
+          <a:prstGeom prst="rect">
+            <a:avLst/>
+          </a:prstGeom>
+          <a:blipFill rotWithShape="0">
+            <a:blip r:embed="rId4"/>
+            <a:stretch>
+              <a:fillRect/>
+            </a:stretch>
+          </a:blipFill>
+          <a:ln>
+            <a:noFill/>
+          </a:ln>
+        </p:spPr>
+        <p:style>
+          <a:lnRef idx="0"/>
+          <a:fillRef idx="0"/>
+          <a:effectRef idx="0"/>
+          <a:fontRef idx="minor"/>
+        </p:style>
+        <p:txBody>
+          <a:bodyPr lIns="0" rIns="0" tIns="45000" bIns="45000" anchor="ctr" anchorCtr="1">
+            <a:noAutofit/>
+          </a:bodyPr>
+          <a:p>
+            <a:pPr algn="ctr">
+              <a:lnSpc>
+                <a:spcPct val="100000"/>
+              </a:lnSpc>
+            </a:pPr>
+            <a:r>
+              <a:rPr b="0" lang="sv-SE" sz="1800" spc="-1" strike="noStrike">
+                <a:solidFill>
+                  <a:srgbClr val="000000"/>
+                </a:solidFill>
+                <a:latin typeface="Arial"/>
+                <a:ea typeface="DejaVu Sans"/>
+              </a:rPr>
+              <a:t>Job 1</a:t>
+            </a:r>
+            <a:endParaRPr b="0" lang="sv-SE" sz="1800" spc="-1" strike="noStrike">
+              <a:latin typeface="Arial"/>
+            </a:endParaRPr>
+          </a:p>
+        </p:txBody>
+      </p:sp>
+      <p:sp>
+        <p:nvSpPr>
+          <p:cNvPr id="123" name="CustomShape 9"/>
+          <p:cNvSpPr/>
+          <p:nvPr/>
+        </p:nvSpPr>
+        <p:spPr>
+          <a:xfrm>
+            <a:off x="5220000" y="1703880"/>
+            <a:ext cx="1461600" cy="1425600"/>
+          </a:xfrm>
+          <a:prstGeom prst="rect">
+            <a:avLst/>
+          </a:prstGeom>
+          <a:blipFill rotWithShape="0">
+            <a:blip r:embed="rId5"/>
+            <a:stretch>
+              <a:fillRect/>
+            </a:stretch>
+          </a:blipFill>
+          <a:ln>
+            <a:noFill/>
+          </a:ln>
+        </p:spPr>
+        <p:style>
+          <a:lnRef idx="0"/>
+          <a:fillRef idx="0"/>
+          <a:effectRef idx="0"/>
+          <a:fontRef idx="minor"/>
+        </p:style>
+        <p:txBody>
+          <a:bodyPr lIns="0" rIns="0" tIns="45000" bIns="45000" anchor="ctr" anchorCtr="1">
+            <a:noAutofit/>
+          </a:bodyPr>
+          <a:p>
+            <a:pPr algn="ctr">
+              <a:lnSpc>
+                <a:spcPct val="100000"/>
+              </a:lnSpc>
+            </a:pPr>
+            <a:r>
+              <a:rPr b="0" lang="sv-SE" sz="1800" spc="-1" strike="noStrike">
+                <a:solidFill>
+                  <a:srgbClr val="000000"/>
+                </a:solidFill>
+                <a:latin typeface="Arial"/>
+                <a:ea typeface="DejaVu Sans"/>
+              </a:rPr>
+              <a:t>Job 2</a:t>
+            </a:r>
+            <a:endParaRPr b="0" lang="sv-SE" sz="1800" spc="-1" strike="noStrike">
+              <a:latin typeface="Arial"/>
+            </a:endParaRPr>
+          </a:p>
+        </p:txBody>
+      </p:sp>
+      <p:sp>
+        <p:nvSpPr>
+          <p:cNvPr id="124" name="CustomShape 10"/>
+          <p:cNvSpPr/>
+          <p:nvPr/>
+        </p:nvSpPr>
+        <p:spPr>
+          <a:xfrm>
+            <a:off x="5231880" y="3096000"/>
+            <a:ext cx="1461600" cy="1425600"/>
+          </a:xfrm>
+          <a:prstGeom prst="rect">
+            <a:avLst/>
+          </a:prstGeom>
+          <a:blipFill rotWithShape="0">
+            <a:blip r:embed="rId6"/>
+            <a:stretch>
+              <a:fillRect/>
+            </a:stretch>
+          </a:blipFill>
+          <a:ln>
+            <a:noFill/>
+          </a:ln>
+        </p:spPr>
+        <p:style>
+          <a:lnRef idx="0"/>
+          <a:fillRef idx="0"/>
+          <a:effectRef idx="0"/>
+          <a:fontRef idx="minor"/>
+        </p:style>
+        <p:txBody>
+          <a:bodyPr lIns="0" rIns="0" tIns="45000" bIns="45000" anchor="ctr" anchorCtr="1">
+            <a:noAutofit/>
+          </a:bodyPr>
+          <a:p>
+            <a:pPr algn="ctr">
+              <a:lnSpc>
+                <a:spcPct val="100000"/>
+              </a:lnSpc>
+            </a:pPr>
+            <a:r>
+              <a:rPr b="0" lang="sv-SE" sz="1800" spc="-1" strike="noStrike">
+                <a:solidFill>
+                  <a:srgbClr val="000000"/>
+                </a:solidFill>
+                <a:latin typeface="Arial"/>
+                <a:ea typeface="DejaVu Sans"/>
+              </a:rPr>
+              <a:t>Job 3</a:t>
+            </a:r>
+            <a:endParaRPr b="0" lang="sv-SE" sz="1800" spc="-1" strike="noStrike">
+              <a:latin typeface="Arial"/>
+            </a:endParaRPr>
+          </a:p>
+        </p:txBody>
+      </p:sp>
+      <p:sp>
+        <p:nvSpPr>
+          <p:cNvPr id="125" name="CustomShape 11"/>
+          <p:cNvSpPr/>
+          <p:nvPr/>
+        </p:nvSpPr>
+        <p:spPr>
+          <a:xfrm>
+            <a:off x="2969280" y="2844000"/>
+            <a:ext cx="2032200" cy="1725480"/>
+          </a:xfrm>
+          <a:prstGeom prst="rect">
+            <a:avLst/>
+          </a:prstGeom>
+          <a:blipFill rotWithShape="0">
+            <a:blip r:embed="rId7"/>
+            <a:stretch>
+              <a:fillRect/>
+            </a:stretch>
+          </a:blipFill>
+          <a:ln>
+            <a:noFill/>
+          </a:ln>
+        </p:spPr>
+        <p:style>
+          <a:lnRef idx="0"/>
+          <a:fillRef idx="0"/>
+          <a:effectRef idx="0"/>
+          <a:fontRef idx="minor"/>
+        </p:style>
+        <p:txBody>
+          <a:bodyPr lIns="0" rIns="0" tIns="45000" bIns="45000" anchor="ctr" anchorCtr="1">
+            <a:noAutofit/>
+          </a:bodyPr>
+          <a:p>
+            <a:pPr algn="ctr">
+              <a:lnSpc>
+                <a:spcPct val="100000"/>
+              </a:lnSpc>
+            </a:pPr>
+            <a:r>
+              <a:rPr b="0" lang="sv-SE" sz="1800" spc="-1" strike="noStrike">
+                <a:solidFill>
+                  <a:srgbClr val="000000"/>
+                </a:solidFill>
+                <a:latin typeface="Arial"/>
+                <a:ea typeface="DejaVu Sans"/>
+              </a:rPr>
+              <a:t>ROP File Data</a:t>
+            </a:r>
+            <a:endParaRPr b="0" lang="sv-SE" sz="1800" spc="-1" strike="noStrike">
+              <a:latin typeface="Arial"/>
+            </a:endParaRPr>
+          </a:p>
+        </p:txBody>
+      </p:sp>
+      <p:sp>
+        <p:nvSpPr>
+          <p:cNvPr id="126" name="CustomShape 12"/>
+          <p:cNvSpPr/>
+          <p:nvPr/>
+        </p:nvSpPr>
+        <p:spPr>
+          <a:xfrm>
+            <a:off x="10063080" y="4303800"/>
+            <a:ext cx="1994400" cy="985680"/>
+          </a:xfrm>
+          <a:prstGeom prst="roundRect">
+            <a:avLst>
+              <a:gd name="adj" fmla="val 16667"/>
+            </a:avLst>
+          </a:prstGeom>
+          <a:solidFill>
+            <a:srgbClr val="7030a0"/>
+          </a:solidFill>
+          <a:ln>
+            <a:solidFill>
+              <a:srgbClr val="7030a0"/>
+            </a:solidFill>
+          </a:ln>
+        </p:spPr>
+        <p:style>
+          <a:lnRef idx="2">
+            <a:schemeClr val="accent1">
+              <a:shade val="50000"/>
+            </a:schemeClr>
+          </a:lnRef>
+          <a:fillRef idx="1">
+            <a:schemeClr val="accent1"/>
+          </a:fillRef>
+          <a:effectRef idx="0">
+            <a:schemeClr val="accent1"/>
+          </a:effectRef>
+          <a:fontRef idx="minor"/>
+        </p:style>
+        <p:txBody>
+          <a:bodyPr lIns="90000" rIns="90000" tIns="45000" bIns="45000" anchor="ctr">
+            <a:noAutofit/>
+          </a:bodyPr>
+          <a:p>
+            <a:pPr algn="ctr">
+              <a:lnSpc>
+                <a:spcPct val="100000"/>
+              </a:lnSpc>
+            </a:pPr>
+            <a:r>
+              <a:rPr b="0" lang="sv-SE" sz="1800" spc="-1" strike="noStrike">
+                <a:solidFill>
+                  <a:srgbClr val="ffffff"/>
+                </a:solidFill>
+                <a:latin typeface="Calibri"/>
+                <a:ea typeface="DejaVu Sans"/>
+              </a:rPr>
+              <a:t>PM Data Consumer</a:t>
+            </a:r>
+            <a:endParaRPr b="0" lang="sv-SE" sz="1800" spc="-1" strike="noStrike">
+              <a:latin typeface="Arial"/>
+            </a:endParaRPr>
+          </a:p>
+        </p:txBody>
+      </p:sp>
+      <p:sp>
+        <p:nvSpPr>
+          <p:cNvPr id="127" name="CustomShape 13"/>
+          <p:cNvSpPr/>
+          <p:nvPr/>
+        </p:nvSpPr>
+        <p:spPr>
+          <a:xfrm>
+            <a:off x="2089800" y="6048000"/>
+            <a:ext cx="5325480" cy="458640"/>
+          </a:xfrm>
+          <a:prstGeom prst="roundRect">
+            <a:avLst>
+              <a:gd name="adj" fmla="val 16667"/>
+            </a:avLst>
+          </a:prstGeom>
+          <a:solidFill>
+            <a:srgbClr val="2a6099"/>
+          </a:solidFill>
+          <a:ln/>
+        </p:spPr>
+        <p:style>
+          <a:lnRef idx="2">
+            <a:schemeClr val="accent1">
+              <a:shade val="50000"/>
+            </a:schemeClr>
+          </a:lnRef>
+          <a:fillRef idx="1">
+            <a:schemeClr val="accent1"/>
+          </a:fillRef>
+          <a:effectRef idx="0">
+            <a:schemeClr val="accent1"/>
+          </a:effectRef>
+          <a:fontRef idx="minor"/>
+        </p:style>
+        <p:txBody>
+          <a:bodyPr lIns="90000" rIns="90000" tIns="45000" bIns="45000" anchor="ctr">
+            <a:noAutofit/>
+          </a:bodyPr>
+          <a:p>
+            <a:pPr algn="ctr">
+              <a:lnSpc>
+                <a:spcPct val="100000"/>
+              </a:lnSpc>
+            </a:pPr>
+            <a:r>
+              <a:rPr b="0" lang="sv-SE" sz="1800" spc="-1" strike="noStrike">
+                <a:solidFill>
+                  <a:srgbClr val="000000"/>
+                </a:solidFill>
+                <a:latin typeface="Arial"/>
+                <a:ea typeface="DejaVu Sans"/>
+              </a:rPr>
+              <a:t>PM Files Data Store</a:t>
+            </a:r>
+            <a:endParaRPr b="0" lang="sv-SE" sz="1800" spc="-1" strike="noStrike">
+              <a:latin typeface="Arial"/>
+            </a:endParaRPr>
+          </a:p>
+        </p:txBody>
+      </p:sp>
+      <p:sp>
+        <p:nvSpPr>
+          <p:cNvPr id="128" name="CustomShape 14"/>
+          <p:cNvSpPr/>
+          <p:nvPr/>
+        </p:nvSpPr>
+        <p:spPr>
+          <a:xfrm>
+            <a:off x="414360" y="1764000"/>
+            <a:ext cx="1455120" cy="1182960"/>
+          </a:xfrm>
+          <a:prstGeom prst="rect">
+            <a:avLst/>
+          </a:prstGeom>
+          <a:blipFill rotWithShape="0">
+            <a:blip r:embed="rId8"/>
+            <a:stretch>
+              <a:fillRect/>
+            </a:stretch>
+          </a:blipFill>
+          <a:ln>
+            <a:noFill/>
+          </a:ln>
+        </p:spPr>
+        <p:style>
+          <a:lnRef idx="0"/>
+          <a:fillRef idx="0"/>
+          <a:effectRef idx="0"/>
+          <a:fontRef idx="minor"/>
+        </p:style>
+        <p:txBody>
+          <a:bodyPr lIns="0" rIns="0" tIns="45000" bIns="45000" anchor="ctr" anchorCtr="1">
+            <a:noAutofit/>
+          </a:bodyPr>
+          <a:p>
+            <a:pPr algn="ctr">
+              <a:lnSpc>
+                <a:spcPct val="100000"/>
+              </a:lnSpc>
+            </a:pPr>
+            <a:r>
+              <a:rPr b="0" lang="sv-SE" sz="1800" spc="-1" strike="noStrike">
+                <a:solidFill>
+                  <a:srgbClr val="000000"/>
+                </a:solidFill>
+                <a:latin typeface="Arial"/>
+                <a:ea typeface="DejaVu Sans"/>
+              </a:rPr>
+              <a:t>File Ready</a:t>
+            </a:r>
+            <a:endParaRPr b="0" lang="sv-SE" sz="1800" spc="-1" strike="noStrike">
+              <a:latin typeface="Arial"/>
+            </a:endParaRPr>
+          </a:p>
+        </p:txBody>
+      </p:sp>
+      <p:pic>
+        <p:nvPicPr>
+          <p:cNvPr id="129" name="" descr=""/>
+          <p:cNvPicPr/>
+          <p:nvPr/>
+        </p:nvPicPr>
+        <p:blipFill>
+          <a:blip r:embed="rId9"/>
+          <a:stretch/>
+        </p:blipFill>
+        <p:spPr>
+          <a:xfrm>
+            <a:off x="3454920" y="4680000"/>
+            <a:ext cx="756360" cy="1367280"/>
+          </a:xfrm>
+          <a:prstGeom prst="rect">
+            <a:avLst/>
+          </a:prstGeom>
+          <a:ln>
+            <a:noFill/>
+          </a:ln>
+        </p:spPr>
+      </p:pic>
+      <p:sp>
+        <p:nvSpPr>
+          <p:cNvPr id="130" name="TextShape 15"/>
+          <p:cNvSpPr txBox="1"/>
+          <p:nvPr/>
+        </p:nvSpPr>
+        <p:spPr>
+          <a:xfrm>
+            <a:off x="792000" y="288000"/>
+            <a:ext cx="2016000" cy="346320"/>
+          </a:xfrm>
+          <a:prstGeom prst="rect">
+            <a:avLst/>
+          </a:prstGeom>
+          <a:noFill/>
+          <a:ln>
+            <a:noFill/>
+          </a:ln>
+        </p:spPr>
+      </p:sp>
+      <p:sp>
+        <p:nvSpPr>
+          <p:cNvPr id="131" name="TextShape 16"/>
+          <p:cNvSpPr txBox="1"/>
+          <p:nvPr/>
+        </p:nvSpPr>
+        <p:spPr>
+          <a:xfrm>
+            <a:off x="144000" y="648000"/>
+            <a:ext cx="2664000" cy="858240"/>
+          </a:xfrm>
+          <a:prstGeom prst="rect">
+            <a:avLst/>
+          </a:prstGeom>
+          <a:noFill/>
+          <a:ln>
+            <a:noFill/>
+          </a:ln>
+        </p:spPr>
+        <p:txBody>
+          <a:bodyPr lIns="90000" rIns="90000" tIns="45000" bIns="45000">
+            <a:noAutofit/>
+          </a:bodyPr>
+          <a:p>
+            <a:r>
+              <a:rPr b="0" lang="sv-SE" sz="1800" spc="-1" strike="noStrike">
+                <a:latin typeface="Arial"/>
+              </a:rPr>
+              <a:t>PM Data Filtering/multiplexing</a:t>
+            </a:r>
+            <a:endParaRPr b="0" lang="sv-SE" sz="1800" spc="-1" strike="noStrike">
+              <a:latin typeface="Arial"/>
+            </a:endParaRPr>
+          </a:p>
+        </p:txBody>
+      </p:sp>
+    </p:spTree>
+  </p:cSld>
+  <mc:AlternateContent>
+    <mc:Choice Requires="p14">
+      <p:transition spd="slow" p14:dur="2000"/>
+    </mc:Choice>
+    <mc:Fallback>
+      <p:transition spd="slow"/>
+    </mc:Fallback>
+  </mc:AlternateContent>
+</p:sld>
+</file>
+
+<file path=ppt/slides/slide4.xml><?xml version="1.0" encoding="utf-8"?>
+<p:sld xmlns:a="http://schemas.openxmlformats.org/drawingml/2006/main" xmlns:p="http://schemas.openxmlformats.org/presentationml/2006/main" xmlns:r="http://schemas.openxmlformats.org/officeDocument/2006/relationships" xmlns:p14="http://schemas.microsoft.com/office/powerpoint/2010/main" xmlns:p15="http://schemas.microsoft.com/office/powerpoint/2012/main" xmlns:mc="http://schemas.openxmlformats.org/markup-compatibility/2006">
+  <p:cSld>
+    <p:spTree>
+      <p:nvGrpSpPr>
+        <p:cNvPr id="1" name=""/>
+        <p:cNvGrpSpPr/>
+        <p:nvPr/>
+      </p:nvGrpSpPr>
+      <p:grpSpPr>
+        <a:xfrm>
+          <a:off x="0" y="0"/>
+          <a:ext cx="0" cy="0"/>
+          <a:chOff x="0" y="0"/>
+          <a:chExt cx="0" cy="0"/>
+        </a:xfrm>
+      </p:grpSpPr>
+      <p:sp>
+        <p:nvSpPr>
+          <p:cNvPr id="132" name="CustomShape 1"/>
+          <p:cNvSpPr/>
+          <p:nvPr/>
+        </p:nvSpPr>
+        <p:spPr>
+          <a:xfrm>
+            <a:off x="9631080" y="271800"/>
+            <a:ext cx="1994400" cy="985680"/>
+          </a:xfrm>
+          <a:prstGeom prst="roundRect">
+            <a:avLst>
+              <a:gd name="adj" fmla="val 16667"/>
+            </a:avLst>
+          </a:prstGeom>
+          <a:solidFill>
+            <a:srgbClr val="7030a0"/>
+          </a:solidFill>
+          <a:ln>
+            <a:solidFill>
+              <a:srgbClr val="7030a0"/>
+            </a:solidFill>
+          </a:ln>
+        </p:spPr>
+        <p:style>
+          <a:lnRef idx="2">
+            <a:schemeClr val="accent1">
+              <a:shade val="50000"/>
+            </a:schemeClr>
+          </a:lnRef>
+          <a:fillRef idx="1">
+            <a:schemeClr val="accent1"/>
+          </a:fillRef>
+          <a:effectRef idx="0">
+            <a:schemeClr val="accent1"/>
+          </a:effectRef>
+          <a:fontRef idx="minor"/>
+        </p:style>
+        <p:txBody>
+          <a:bodyPr lIns="90000" rIns="90000" tIns="45000" bIns="45000" anchor="ctr">
+            <a:noAutofit/>
+          </a:bodyPr>
+          <a:p>
+            <a:pPr algn="ctr">
+              <a:lnSpc>
+                <a:spcPct val="100000"/>
+              </a:lnSpc>
+            </a:pPr>
+            <a:r>
+              <a:rPr b="0" lang="sv-SE" sz="1800" spc="-1" strike="noStrike">
+                <a:solidFill>
+                  <a:srgbClr val="ffffff"/>
+                </a:solidFill>
+                <a:latin typeface="Calibri"/>
+                <a:ea typeface="DejaVu Sans"/>
+              </a:rPr>
+              <a:t>PM Data Consumer</a:t>
+            </a:r>
+            <a:endParaRPr b="0" lang="sv-SE" sz="1800" spc="-1" strike="noStrike">
+              <a:latin typeface="Arial"/>
+            </a:endParaRPr>
+          </a:p>
+        </p:txBody>
+      </p:sp>
+      <p:sp>
+        <p:nvSpPr>
+          <p:cNvPr id="133" name="CustomShape 2"/>
+          <p:cNvSpPr/>
+          <p:nvPr/>
+        </p:nvSpPr>
+        <p:spPr>
+          <a:xfrm>
+            <a:off x="2844000" y="127800"/>
+            <a:ext cx="5220000" cy="4657680"/>
+          </a:xfrm>
+          <a:prstGeom prst="roundRect">
+            <a:avLst>
+              <a:gd name="adj" fmla="val 16667"/>
+            </a:avLst>
+          </a:prstGeom>
+          <a:solidFill>
+            <a:srgbClr val="7030a0"/>
+          </a:solidFill>
+          <a:ln>
+            <a:solidFill>
+              <a:srgbClr val="7030a0"/>
+            </a:solidFill>
+          </a:ln>
+        </p:spPr>
+        <p:style>
+          <a:lnRef idx="2">
+            <a:schemeClr val="accent1">
+              <a:shade val="50000"/>
+            </a:schemeClr>
+          </a:lnRef>
+          <a:fillRef idx="1">
+            <a:schemeClr val="accent1"/>
+          </a:fillRef>
+          <a:effectRef idx="0">
+            <a:schemeClr val="accent1"/>
+          </a:effectRef>
+          <a:fontRef idx="minor"/>
+        </p:style>
+      </p:sp>
+      <p:sp>
+        <p:nvSpPr>
+          <p:cNvPr id="134" name="CustomShape 3"/>
+          <p:cNvSpPr/>
+          <p:nvPr/>
+        </p:nvSpPr>
+        <p:spPr>
+          <a:xfrm>
+            <a:off x="9775080" y="1927800"/>
+            <a:ext cx="1994400" cy="985680"/>
+          </a:xfrm>
+          <a:prstGeom prst="roundRect">
+            <a:avLst>
+              <a:gd name="adj" fmla="val 16667"/>
+            </a:avLst>
+          </a:prstGeom>
+          <a:solidFill>
+            <a:srgbClr val="7030a0"/>
+          </a:solidFill>
+          <a:ln>
+            <a:solidFill>
+              <a:srgbClr val="7030a0"/>
+            </a:solidFill>
+          </a:ln>
+        </p:spPr>
+        <p:style>
+          <a:lnRef idx="2">
+            <a:schemeClr val="accent1">
+              <a:shade val="50000"/>
+            </a:schemeClr>
+          </a:lnRef>
+          <a:fillRef idx="1">
+            <a:schemeClr val="accent1"/>
+          </a:fillRef>
+          <a:effectRef idx="0">
+            <a:schemeClr val="accent1"/>
+          </a:effectRef>
+          <a:fontRef idx="minor"/>
+        </p:style>
+        <p:txBody>
+          <a:bodyPr lIns="90000" rIns="90000" tIns="45000" bIns="45000" anchor="ctr">
+            <a:noAutofit/>
+          </a:bodyPr>
+          <a:p>
+            <a:pPr algn="ctr">
+              <a:lnSpc>
+                <a:spcPct val="100000"/>
+              </a:lnSpc>
+            </a:pPr>
+            <a:r>
+              <a:rPr b="0" lang="sv-SE" sz="1800" spc="-1" strike="noStrike">
+                <a:solidFill>
+                  <a:srgbClr val="ffffff"/>
+                </a:solidFill>
+                <a:latin typeface="Calibri"/>
+                <a:ea typeface="DejaVu Sans"/>
+              </a:rPr>
+              <a:t>PM Data Consumer</a:t>
+            </a:r>
+            <a:endParaRPr b="0" lang="sv-SE" sz="1800" spc="-1" strike="noStrike">
+              <a:latin typeface="Arial"/>
+            </a:endParaRPr>
+          </a:p>
+        </p:txBody>
+      </p:sp>
+      <p:sp>
+        <p:nvSpPr>
+          <p:cNvPr id="135" name="CustomShape 4"/>
+          <p:cNvSpPr/>
+          <p:nvPr/>
+        </p:nvSpPr>
+        <p:spPr>
+          <a:xfrm>
+            <a:off x="9703080" y="3511800"/>
+            <a:ext cx="1994400" cy="985680"/>
+          </a:xfrm>
+          <a:prstGeom prst="roundRect">
+            <a:avLst>
+              <a:gd name="adj" fmla="val 16667"/>
+            </a:avLst>
+          </a:prstGeom>
+          <a:solidFill>
+            <a:srgbClr val="7030a0"/>
+          </a:solidFill>
+          <a:ln>
+            <a:solidFill>
+              <a:srgbClr val="7030a0"/>
+            </a:solidFill>
+          </a:ln>
+        </p:spPr>
+        <p:style>
+          <a:lnRef idx="2">
+            <a:schemeClr val="accent1">
+              <a:shade val="50000"/>
+            </a:schemeClr>
+          </a:lnRef>
+          <a:fillRef idx="1">
+            <a:schemeClr val="accent1"/>
+          </a:fillRef>
+          <a:effectRef idx="0">
+            <a:schemeClr val="accent1"/>
+          </a:effectRef>
+          <a:fontRef idx="minor"/>
+        </p:style>
+        <p:txBody>
+          <a:bodyPr lIns="90000" rIns="90000" tIns="45000" bIns="45000" anchor="ctr">
+            <a:noAutofit/>
+          </a:bodyPr>
+          <a:p>
+            <a:pPr algn="ctr">
+              <a:lnSpc>
+                <a:spcPct val="100000"/>
+              </a:lnSpc>
+            </a:pPr>
+            <a:r>
+              <a:rPr b="0" lang="sv-SE" sz="1800" spc="-1" strike="noStrike">
+                <a:solidFill>
+                  <a:srgbClr val="ffffff"/>
+                </a:solidFill>
+                <a:latin typeface="Calibri"/>
+                <a:ea typeface="DejaVu Sans"/>
+              </a:rPr>
+              <a:t>PM Data Consumer</a:t>
+            </a:r>
+            <a:endParaRPr b="0" lang="sv-SE" sz="1800" spc="-1" strike="noStrike">
+              <a:latin typeface="Arial"/>
+            </a:endParaRPr>
+          </a:p>
+        </p:txBody>
+      </p:sp>
+      <p:sp>
+        <p:nvSpPr>
+          <p:cNvPr id="136" name="CustomShape 5"/>
+          <p:cNvSpPr/>
+          <p:nvPr/>
+        </p:nvSpPr>
+        <p:spPr>
+          <a:xfrm>
+            <a:off x="8192880" y="1841040"/>
+            <a:ext cx="1455120" cy="1182960"/>
+          </a:xfrm>
+          <a:prstGeom prst="rect">
+            <a:avLst/>
+          </a:prstGeom>
+          <a:blipFill rotWithShape="0">
+            <a:blip r:embed="rId1"/>
+            <a:stretch>
+              <a:fillRect/>
+            </a:stretch>
+          </a:blipFill>
+          <a:ln>
+            <a:noFill/>
+          </a:ln>
+        </p:spPr>
+        <p:style>
+          <a:lnRef idx="0"/>
+          <a:fillRef idx="0"/>
+          <a:effectRef idx="0"/>
+          <a:fontRef idx="minor"/>
+        </p:style>
+        <p:txBody>
+          <a:bodyPr lIns="0" rIns="0" tIns="45000" bIns="45000" anchor="ctr" anchorCtr="1">
+            <a:noAutofit/>
+          </a:bodyPr>
+          <a:p>
+            <a:pPr algn="ctr">
+              <a:lnSpc>
+                <a:spcPct val="100000"/>
+              </a:lnSpc>
+            </a:pPr>
+            <a:r>
+              <a:rPr b="0" lang="sv-SE" sz="1800" spc="-1" strike="noStrike">
+                <a:solidFill>
+                  <a:srgbClr val="000000"/>
+                </a:solidFill>
+                <a:latin typeface="Arial"/>
+                <a:ea typeface="DejaVu Sans"/>
+              </a:rPr>
+              <a:t>Topic A</a:t>
+            </a:r>
+            <a:endParaRPr b="0" lang="sv-SE" sz="1800" spc="-1" strike="noStrike">
+              <a:latin typeface="Arial"/>
+            </a:endParaRPr>
+          </a:p>
+        </p:txBody>
+      </p:sp>
+      <p:sp>
+        <p:nvSpPr>
+          <p:cNvPr id="137" name="CustomShape 6"/>
+          <p:cNvSpPr/>
+          <p:nvPr/>
+        </p:nvSpPr>
+        <p:spPr>
+          <a:xfrm>
+            <a:off x="5195880" y="191880"/>
+            <a:ext cx="1461600" cy="1425600"/>
+          </a:xfrm>
+          <a:prstGeom prst="rect">
+            <a:avLst/>
+          </a:prstGeom>
+          <a:blipFill rotWithShape="0">
+            <a:blip r:embed="rId2"/>
+            <a:stretch>
+              <a:fillRect/>
+            </a:stretch>
+          </a:blipFill>
+          <a:ln>
+            <a:noFill/>
+          </a:ln>
+        </p:spPr>
+        <p:style>
+          <a:lnRef idx="0"/>
+          <a:fillRef idx="0"/>
+          <a:effectRef idx="0"/>
+          <a:fontRef idx="minor"/>
+        </p:style>
+        <p:txBody>
+          <a:bodyPr lIns="0" rIns="0" tIns="45000" bIns="45000" anchor="ctr" anchorCtr="1">
+            <a:noAutofit/>
+          </a:bodyPr>
+          <a:p>
+            <a:pPr algn="ctr">
+              <a:lnSpc>
+                <a:spcPct val="100000"/>
+              </a:lnSpc>
+            </a:pPr>
+            <a:r>
+              <a:rPr b="0" lang="sv-SE" sz="1800" spc="-1" strike="noStrike">
+                <a:solidFill>
+                  <a:srgbClr val="000000"/>
+                </a:solidFill>
+                <a:latin typeface="Arial"/>
+                <a:ea typeface="DejaVu Sans"/>
+              </a:rPr>
+              <a:t>Job 1</a:t>
+            </a:r>
+            <a:endParaRPr b="0" lang="sv-SE" sz="1800" spc="-1" strike="noStrike">
+              <a:latin typeface="Arial"/>
+            </a:endParaRPr>
+          </a:p>
+        </p:txBody>
+      </p:sp>
+      <p:sp>
+        <p:nvSpPr>
+          <p:cNvPr id="138" name="CustomShape 7"/>
+          <p:cNvSpPr/>
+          <p:nvPr/>
+        </p:nvSpPr>
+        <p:spPr>
+          <a:xfrm>
+            <a:off x="5220000" y="1703880"/>
+            <a:ext cx="1461600" cy="1425600"/>
+          </a:xfrm>
+          <a:prstGeom prst="rect">
+            <a:avLst/>
+          </a:prstGeom>
+          <a:blipFill rotWithShape="0">
+            <a:blip r:embed="rId3"/>
+            <a:stretch>
+              <a:fillRect/>
+            </a:stretch>
+          </a:blipFill>
+          <a:ln>
+            <a:noFill/>
+          </a:ln>
+        </p:spPr>
+        <p:style>
+          <a:lnRef idx="0"/>
+          <a:fillRef idx="0"/>
+          <a:effectRef idx="0"/>
+          <a:fontRef idx="minor"/>
+        </p:style>
+        <p:txBody>
+          <a:bodyPr lIns="0" rIns="0" tIns="45000" bIns="45000" anchor="ctr" anchorCtr="1">
+            <a:noAutofit/>
+          </a:bodyPr>
+          <a:p>
+            <a:pPr algn="ctr">
+              <a:lnSpc>
+                <a:spcPct val="100000"/>
+              </a:lnSpc>
+            </a:pPr>
+            <a:r>
+              <a:rPr b="0" lang="sv-SE" sz="1800" spc="-1" strike="noStrike">
+                <a:solidFill>
+                  <a:srgbClr val="000000"/>
+                </a:solidFill>
+                <a:latin typeface="Arial"/>
+                <a:ea typeface="DejaVu Sans"/>
+              </a:rPr>
+              <a:t>Job 2</a:t>
+            </a:r>
+            <a:endParaRPr b="0" lang="sv-SE" sz="1800" spc="-1" strike="noStrike">
+              <a:latin typeface="Arial"/>
+            </a:endParaRPr>
+          </a:p>
+        </p:txBody>
+      </p:sp>
+      <p:sp>
+        <p:nvSpPr>
+          <p:cNvPr id="139" name="CustomShape 8"/>
+          <p:cNvSpPr/>
+          <p:nvPr/>
+        </p:nvSpPr>
+        <p:spPr>
+          <a:xfrm>
+            <a:off x="5231880" y="3096000"/>
+            <a:ext cx="1461600" cy="1425600"/>
+          </a:xfrm>
+          <a:prstGeom prst="rect">
+            <a:avLst/>
+          </a:prstGeom>
+          <a:blipFill rotWithShape="0">
+            <a:blip r:embed="rId4"/>
+            <a:stretch>
+              <a:fillRect/>
+            </a:stretch>
+          </a:blipFill>
+          <a:ln>
+            <a:noFill/>
+          </a:ln>
+        </p:spPr>
+        <p:style>
+          <a:lnRef idx="0"/>
+          <a:fillRef idx="0"/>
+          <a:effectRef idx="0"/>
+          <a:fontRef idx="minor"/>
+        </p:style>
+        <p:txBody>
+          <a:bodyPr lIns="0" rIns="0" tIns="45000" bIns="45000" anchor="ctr" anchorCtr="1">
+            <a:noAutofit/>
+          </a:bodyPr>
+          <a:p>
+            <a:pPr algn="ctr">
+              <a:lnSpc>
+                <a:spcPct val="100000"/>
+              </a:lnSpc>
+            </a:pPr>
+            <a:r>
+              <a:rPr b="0" lang="sv-SE" sz="1800" spc="-1" strike="noStrike">
+                <a:solidFill>
+                  <a:srgbClr val="000000"/>
+                </a:solidFill>
+                <a:latin typeface="Arial"/>
+                <a:ea typeface="DejaVu Sans"/>
+              </a:rPr>
+              <a:t>Job 3</a:t>
+            </a:r>
+            <a:endParaRPr b="0" lang="sv-SE" sz="1800" spc="-1" strike="noStrike">
+              <a:latin typeface="Arial"/>
+            </a:endParaRPr>
+          </a:p>
+        </p:txBody>
+      </p:sp>
+      <p:sp>
+        <p:nvSpPr>
+          <p:cNvPr id="140" name="CustomShape 9"/>
+          <p:cNvSpPr/>
+          <p:nvPr/>
+        </p:nvSpPr>
+        <p:spPr>
+          <a:xfrm>
+            <a:off x="2969280" y="2844000"/>
+            <a:ext cx="2032200" cy="1725480"/>
+          </a:xfrm>
+          <a:prstGeom prst="rect">
+            <a:avLst/>
+          </a:prstGeom>
+          <a:blipFill rotWithShape="0">
+            <a:blip r:embed="rId5"/>
+            <a:stretch>
+              <a:fillRect/>
+            </a:stretch>
+          </a:blipFill>
+          <a:ln>
+            <a:noFill/>
+          </a:ln>
+        </p:spPr>
+        <p:style>
+          <a:lnRef idx="0"/>
+          <a:fillRef idx="0"/>
+          <a:effectRef idx="0"/>
+          <a:fontRef idx="minor"/>
+        </p:style>
+        <p:txBody>
+          <a:bodyPr lIns="0" rIns="0" tIns="45000" bIns="45000" anchor="ctr" anchorCtr="1">
+            <a:noAutofit/>
+          </a:bodyPr>
+          <a:p>
+            <a:pPr algn="ctr">
+              <a:lnSpc>
+                <a:spcPct val="100000"/>
+              </a:lnSpc>
+            </a:pPr>
+            <a:r>
+              <a:rPr b="0" lang="sv-SE" sz="1800" spc="-1" strike="noStrike">
+                <a:solidFill>
+                  <a:srgbClr val="000000"/>
+                </a:solidFill>
+                <a:latin typeface="Arial"/>
+                <a:ea typeface="DejaVu Sans"/>
+              </a:rPr>
+              <a:t>ROP File Data</a:t>
+            </a:r>
+            <a:endParaRPr b="0" lang="sv-SE" sz="1800" spc="-1" strike="noStrike">
+              <a:latin typeface="Arial"/>
+            </a:endParaRPr>
+          </a:p>
+        </p:txBody>
+      </p:sp>
+      <p:sp>
+        <p:nvSpPr>
+          <p:cNvPr id="141" name="CustomShape 10"/>
+          <p:cNvSpPr/>
+          <p:nvPr/>
+        </p:nvSpPr>
+        <p:spPr>
+          <a:xfrm>
+            <a:off x="10063080" y="4303800"/>
+            <a:ext cx="1994400" cy="985680"/>
+          </a:xfrm>
+          <a:prstGeom prst="roundRect">
+            <a:avLst>
+              <a:gd name="adj" fmla="val 16667"/>
+            </a:avLst>
+          </a:prstGeom>
+          <a:solidFill>
+            <a:srgbClr val="7030a0"/>
+          </a:solidFill>
+          <a:ln>
+            <a:solidFill>
+              <a:srgbClr val="7030a0"/>
+            </a:solidFill>
+          </a:ln>
+        </p:spPr>
+        <p:style>
+          <a:lnRef idx="2">
+            <a:schemeClr val="accent1">
+              <a:shade val="50000"/>
+            </a:schemeClr>
+          </a:lnRef>
+          <a:fillRef idx="1">
+            <a:schemeClr val="accent1"/>
+          </a:fillRef>
+          <a:effectRef idx="0">
+            <a:schemeClr val="accent1"/>
+          </a:effectRef>
+          <a:fontRef idx="minor"/>
+        </p:style>
+        <p:txBody>
+          <a:bodyPr lIns="90000" rIns="90000" tIns="45000" bIns="45000" anchor="ctr">
+            <a:noAutofit/>
+          </a:bodyPr>
+          <a:p>
+            <a:pPr algn="ctr">
+              <a:lnSpc>
+                <a:spcPct val="100000"/>
+              </a:lnSpc>
+            </a:pPr>
+            <a:r>
+              <a:rPr b="0" lang="sv-SE" sz="1800" spc="-1" strike="noStrike">
+                <a:solidFill>
+                  <a:srgbClr val="ffffff"/>
+                </a:solidFill>
+                <a:latin typeface="Calibri"/>
+                <a:ea typeface="DejaVu Sans"/>
+              </a:rPr>
+              <a:t>PM Data Consumer</a:t>
+            </a:r>
+            <a:endParaRPr b="0" lang="sv-SE" sz="1800" spc="-1" strike="noStrike">
+              <a:latin typeface="Arial"/>
+            </a:endParaRPr>
+          </a:p>
+        </p:txBody>
+      </p:sp>
+      <p:sp>
+        <p:nvSpPr>
+          <p:cNvPr id="142" name="CustomShape 11"/>
+          <p:cNvSpPr/>
+          <p:nvPr/>
+        </p:nvSpPr>
+        <p:spPr>
+          <a:xfrm>
+            <a:off x="2089800" y="6048000"/>
+            <a:ext cx="5325480" cy="458640"/>
+          </a:xfrm>
+          <a:prstGeom prst="roundRect">
+            <a:avLst>
+              <a:gd name="adj" fmla="val 16667"/>
+            </a:avLst>
+          </a:prstGeom>
+          <a:solidFill>
+            <a:srgbClr val="2a6099"/>
+          </a:solidFill>
+          <a:ln/>
+        </p:spPr>
+        <p:style>
+          <a:lnRef idx="2">
+            <a:schemeClr val="accent1">
+              <a:shade val="50000"/>
+            </a:schemeClr>
+          </a:lnRef>
+          <a:fillRef idx="1">
+            <a:schemeClr val="accent1"/>
+          </a:fillRef>
+          <a:effectRef idx="0">
+            <a:schemeClr val="accent1"/>
+          </a:effectRef>
+          <a:fontRef idx="minor"/>
+        </p:style>
+        <p:txBody>
+          <a:bodyPr lIns="90000" rIns="90000" tIns="45000" bIns="45000" anchor="ctr">
+            <a:noAutofit/>
+          </a:bodyPr>
+          <a:p>
+            <a:pPr algn="ctr">
+              <a:lnSpc>
+                <a:spcPct val="100000"/>
+              </a:lnSpc>
+            </a:pPr>
+            <a:r>
+              <a:rPr b="0" lang="sv-SE" sz="1800" spc="-1" strike="noStrike">
+                <a:solidFill>
+                  <a:srgbClr val="000000"/>
+                </a:solidFill>
+                <a:latin typeface="Arial"/>
+                <a:ea typeface="DejaVu Sans"/>
+              </a:rPr>
+              <a:t>PM Files Data Store</a:t>
+            </a:r>
+            <a:endParaRPr b="0" lang="sv-SE" sz="1800" spc="-1" strike="noStrike">
+              <a:latin typeface="Arial"/>
+            </a:endParaRPr>
+          </a:p>
+        </p:txBody>
+      </p:sp>
+      <p:sp>
+        <p:nvSpPr>
+          <p:cNvPr id="143" name="CustomShape 12"/>
+          <p:cNvSpPr/>
+          <p:nvPr/>
+        </p:nvSpPr>
+        <p:spPr>
+          <a:xfrm>
+            <a:off x="414360" y="1764000"/>
+            <a:ext cx="1455120" cy="1182960"/>
+          </a:xfrm>
+          <a:prstGeom prst="rect">
+            <a:avLst/>
+          </a:prstGeom>
+          <a:blipFill rotWithShape="0">
+            <a:blip r:embed="rId6"/>
+            <a:stretch>
+              <a:fillRect/>
+            </a:stretch>
+          </a:blipFill>
+          <a:ln>
+            <a:noFill/>
+          </a:ln>
+        </p:spPr>
+        <p:style>
+          <a:lnRef idx="0"/>
+          <a:fillRef idx="0"/>
+          <a:effectRef idx="0"/>
+          <a:fontRef idx="minor"/>
+        </p:style>
+        <p:txBody>
+          <a:bodyPr lIns="0" rIns="0" tIns="45000" bIns="45000" anchor="ctr" anchorCtr="1">
+            <a:noAutofit/>
+          </a:bodyPr>
+          <a:p>
+            <a:pPr algn="ctr">
+              <a:lnSpc>
+                <a:spcPct val="100000"/>
+              </a:lnSpc>
+            </a:pPr>
+            <a:r>
+              <a:rPr b="0" lang="sv-SE" sz="1800" spc="-1" strike="noStrike">
+                <a:solidFill>
+                  <a:srgbClr val="000000"/>
+                </a:solidFill>
+                <a:latin typeface="Arial"/>
+                <a:ea typeface="DejaVu Sans"/>
+              </a:rPr>
+              <a:t>File Ready</a:t>
+            </a:r>
+            <a:endParaRPr b="0" lang="sv-SE" sz="1800" spc="-1" strike="noStrike">
+              <a:latin typeface="Arial"/>
+            </a:endParaRPr>
+          </a:p>
+        </p:txBody>
+      </p:sp>
+      <p:pic>
+        <p:nvPicPr>
+          <p:cNvPr id="144" name="" descr=""/>
+          <p:cNvPicPr/>
+          <p:nvPr/>
+        </p:nvPicPr>
+        <p:blipFill>
+          <a:blip r:embed="rId7"/>
+          <a:stretch/>
+        </p:blipFill>
+        <p:spPr>
+          <a:xfrm>
+            <a:off x="3454920" y="4680000"/>
+            <a:ext cx="756360" cy="1367280"/>
+          </a:xfrm>
+          <a:prstGeom prst="rect">
+            <a:avLst/>
+          </a:prstGeom>
+          <a:ln>
+            <a:noFill/>
+          </a:ln>
+        </p:spPr>
+      </p:pic>
+      <p:sp>
+        <p:nvSpPr>
+          <p:cNvPr id="145" name="TextShape 13"/>
+          <p:cNvSpPr txBox="1"/>
+          <p:nvPr/>
+        </p:nvSpPr>
+        <p:spPr>
+          <a:xfrm>
+            <a:off x="144000" y="648000"/>
+            <a:ext cx="2664000" cy="858240"/>
+          </a:xfrm>
+          <a:prstGeom prst="rect">
+            <a:avLst/>
+          </a:prstGeom>
+          <a:noFill/>
+          <a:ln>
+            <a:noFill/>
+          </a:ln>
+        </p:spPr>
+        <p:txBody>
+          <a:bodyPr lIns="90000" rIns="90000" tIns="45000" bIns="45000">
+            <a:noAutofit/>
+          </a:bodyPr>
+          <a:p>
+            <a:r>
+              <a:rPr b="0" lang="sv-SE" sz="1800" spc="-1" strike="noStrike">
+                <a:latin typeface="Arial"/>
+              </a:rPr>
+              <a:t>PM Data Aggregation</a:t>
+            </a:r>
+            <a:endParaRPr b="0" lang="sv-SE" sz="1800" spc="-1" strike="noStrike">
+              <a:latin typeface="Arial"/>
+            </a:endParaRPr>
+          </a:p>
+          <a:p>
+            <a:r>
+              <a:rPr b="0" lang="sv-SE" sz="1800" spc="-1" strike="noStrike">
+                <a:latin typeface="Arial"/>
+              </a:rPr>
+              <a:t>Shared topic</a:t>
+            </a:r>
+            <a:endParaRPr b="0" lang="sv-SE" sz="1800" spc="-1" strike="noStrike">
+              <a:latin typeface="Arial"/>
+            </a:endParaRPr>
+          </a:p>
+        </p:txBody>
+      </p:sp>
+      <p:sp>
+        <p:nvSpPr>
+          <p:cNvPr id="146" name="CustomShape 14"/>
+          <p:cNvSpPr/>
+          <p:nvPr/>
+        </p:nvSpPr>
+        <p:spPr>
+          <a:xfrm>
+            <a:off x="6693480" y="1658520"/>
+            <a:ext cx="1314720" cy="1725480"/>
+          </a:xfrm>
+          <a:prstGeom prst="rect">
+            <a:avLst/>
+          </a:prstGeom>
+          <a:blipFill rotWithShape="0">
+            <a:blip r:embed="rId8"/>
+            <a:stretch>
+              <a:fillRect/>
+            </a:stretch>
+          </a:blipFill>
+          <a:ln>
+            <a:noFill/>
+          </a:ln>
+        </p:spPr>
+        <p:style>
+          <a:lnRef idx="0"/>
+          <a:fillRef idx="0"/>
+          <a:effectRef idx="0"/>
+          <a:fontRef idx="minor"/>
+        </p:style>
+        <p:txBody>
+          <a:bodyPr lIns="0" rIns="0" tIns="45000" bIns="45000" anchor="ctr" anchorCtr="1">
+            <a:noAutofit/>
+          </a:bodyPr>
+          <a:p>
+            <a:pPr algn="ctr">
+              <a:lnSpc>
+                <a:spcPct val="100000"/>
+              </a:lnSpc>
+            </a:pPr>
+            <a:r>
+              <a:rPr b="0" lang="sv-SE" sz="1800" spc="-1" strike="noStrike">
+                <a:solidFill>
+                  <a:srgbClr val="000000"/>
+                </a:solidFill>
+                <a:latin typeface="Arial"/>
+                <a:ea typeface="DejaVu Sans"/>
+              </a:rPr>
+              <a:t>Aggregated</a:t>
+            </a:r>
+            <a:endParaRPr b="0" lang="sv-SE" sz="1800" spc="-1" strike="noStrike">
+              <a:latin typeface="Arial"/>
+            </a:endParaRPr>
+          </a:p>
+          <a:p>
+            <a:pPr algn="ctr">
+              <a:lnSpc>
+                <a:spcPct val="100000"/>
+              </a:lnSpc>
+            </a:pPr>
+            <a:r>
+              <a:rPr b="0" lang="sv-SE" sz="1800" spc="-1" strike="noStrike">
+                <a:solidFill>
+                  <a:srgbClr val="000000"/>
+                </a:solidFill>
+                <a:latin typeface="Arial"/>
+                <a:ea typeface="DejaVu Sans"/>
+              </a:rPr>
+              <a:t>Filter</a:t>
+            </a:r>
+            <a:endParaRPr b="0" lang="sv-SE" sz="1800" spc="-1" strike="noStrike">
+              <a:latin typeface="Arial"/>
+            </a:endParaRPr>
+          </a:p>
+        </p:txBody>
+      </p:sp>
     </p:spTree>
   </p:cSld>
   <mc:AlternateContent>
@@ -3915,6 +7338,232 @@
 </file>
 
 <file path=ppt/theme/theme1.xml><?xml version="1.0" encoding="utf-8"?>
+<a:theme xmlns:a="http://schemas.openxmlformats.org/drawingml/2006/main" name="Office Theme">
+  <a:themeElements>
+    <a:clrScheme name="Office">
+      <a:dk1>
+        <a:sysClr val="windowText" lastClr="000000"/>
+      </a:dk1>
+      <a:lt1>
+        <a:sysClr val="window" lastClr="FFFFFF"/>
+      </a:lt1>
+      <a:dk2>
+        <a:srgbClr val="44546a"/>
+      </a:dk2>
+      <a:lt2>
+        <a:srgbClr val="e7e6e6"/>
+      </a:lt2>
+      <a:accent1>
+        <a:srgbClr val="4472c4"/>
+      </a:accent1>
+      <a:accent2>
+        <a:srgbClr val="ed7d31"/>
+      </a:accent2>
+      <a:accent3>
+        <a:srgbClr val="a5a5a5"/>
+      </a:accent3>
+      <a:accent4>
+        <a:srgbClr val="ffc000"/>
+      </a:accent4>
+      <a:accent5>
+        <a:srgbClr val="5b9bd5"/>
+      </a:accent5>
+      <a:accent6>
+        <a:srgbClr val="70ad47"/>
+      </a:accent6>
+      <a:hlink>
+        <a:srgbClr val="0563c1"/>
+      </a:hlink>
+      <a:folHlink>
+        <a:srgbClr val="954f72"/>
+      </a:folHlink>
+    </a:clrScheme>
+    <a:fontScheme name="Office">
+      <a:majorFont>
+        <a:latin typeface="Arial"/>
+        <a:ea typeface="DejaVu Sans"/>
+        <a:cs typeface="DejaVu Sans"/>
+      </a:majorFont>
+      <a:minorFont>
+        <a:latin typeface="Arial"/>
+        <a:ea typeface="DejaVu Sans"/>
+        <a:cs typeface="DejaVu Sans"/>
+      </a:minorFont>
+    </a:fontScheme>
+    <a:fmtScheme name="Office">
+      <a:fillStyleLst>
+        <a:solidFill>
+          <a:schemeClr val="phClr"/>
+        </a:solidFill>
+        <a:gradFill rotWithShape="1">
+          <a:gsLst>
+            <a:gs pos="0">
+              <a:schemeClr val="phClr">
+                <a:tint val="50000"/>
+                <a:satMod val="300000"/>
+              </a:schemeClr>
+            </a:gs>
+            <a:gs pos="35000">
+              <a:schemeClr val="phClr">
+                <a:tint val="37000"/>
+                <a:satMod val="300000"/>
+              </a:schemeClr>
+            </a:gs>
+            <a:gs pos="100000">
+              <a:schemeClr val="phClr">
+                <a:tint val="15000"/>
+                <a:satMod val="350000"/>
+              </a:schemeClr>
+            </a:gs>
+          </a:gsLst>
+          <a:lin ang="16200000" scaled="1"/>
+        </a:gradFill>
+        <a:gradFill rotWithShape="1">
+          <a:gsLst>
+            <a:gs pos="0">
+              <a:schemeClr val="phClr">
+                <a:shade val="51000"/>
+                <a:satMod val="130000"/>
+              </a:schemeClr>
+            </a:gs>
+            <a:gs pos="80000">
+              <a:schemeClr val="phClr">
+                <a:shade val="93000"/>
+                <a:satMod val="130000"/>
+              </a:schemeClr>
+            </a:gs>
+            <a:gs pos="100000">
+              <a:schemeClr val="phClr">
+                <a:shade val="94000"/>
+                <a:satMod val="135000"/>
+              </a:schemeClr>
+            </a:gs>
+          </a:gsLst>
+          <a:lin ang="16200000" scaled="0"/>
+        </a:gradFill>
+      </a:fillStyleLst>
+      <a:lnStyleLst>
+        <a:ln w="9525" cap="flat" cmpd="sng" algn="ctr">
+          <a:solidFill>
+            <a:schemeClr val="phClr">
+              <a:shade val="95000"/>
+              <a:satMod val="105000"/>
+            </a:schemeClr>
+          </a:solidFill>
+          <a:prstDash val="solid"/>
+          <a:miter/>
+        </a:ln>
+        <a:ln w="25400" cap="flat" cmpd="sng" algn="ctr">
+          <a:solidFill>
+            <a:schemeClr val="phClr"/>
+          </a:solidFill>
+          <a:prstDash val="solid"/>
+          <a:miter/>
+        </a:ln>
+        <a:ln w="38100" cap="flat" cmpd="sng" algn="ctr">
+          <a:solidFill>
+            <a:schemeClr val="phClr"/>
+          </a:solidFill>
+          <a:prstDash val="solid"/>
+          <a:miter/>
+        </a:ln>
+      </a:lnStyleLst>
+      <a:effectStyleLst>
+        <a:effectStyle>
+          <a:effectLst>
+            <a:outerShdw blurRad="40000" dist="20000" dir="5400000" rotWithShape="0">
+              <a:srgbClr val="000000">
+                <a:alpha val="38000"/>
+              </a:srgbClr>
+            </a:outerShdw>
+          </a:effectLst>
+        </a:effectStyle>
+        <a:effectStyle>
+          <a:effectLst>
+            <a:outerShdw blurRad="40000" dist="23000" dir="5400000" rotWithShape="0">
+              <a:srgbClr val="000000">
+                <a:alpha val="35000"/>
+              </a:srgbClr>
+            </a:outerShdw>
+          </a:effectLst>
+        </a:effectStyle>
+        <a:effectStyle>
+          <a:effectLst>
+            <a:outerShdw blurRad="40000" dist="23000" dir="5400000" rotWithShape="0">
+              <a:srgbClr val="000000">
+                <a:alpha val="35000"/>
+              </a:srgbClr>
+            </a:outerShdw>
+          </a:effectLst>
+          <a:scene3d>
+            <a:camera prst="orthographicFront">
+              <a:rot lat="0" lon="0" rev="0"/>
+            </a:camera>
+            <a:lightRig rig="threePt" dir="t">
+              <a:rot lat="0" lon="0" rev="1200000"/>
+            </a:lightRig>
+          </a:scene3d>
+          <a:sp3d>
+            <a:bevelT w="63500" h="25400"/>
+          </a:sp3d>
+        </a:effectStyle>
+      </a:effectStyleLst>
+      <a:bgFillStyleLst>
+        <a:solidFill>
+          <a:schemeClr val="phClr"/>
+        </a:solidFill>
+        <a:gradFill rotWithShape="1">
+          <a:gsLst>
+            <a:gs pos="0">
+              <a:schemeClr val="phClr">
+                <a:tint val="40000"/>
+                <a:satMod val="350000"/>
+              </a:schemeClr>
+            </a:gs>
+            <a:gs pos="40000">
+              <a:schemeClr val="phClr">
+                <a:tint val="45000"/>
+                <a:shade val="99000"/>
+                <a:satMod val="350000"/>
+              </a:schemeClr>
+            </a:gs>
+            <a:gs pos="100000">
+              <a:schemeClr val="phClr">
+                <a:shade val="20000"/>
+                <a:satMod val="255000"/>
+              </a:schemeClr>
+            </a:gs>
+          </a:gsLst>
+          <a:path path="circle">
+            <a:fillToRect l="50000" t="-80000" r="50000" b="180000"/>
+          </a:path>
+        </a:gradFill>
+        <a:gradFill rotWithShape="1">
+          <a:gsLst>
+            <a:gs pos="0">
+              <a:schemeClr val="phClr">
+                <a:tint val="80000"/>
+                <a:satMod val="300000"/>
+              </a:schemeClr>
+            </a:gs>
+            <a:gs pos="100000">
+              <a:schemeClr val="phClr">
+                <a:shade val="30000"/>
+                <a:satMod val="200000"/>
+              </a:schemeClr>
+            </a:gs>
+          </a:gsLst>
+          <a:path path="circle">
+            <a:fillToRect l="50000" t="50000" r="50000" b="50000"/>
+          </a:path>
+        </a:gradFill>
+      </a:bgFillStyleLst>
+    </a:fmtScheme>
+  </a:themeElements>
+</a:theme>
+</file>
+
+<file path=ppt/theme/theme2.xml><?xml version="1.0" encoding="utf-8"?>
 <a:theme xmlns:a="http://schemas.openxmlformats.org/drawingml/2006/main" name="Office Theme">
   <a:themeElements>
     <a:clrScheme name="Office">

</xml_diff>

<commit_message>
Updates for G Maintenance release
    Minor changes.
    Step parent pom version
    DMaaP adapter, updated job definition syntax
    DMaaP adapter, support for shared Kafka topics

Issue-ID: NONRTRIC-838
Signed-off-by: ychacon <yennifer.chacon@est.tech>
Change-Id: Ia6a909a07304c79a0c2d53cdea0f857ebae7f96a
</commit_message>
<xml_diff>
--- a/docs/Pictures.pptx
+++ b/docs/Pictures.pptx
@@ -3,11 +3,13 @@
 <p:presentation xmlns:a="http://schemas.openxmlformats.org/drawingml/2006/main" xmlns:p="http://schemas.openxmlformats.org/presentationml/2006/main" xmlns:r="http://schemas.openxmlformats.org/officeDocument/2006/relationships" xmlns:p14="http://schemas.microsoft.com/office/powerpoint/2010/main" xmlns:p15="http://schemas.microsoft.com/office/powerpoint/2012/main" xmlns:mc="http://schemas.openxmlformats.org/markup-compatibility/2006">
   <p:sldMasterIdLst>
     <p:sldMasterId id="2147483648" r:id="rId2"/>
+    <p:sldMasterId id="2147483661" r:id="rId3"/>
   </p:sldMasterIdLst>
   <p:sldIdLst>
-    <p:sldId id="256" r:id="rId3"/>
-    <p:sldId id="257" r:id="rId4"/>
-    <p:sldId id="258" r:id="rId5"/>
+    <p:sldId id="256" r:id="rId4"/>
+    <p:sldId id="257" r:id="rId5"/>
+    <p:sldId id="258" r:id="rId6"/>
+    <p:sldId id="259" r:id="rId7"/>
   </p:sldIdLst>
   <p:sldSz cx="12192000" cy="6858000"/>
   <p:notesSz cx="7559675" cy="10691812"/>
@@ -555,6 +557,557 @@
 </p:sldLayout>
 </file>
 
+<file path=ppt/slideLayouts/slideLayout13.xml><?xml version="1.0" encoding="utf-8"?>
+<p:sldLayout xmlns:a="http://schemas.openxmlformats.org/drawingml/2006/main" xmlns:p="http://schemas.openxmlformats.org/presentationml/2006/main" xmlns:r="http://schemas.openxmlformats.org/officeDocument/2006/relationships" xmlns:p14="http://schemas.microsoft.com/office/powerpoint/2010/main" xmlns:p15="http://schemas.microsoft.com/office/powerpoint/2012/main" xmlns:mc="http://schemas.openxmlformats.org/markup-compatibility/2006" type="blank" preserve="1">
+  <p:cSld name="Blank Slide">
+    <p:spTree>
+      <p:nvGrpSpPr>
+        <p:cNvPr id="1" name=""/>
+        <p:cNvGrpSpPr/>
+        <p:nvPr/>
+      </p:nvGrpSpPr>
+      <p:grpSpPr>
+        <a:xfrm>
+          <a:off x="0" y="0"/>
+          <a:ext cx="0" cy="0"/>
+          <a:chOff x="0" y="0"/>
+          <a:chExt cx="0" cy="0"/>
+        </a:xfrm>
+      </p:grpSpPr>
+    </p:spTree>
+  </p:cSld>
+</p:sldLayout>
+</file>
+
+<file path=ppt/slideLayouts/slideLayout14.xml><?xml version="1.0" encoding="utf-8"?>
+<p:sldLayout xmlns:a="http://schemas.openxmlformats.org/drawingml/2006/main" xmlns:p="http://schemas.openxmlformats.org/presentationml/2006/main" xmlns:r="http://schemas.openxmlformats.org/officeDocument/2006/relationships" xmlns:p14="http://schemas.microsoft.com/office/powerpoint/2010/main" xmlns:p15="http://schemas.microsoft.com/office/powerpoint/2012/main" xmlns:mc="http://schemas.openxmlformats.org/markup-compatibility/2006" type="tx" preserve="1">
+  <p:cSld name="Title Slide">
+    <p:spTree>
+      <p:nvGrpSpPr>
+        <p:cNvPr id="1" name=""/>
+        <p:cNvGrpSpPr/>
+        <p:nvPr/>
+      </p:nvGrpSpPr>
+      <p:grpSpPr>
+        <a:xfrm>
+          <a:off x="0" y="0"/>
+          <a:ext cx="0" cy="0"/>
+          <a:chOff x="0" y="0"/>
+          <a:chExt cx="0" cy="0"/>
+        </a:xfrm>
+      </p:grpSpPr>
+      <p:sp>
+        <p:nvSpPr>
+          <p:cNvPr id="40" name="PlaceHolder 1"/>
+          <p:cNvSpPr>
+            <a:spLocks noGrp="1"/>
+          </p:cNvSpPr>
+          <p:nvPr>
+            <p:ph type="title"/>
+          </p:nvPr>
+        </p:nvSpPr>
+        <p:spPr>
+          <a:xfrm>
+            <a:off x="609480" y="273600"/>
+            <a:ext cx="10972440" cy="1144800"/>
+          </a:xfrm>
+          <a:prstGeom prst="rect">
+            <a:avLst/>
+          </a:prstGeom>
+        </p:spPr>
+        <p:txBody>
+          <a:bodyPr lIns="0" rIns="0" tIns="0" bIns="0" anchor="ctr">
+            <a:noAutofit/>
+          </a:bodyPr>
+          <a:p>
+            <a:pPr algn="ctr"/>
+            <a:endParaRPr b="0" lang="sv-SE" sz="4400" spc="-1" strike="noStrike">
+              <a:latin typeface="Arial"/>
+            </a:endParaRPr>
+          </a:p>
+        </p:txBody>
+      </p:sp>
+      <p:sp>
+        <p:nvSpPr>
+          <p:cNvPr id="41" name="PlaceHolder 2"/>
+          <p:cNvSpPr>
+            <a:spLocks noGrp="1"/>
+          </p:cNvSpPr>
+          <p:nvPr>
+            <p:ph type="subTitle"/>
+          </p:nvPr>
+        </p:nvSpPr>
+        <p:spPr>
+          <a:xfrm>
+            <a:off x="609480" y="1604520"/>
+            <a:ext cx="10972440" cy="3977280"/>
+          </a:xfrm>
+          <a:prstGeom prst="rect">
+            <a:avLst/>
+          </a:prstGeom>
+        </p:spPr>
+        <p:txBody>
+          <a:bodyPr lIns="0" rIns="0" tIns="0" bIns="0" anchor="ctr">
+            <a:noAutofit/>
+          </a:bodyPr>
+          <a:p>
+            <a:pPr algn="ctr"/>
+            <a:endParaRPr b="0" lang="sv-SE" sz="3200" spc="-1" strike="noStrike">
+              <a:latin typeface="Arial"/>
+            </a:endParaRPr>
+          </a:p>
+        </p:txBody>
+      </p:sp>
+    </p:spTree>
+  </p:cSld>
+</p:sldLayout>
+</file>
+
+<file path=ppt/slideLayouts/slideLayout15.xml><?xml version="1.0" encoding="utf-8"?>
+<p:sldLayout xmlns:a="http://schemas.openxmlformats.org/drawingml/2006/main" xmlns:p="http://schemas.openxmlformats.org/presentationml/2006/main" xmlns:r="http://schemas.openxmlformats.org/officeDocument/2006/relationships" xmlns:p14="http://schemas.microsoft.com/office/powerpoint/2010/main" xmlns:p15="http://schemas.microsoft.com/office/powerpoint/2012/main" xmlns:mc="http://schemas.openxmlformats.org/markup-compatibility/2006" type="obj" preserve="1">
+  <p:cSld name="Title, Content">
+    <p:spTree>
+      <p:nvGrpSpPr>
+        <p:cNvPr id="1" name=""/>
+        <p:cNvGrpSpPr/>
+        <p:nvPr/>
+      </p:nvGrpSpPr>
+      <p:grpSpPr>
+        <a:xfrm>
+          <a:off x="0" y="0"/>
+          <a:ext cx="0" cy="0"/>
+          <a:chOff x="0" y="0"/>
+          <a:chExt cx="0" cy="0"/>
+        </a:xfrm>
+      </p:grpSpPr>
+      <p:sp>
+        <p:nvSpPr>
+          <p:cNvPr id="42" name="PlaceHolder 1"/>
+          <p:cNvSpPr>
+            <a:spLocks noGrp="1"/>
+          </p:cNvSpPr>
+          <p:nvPr>
+            <p:ph type="title"/>
+          </p:nvPr>
+        </p:nvSpPr>
+        <p:spPr>
+          <a:xfrm>
+            <a:off x="609480" y="273600"/>
+            <a:ext cx="10972440" cy="1144800"/>
+          </a:xfrm>
+          <a:prstGeom prst="rect">
+            <a:avLst/>
+          </a:prstGeom>
+        </p:spPr>
+        <p:txBody>
+          <a:bodyPr lIns="0" rIns="0" tIns="0" bIns="0" anchor="ctr">
+            <a:noAutofit/>
+          </a:bodyPr>
+          <a:p>
+            <a:pPr algn="ctr"/>
+            <a:endParaRPr b="0" lang="sv-SE" sz="4400" spc="-1" strike="noStrike">
+              <a:latin typeface="Arial"/>
+            </a:endParaRPr>
+          </a:p>
+        </p:txBody>
+      </p:sp>
+      <p:sp>
+        <p:nvSpPr>
+          <p:cNvPr id="43" name="PlaceHolder 2"/>
+          <p:cNvSpPr>
+            <a:spLocks noGrp="1"/>
+          </p:cNvSpPr>
+          <p:nvPr>
+            <p:ph type="body"/>
+          </p:nvPr>
+        </p:nvSpPr>
+        <p:spPr>
+          <a:xfrm>
+            <a:off x="609480" y="1604520"/>
+            <a:ext cx="10972440" cy="3977280"/>
+          </a:xfrm>
+          <a:prstGeom prst="rect">
+            <a:avLst/>
+          </a:prstGeom>
+        </p:spPr>
+        <p:txBody>
+          <a:bodyPr lIns="0" rIns="0" tIns="0" bIns="0">
+            <a:normAutofit/>
+          </a:bodyPr>
+          <a:p>
+            <a:endParaRPr b="0" lang="sv-SE" sz="3200" spc="-1" strike="noStrike">
+              <a:latin typeface="Arial"/>
+            </a:endParaRPr>
+          </a:p>
+        </p:txBody>
+      </p:sp>
+    </p:spTree>
+  </p:cSld>
+</p:sldLayout>
+</file>
+
+<file path=ppt/slideLayouts/slideLayout16.xml><?xml version="1.0" encoding="utf-8"?>
+<p:sldLayout xmlns:a="http://schemas.openxmlformats.org/drawingml/2006/main" xmlns:p="http://schemas.openxmlformats.org/presentationml/2006/main" xmlns:r="http://schemas.openxmlformats.org/officeDocument/2006/relationships" xmlns:p14="http://schemas.microsoft.com/office/powerpoint/2010/main" xmlns:p15="http://schemas.microsoft.com/office/powerpoint/2012/main" xmlns:mc="http://schemas.openxmlformats.org/markup-compatibility/2006" type="twoObj" preserve="1">
+  <p:cSld name="Title, 2 Content">
+    <p:spTree>
+      <p:nvGrpSpPr>
+        <p:cNvPr id="1" name=""/>
+        <p:cNvGrpSpPr/>
+        <p:nvPr/>
+      </p:nvGrpSpPr>
+      <p:grpSpPr>
+        <a:xfrm>
+          <a:off x="0" y="0"/>
+          <a:ext cx="0" cy="0"/>
+          <a:chOff x="0" y="0"/>
+          <a:chExt cx="0" cy="0"/>
+        </a:xfrm>
+      </p:grpSpPr>
+      <p:sp>
+        <p:nvSpPr>
+          <p:cNvPr id="44" name="PlaceHolder 1"/>
+          <p:cNvSpPr>
+            <a:spLocks noGrp="1"/>
+          </p:cNvSpPr>
+          <p:nvPr>
+            <p:ph type="title"/>
+          </p:nvPr>
+        </p:nvSpPr>
+        <p:spPr>
+          <a:xfrm>
+            <a:off x="609480" y="273600"/>
+            <a:ext cx="10972440" cy="1144800"/>
+          </a:xfrm>
+          <a:prstGeom prst="rect">
+            <a:avLst/>
+          </a:prstGeom>
+        </p:spPr>
+        <p:txBody>
+          <a:bodyPr lIns="0" rIns="0" tIns="0" bIns="0" anchor="ctr">
+            <a:noAutofit/>
+          </a:bodyPr>
+          <a:p>
+            <a:pPr algn="ctr"/>
+            <a:endParaRPr b="0" lang="sv-SE" sz="4400" spc="-1" strike="noStrike">
+              <a:latin typeface="Arial"/>
+            </a:endParaRPr>
+          </a:p>
+        </p:txBody>
+      </p:sp>
+      <p:sp>
+        <p:nvSpPr>
+          <p:cNvPr id="45" name="PlaceHolder 2"/>
+          <p:cNvSpPr>
+            <a:spLocks noGrp="1"/>
+          </p:cNvSpPr>
+          <p:nvPr>
+            <p:ph type="body"/>
+          </p:nvPr>
+        </p:nvSpPr>
+        <p:spPr>
+          <a:xfrm>
+            <a:off x="609480" y="1604520"/>
+            <a:ext cx="5354280" cy="3977280"/>
+          </a:xfrm>
+          <a:prstGeom prst="rect">
+            <a:avLst/>
+          </a:prstGeom>
+        </p:spPr>
+        <p:txBody>
+          <a:bodyPr lIns="0" rIns="0" tIns="0" bIns="0">
+            <a:normAutofit/>
+          </a:bodyPr>
+          <a:p>
+            <a:endParaRPr b="0" lang="sv-SE" sz="3200" spc="-1" strike="noStrike">
+              <a:latin typeface="Arial"/>
+            </a:endParaRPr>
+          </a:p>
+        </p:txBody>
+      </p:sp>
+      <p:sp>
+        <p:nvSpPr>
+          <p:cNvPr id="46" name="PlaceHolder 3"/>
+          <p:cNvSpPr>
+            <a:spLocks noGrp="1"/>
+          </p:cNvSpPr>
+          <p:nvPr>
+            <p:ph type="body"/>
+          </p:nvPr>
+        </p:nvSpPr>
+        <p:spPr>
+          <a:xfrm>
+            <a:off x="6231960" y="1604520"/>
+            <a:ext cx="5354280" cy="3977280"/>
+          </a:xfrm>
+          <a:prstGeom prst="rect">
+            <a:avLst/>
+          </a:prstGeom>
+        </p:spPr>
+        <p:txBody>
+          <a:bodyPr lIns="0" rIns="0" tIns="0" bIns="0">
+            <a:normAutofit/>
+          </a:bodyPr>
+          <a:p>
+            <a:endParaRPr b="0" lang="sv-SE" sz="3200" spc="-1" strike="noStrike">
+              <a:latin typeface="Arial"/>
+            </a:endParaRPr>
+          </a:p>
+        </p:txBody>
+      </p:sp>
+    </p:spTree>
+  </p:cSld>
+</p:sldLayout>
+</file>
+
+<file path=ppt/slideLayouts/slideLayout17.xml><?xml version="1.0" encoding="utf-8"?>
+<p:sldLayout xmlns:a="http://schemas.openxmlformats.org/drawingml/2006/main" xmlns:p="http://schemas.openxmlformats.org/presentationml/2006/main" xmlns:r="http://schemas.openxmlformats.org/officeDocument/2006/relationships" xmlns:p14="http://schemas.microsoft.com/office/powerpoint/2010/main" xmlns:p15="http://schemas.microsoft.com/office/powerpoint/2012/main" xmlns:mc="http://schemas.openxmlformats.org/markup-compatibility/2006" type="titleOnly" preserve="1">
+  <p:cSld name="Title Only">
+    <p:spTree>
+      <p:nvGrpSpPr>
+        <p:cNvPr id="1" name=""/>
+        <p:cNvGrpSpPr/>
+        <p:nvPr/>
+      </p:nvGrpSpPr>
+      <p:grpSpPr>
+        <a:xfrm>
+          <a:off x="0" y="0"/>
+          <a:ext cx="0" cy="0"/>
+          <a:chOff x="0" y="0"/>
+          <a:chExt cx="0" cy="0"/>
+        </a:xfrm>
+      </p:grpSpPr>
+      <p:sp>
+        <p:nvSpPr>
+          <p:cNvPr id="47" name="PlaceHolder 1"/>
+          <p:cNvSpPr>
+            <a:spLocks noGrp="1"/>
+          </p:cNvSpPr>
+          <p:nvPr>
+            <p:ph type="title"/>
+          </p:nvPr>
+        </p:nvSpPr>
+        <p:spPr>
+          <a:xfrm>
+            <a:off x="609480" y="273600"/>
+            <a:ext cx="10972440" cy="1144800"/>
+          </a:xfrm>
+          <a:prstGeom prst="rect">
+            <a:avLst/>
+          </a:prstGeom>
+        </p:spPr>
+        <p:txBody>
+          <a:bodyPr lIns="0" rIns="0" tIns="0" bIns="0" anchor="ctr">
+            <a:noAutofit/>
+          </a:bodyPr>
+          <a:p>
+            <a:pPr algn="ctr"/>
+            <a:endParaRPr b="0" lang="sv-SE" sz="4400" spc="-1" strike="noStrike">
+              <a:latin typeface="Arial"/>
+            </a:endParaRPr>
+          </a:p>
+        </p:txBody>
+      </p:sp>
+    </p:spTree>
+  </p:cSld>
+</p:sldLayout>
+</file>
+
+<file path=ppt/slideLayouts/slideLayout18.xml><?xml version="1.0" encoding="utf-8"?>
+<p:sldLayout xmlns:a="http://schemas.openxmlformats.org/drawingml/2006/main" xmlns:p="http://schemas.openxmlformats.org/presentationml/2006/main" xmlns:r="http://schemas.openxmlformats.org/officeDocument/2006/relationships" xmlns:p14="http://schemas.microsoft.com/office/powerpoint/2010/main" xmlns:p15="http://schemas.microsoft.com/office/powerpoint/2012/main" xmlns:mc="http://schemas.openxmlformats.org/markup-compatibility/2006" type="objOnly" preserve="1">
+  <p:cSld name="Centered Text">
+    <p:spTree>
+      <p:nvGrpSpPr>
+        <p:cNvPr id="1" name=""/>
+        <p:cNvGrpSpPr/>
+        <p:nvPr/>
+      </p:nvGrpSpPr>
+      <p:grpSpPr>
+        <a:xfrm>
+          <a:off x="0" y="0"/>
+          <a:ext cx="0" cy="0"/>
+          <a:chOff x="0" y="0"/>
+          <a:chExt cx="0" cy="0"/>
+        </a:xfrm>
+      </p:grpSpPr>
+      <p:sp>
+        <p:nvSpPr>
+          <p:cNvPr id="48" name="PlaceHolder 1"/>
+          <p:cNvSpPr>
+            <a:spLocks noGrp="1"/>
+          </p:cNvSpPr>
+          <p:nvPr>
+            <p:ph type="subTitle"/>
+          </p:nvPr>
+        </p:nvSpPr>
+        <p:spPr>
+          <a:xfrm>
+            <a:off x="609480" y="273600"/>
+            <a:ext cx="10972440" cy="5307840"/>
+          </a:xfrm>
+          <a:prstGeom prst="rect">
+            <a:avLst/>
+          </a:prstGeom>
+        </p:spPr>
+        <p:txBody>
+          <a:bodyPr lIns="0" rIns="0" tIns="0" bIns="0" anchor="ctr">
+            <a:noAutofit/>
+          </a:bodyPr>
+          <a:p>
+            <a:pPr algn="ctr"/>
+            <a:endParaRPr b="0" lang="sv-SE" sz="3200" spc="-1" strike="noStrike">
+              <a:latin typeface="Arial"/>
+            </a:endParaRPr>
+          </a:p>
+        </p:txBody>
+      </p:sp>
+    </p:spTree>
+  </p:cSld>
+</p:sldLayout>
+</file>
+
+<file path=ppt/slideLayouts/slideLayout19.xml><?xml version="1.0" encoding="utf-8"?>
+<p:sldLayout xmlns:a="http://schemas.openxmlformats.org/drawingml/2006/main" xmlns:p="http://schemas.openxmlformats.org/presentationml/2006/main" xmlns:r="http://schemas.openxmlformats.org/officeDocument/2006/relationships" xmlns:p14="http://schemas.microsoft.com/office/powerpoint/2010/main" xmlns:p15="http://schemas.microsoft.com/office/powerpoint/2012/main" xmlns:mc="http://schemas.openxmlformats.org/markup-compatibility/2006" type="twoObjAndObj" preserve="1">
+  <p:cSld name="Title, 2 Content and Content">
+    <p:spTree>
+      <p:nvGrpSpPr>
+        <p:cNvPr id="1" name=""/>
+        <p:cNvGrpSpPr/>
+        <p:nvPr/>
+      </p:nvGrpSpPr>
+      <p:grpSpPr>
+        <a:xfrm>
+          <a:off x="0" y="0"/>
+          <a:ext cx="0" cy="0"/>
+          <a:chOff x="0" y="0"/>
+          <a:chExt cx="0" cy="0"/>
+        </a:xfrm>
+      </p:grpSpPr>
+      <p:sp>
+        <p:nvSpPr>
+          <p:cNvPr id="49" name="PlaceHolder 1"/>
+          <p:cNvSpPr>
+            <a:spLocks noGrp="1"/>
+          </p:cNvSpPr>
+          <p:nvPr>
+            <p:ph type="title"/>
+          </p:nvPr>
+        </p:nvSpPr>
+        <p:spPr>
+          <a:xfrm>
+            <a:off x="609480" y="273600"/>
+            <a:ext cx="10972440" cy="1144800"/>
+          </a:xfrm>
+          <a:prstGeom prst="rect">
+            <a:avLst/>
+          </a:prstGeom>
+        </p:spPr>
+        <p:txBody>
+          <a:bodyPr lIns="0" rIns="0" tIns="0" bIns="0" anchor="ctr">
+            <a:noAutofit/>
+          </a:bodyPr>
+          <a:p>
+            <a:pPr algn="ctr"/>
+            <a:endParaRPr b="0" lang="sv-SE" sz="4400" spc="-1" strike="noStrike">
+              <a:latin typeface="Arial"/>
+            </a:endParaRPr>
+          </a:p>
+        </p:txBody>
+      </p:sp>
+      <p:sp>
+        <p:nvSpPr>
+          <p:cNvPr id="50" name="PlaceHolder 2"/>
+          <p:cNvSpPr>
+            <a:spLocks noGrp="1"/>
+          </p:cNvSpPr>
+          <p:nvPr>
+            <p:ph type="body"/>
+          </p:nvPr>
+        </p:nvSpPr>
+        <p:spPr>
+          <a:xfrm>
+            <a:off x="609480" y="1604520"/>
+            <a:ext cx="5354280" cy="1896840"/>
+          </a:xfrm>
+          <a:prstGeom prst="rect">
+            <a:avLst/>
+          </a:prstGeom>
+        </p:spPr>
+        <p:txBody>
+          <a:bodyPr lIns="0" rIns="0" tIns="0" bIns="0">
+            <a:normAutofit/>
+          </a:bodyPr>
+          <a:p>
+            <a:endParaRPr b="0" lang="sv-SE" sz="3200" spc="-1" strike="noStrike">
+              <a:latin typeface="Arial"/>
+            </a:endParaRPr>
+          </a:p>
+        </p:txBody>
+      </p:sp>
+      <p:sp>
+        <p:nvSpPr>
+          <p:cNvPr id="51" name="PlaceHolder 3"/>
+          <p:cNvSpPr>
+            <a:spLocks noGrp="1"/>
+          </p:cNvSpPr>
+          <p:nvPr>
+            <p:ph type="body"/>
+          </p:nvPr>
+        </p:nvSpPr>
+        <p:spPr>
+          <a:xfrm>
+            <a:off x="6231960" y="1604520"/>
+            <a:ext cx="5354280" cy="3977280"/>
+          </a:xfrm>
+          <a:prstGeom prst="rect">
+            <a:avLst/>
+          </a:prstGeom>
+        </p:spPr>
+        <p:txBody>
+          <a:bodyPr lIns="0" rIns="0" tIns="0" bIns="0">
+            <a:normAutofit/>
+          </a:bodyPr>
+          <a:p>
+            <a:endParaRPr b="0" lang="sv-SE" sz="3200" spc="-1" strike="noStrike">
+              <a:latin typeface="Arial"/>
+            </a:endParaRPr>
+          </a:p>
+        </p:txBody>
+      </p:sp>
+      <p:sp>
+        <p:nvSpPr>
+          <p:cNvPr id="52" name="PlaceHolder 4"/>
+          <p:cNvSpPr>
+            <a:spLocks noGrp="1"/>
+          </p:cNvSpPr>
+          <p:nvPr>
+            <p:ph type="body"/>
+          </p:nvPr>
+        </p:nvSpPr>
+        <p:spPr>
+          <a:xfrm>
+            <a:off x="609480" y="3682080"/>
+            <a:ext cx="5354280" cy="1896840"/>
+          </a:xfrm>
+          <a:prstGeom prst="rect">
+            <a:avLst/>
+          </a:prstGeom>
+        </p:spPr>
+        <p:txBody>
+          <a:bodyPr lIns="0" rIns="0" tIns="0" bIns="0">
+            <a:normAutofit/>
+          </a:bodyPr>
+          <a:p>
+            <a:endParaRPr b="0" lang="sv-SE" sz="3200" spc="-1" strike="noStrike">
+              <a:latin typeface="Arial"/>
+            </a:endParaRPr>
+          </a:p>
+        </p:txBody>
+      </p:sp>
+    </p:spTree>
+  </p:cSld>
+</p:sldLayout>
+</file>
+
 <file path=ppt/slideLayouts/slideLayout2.xml><?xml version="1.0" encoding="utf-8"?>
 <p:sldLayout xmlns:a="http://schemas.openxmlformats.org/drawingml/2006/main" xmlns:p="http://schemas.openxmlformats.org/presentationml/2006/main" xmlns:r="http://schemas.openxmlformats.org/officeDocument/2006/relationships" xmlns:p14="http://schemas.microsoft.com/office/powerpoint/2010/main" xmlns:p15="http://schemas.microsoft.com/office/powerpoint/2012/main" xmlns:mc="http://schemas.openxmlformats.org/markup-compatibility/2006" type="tx" preserve="1">
   <p:cSld name="Title Slide">
@@ -628,6 +1181,811 @@
           </a:bodyPr>
           <a:p>
             <a:pPr algn="ctr"/>
+            <a:endParaRPr b="0" lang="sv-SE" sz="3200" spc="-1" strike="noStrike">
+              <a:latin typeface="Arial"/>
+            </a:endParaRPr>
+          </a:p>
+        </p:txBody>
+      </p:sp>
+    </p:spTree>
+  </p:cSld>
+</p:sldLayout>
+</file>
+
+<file path=ppt/slideLayouts/slideLayout20.xml><?xml version="1.0" encoding="utf-8"?>
+<p:sldLayout xmlns:a="http://schemas.openxmlformats.org/drawingml/2006/main" xmlns:p="http://schemas.openxmlformats.org/presentationml/2006/main" xmlns:r="http://schemas.openxmlformats.org/officeDocument/2006/relationships" xmlns:p14="http://schemas.microsoft.com/office/powerpoint/2010/main" xmlns:p15="http://schemas.microsoft.com/office/powerpoint/2012/main" xmlns:mc="http://schemas.openxmlformats.org/markup-compatibility/2006" type="objAndTwoObj" preserve="1">
+  <p:cSld name="Title Content and 2 Content">
+    <p:spTree>
+      <p:nvGrpSpPr>
+        <p:cNvPr id="1" name=""/>
+        <p:cNvGrpSpPr/>
+        <p:nvPr/>
+      </p:nvGrpSpPr>
+      <p:grpSpPr>
+        <a:xfrm>
+          <a:off x="0" y="0"/>
+          <a:ext cx="0" cy="0"/>
+          <a:chOff x="0" y="0"/>
+          <a:chExt cx="0" cy="0"/>
+        </a:xfrm>
+      </p:grpSpPr>
+      <p:sp>
+        <p:nvSpPr>
+          <p:cNvPr id="53" name="PlaceHolder 1"/>
+          <p:cNvSpPr>
+            <a:spLocks noGrp="1"/>
+          </p:cNvSpPr>
+          <p:nvPr>
+            <p:ph type="title"/>
+          </p:nvPr>
+        </p:nvSpPr>
+        <p:spPr>
+          <a:xfrm>
+            <a:off x="609480" y="273600"/>
+            <a:ext cx="10972440" cy="1144800"/>
+          </a:xfrm>
+          <a:prstGeom prst="rect">
+            <a:avLst/>
+          </a:prstGeom>
+        </p:spPr>
+        <p:txBody>
+          <a:bodyPr lIns="0" rIns="0" tIns="0" bIns="0" anchor="ctr">
+            <a:noAutofit/>
+          </a:bodyPr>
+          <a:p>
+            <a:pPr algn="ctr"/>
+            <a:endParaRPr b="0" lang="sv-SE" sz="4400" spc="-1" strike="noStrike">
+              <a:latin typeface="Arial"/>
+            </a:endParaRPr>
+          </a:p>
+        </p:txBody>
+      </p:sp>
+      <p:sp>
+        <p:nvSpPr>
+          <p:cNvPr id="54" name="PlaceHolder 2"/>
+          <p:cNvSpPr>
+            <a:spLocks noGrp="1"/>
+          </p:cNvSpPr>
+          <p:nvPr>
+            <p:ph type="body"/>
+          </p:nvPr>
+        </p:nvSpPr>
+        <p:spPr>
+          <a:xfrm>
+            <a:off x="609480" y="1604520"/>
+            <a:ext cx="5354280" cy="3977280"/>
+          </a:xfrm>
+          <a:prstGeom prst="rect">
+            <a:avLst/>
+          </a:prstGeom>
+        </p:spPr>
+        <p:txBody>
+          <a:bodyPr lIns="0" rIns="0" tIns="0" bIns="0">
+            <a:normAutofit/>
+          </a:bodyPr>
+          <a:p>
+            <a:endParaRPr b="0" lang="sv-SE" sz="3200" spc="-1" strike="noStrike">
+              <a:latin typeface="Arial"/>
+            </a:endParaRPr>
+          </a:p>
+        </p:txBody>
+      </p:sp>
+      <p:sp>
+        <p:nvSpPr>
+          <p:cNvPr id="55" name="PlaceHolder 3"/>
+          <p:cNvSpPr>
+            <a:spLocks noGrp="1"/>
+          </p:cNvSpPr>
+          <p:nvPr>
+            <p:ph type="body"/>
+          </p:nvPr>
+        </p:nvSpPr>
+        <p:spPr>
+          <a:xfrm>
+            <a:off x="6231960" y="1604520"/>
+            <a:ext cx="5354280" cy="1896840"/>
+          </a:xfrm>
+          <a:prstGeom prst="rect">
+            <a:avLst/>
+          </a:prstGeom>
+        </p:spPr>
+        <p:txBody>
+          <a:bodyPr lIns="0" rIns="0" tIns="0" bIns="0">
+            <a:normAutofit/>
+          </a:bodyPr>
+          <a:p>
+            <a:endParaRPr b="0" lang="sv-SE" sz="3200" spc="-1" strike="noStrike">
+              <a:latin typeface="Arial"/>
+            </a:endParaRPr>
+          </a:p>
+        </p:txBody>
+      </p:sp>
+      <p:sp>
+        <p:nvSpPr>
+          <p:cNvPr id="56" name="PlaceHolder 4"/>
+          <p:cNvSpPr>
+            <a:spLocks noGrp="1"/>
+          </p:cNvSpPr>
+          <p:nvPr>
+            <p:ph type="body"/>
+          </p:nvPr>
+        </p:nvSpPr>
+        <p:spPr>
+          <a:xfrm>
+            <a:off x="6231960" y="3682080"/>
+            <a:ext cx="5354280" cy="1896840"/>
+          </a:xfrm>
+          <a:prstGeom prst="rect">
+            <a:avLst/>
+          </a:prstGeom>
+        </p:spPr>
+        <p:txBody>
+          <a:bodyPr lIns="0" rIns="0" tIns="0" bIns="0">
+            <a:normAutofit/>
+          </a:bodyPr>
+          <a:p>
+            <a:endParaRPr b="0" lang="sv-SE" sz="3200" spc="-1" strike="noStrike">
+              <a:latin typeface="Arial"/>
+            </a:endParaRPr>
+          </a:p>
+        </p:txBody>
+      </p:sp>
+    </p:spTree>
+  </p:cSld>
+</p:sldLayout>
+</file>
+
+<file path=ppt/slideLayouts/slideLayout21.xml><?xml version="1.0" encoding="utf-8"?>
+<p:sldLayout xmlns:a="http://schemas.openxmlformats.org/drawingml/2006/main" xmlns:p="http://schemas.openxmlformats.org/presentationml/2006/main" xmlns:r="http://schemas.openxmlformats.org/officeDocument/2006/relationships" xmlns:p14="http://schemas.microsoft.com/office/powerpoint/2010/main" xmlns:p15="http://schemas.microsoft.com/office/powerpoint/2012/main" xmlns:mc="http://schemas.openxmlformats.org/markup-compatibility/2006" type="twoObjOverTx" preserve="1">
+  <p:cSld name="Title, 2 Content over Content">
+    <p:spTree>
+      <p:nvGrpSpPr>
+        <p:cNvPr id="1" name=""/>
+        <p:cNvGrpSpPr/>
+        <p:nvPr/>
+      </p:nvGrpSpPr>
+      <p:grpSpPr>
+        <a:xfrm>
+          <a:off x="0" y="0"/>
+          <a:ext cx="0" cy="0"/>
+          <a:chOff x="0" y="0"/>
+          <a:chExt cx="0" cy="0"/>
+        </a:xfrm>
+      </p:grpSpPr>
+      <p:sp>
+        <p:nvSpPr>
+          <p:cNvPr id="57" name="PlaceHolder 1"/>
+          <p:cNvSpPr>
+            <a:spLocks noGrp="1"/>
+          </p:cNvSpPr>
+          <p:nvPr>
+            <p:ph type="title"/>
+          </p:nvPr>
+        </p:nvSpPr>
+        <p:spPr>
+          <a:xfrm>
+            <a:off x="609480" y="273600"/>
+            <a:ext cx="10972440" cy="1144800"/>
+          </a:xfrm>
+          <a:prstGeom prst="rect">
+            <a:avLst/>
+          </a:prstGeom>
+        </p:spPr>
+        <p:txBody>
+          <a:bodyPr lIns="0" rIns="0" tIns="0" bIns="0" anchor="ctr">
+            <a:noAutofit/>
+          </a:bodyPr>
+          <a:p>
+            <a:pPr algn="ctr"/>
+            <a:endParaRPr b="0" lang="sv-SE" sz="4400" spc="-1" strike="noStrike">
+              <a:latin typeface="Arial"/>
+            </a:endParaRPr>
+          </a:p>
+        </p:txBody>
+      </p:sp>
+      <p:sp>
+        <p:nvSpPr>
+          <p:cNvPr id="58" name="PlaceHolder 2"/>
+          <p:cNvSpPr>
+            <a:spLocks noGrp="1"/>
+          </p:cNvSpPr>
+          <p:nvPr>
+            <p:ph type="body"/>
+          </p:nvPr>
+        </p:nvSpPr>
+        <p:spPr>
+          <a:xfrm>
+            <a:off x="609480" y="1604520"/>
+            <a:ext cx="5354280" cy="1896840"/>
+          </a:xfrm>
+          <a:prstGeom prst="rect">
+            <a:avLst/>
+          </a:prstGeom>
+        </p:spPr>
+        <p:txBody>
+          <a:bodyPr lIns="0" rIns="0" tIns="0" bIns="0">
+            <a:normAutofit/>
+          </a:bodyPr>
+          <a:p>
+            <a:endParaRPr b="0" lang="sv-SE" sz="3200" spc="-1" strike="noStrike">
+              <a:latin typeface="Arial"/>
+            </a:endParaRPr>
+          </a:p>
+        </p:txBody>
+      </p:sp>
+      <p:sp>
+        <p:nvSpPr>
+          <p:cNvPr id="59" name="PlaceHolder 3"/>
+          <p:cNvSpPr>
+            <a:spLocks noGrp="1"/>
+          </p:cNvSpPr>
+          <p:nvPr>
+            <p:ph type="body"/>
+          </p:nvPr>
+        </p:nvSpPr>
+        <p:spPr>
+          <a:xfrm>
+            <a:off x="6231960" y="1604520"/>
+            <a:ext cx="5354280" cy="1896840"/>
+          </a:xfrm>
+          <a:prstGeom prst="rect">
+            <a:avLst/>
+          </a:prstGeom>
+        </p:spPr>
+        <p:txBody>
+          <a:bodyPr lIns="0" rIns="0" tIns="0" bIns="0">
+            <a:normAutofit/>
+          </a:bodyPr>
+          <a:p>
+            <a:endParaRPr b="0" lang="sv-SE" sz="3200" spc="-1" strike="noStrike">
+              <a:latin typeface="Arial"/>
+            </a:endParaRPr>
+          </a:p>
+        </p:txBody>
+      </p:sp>
+      <p:sp>
+        <p:nvSpPr>
+          <p:cNvPr id="60" name="PlaceHolder 4"/>
+          <p:cNvSpPr>
+            <a:spLocks noGrp="1"/>
+          </p:cNvSpPr>
+          <p:nvPr>
+            <p:ph type="body"/>
+          </p:nvPr>
+        </p:nvSpPr>
+        <p:spPr>
+          <a:xfrm>
+            <a:off x="609480" y="3682080"/>
+            <a:ext cx="10972440" cy="1896840"/>
+          </a:xfrm>
+          <a:prstGeom prst="rect">
+            <a:avLst/>
+          </a:prstGeom>
+        </p:spPr>
+        <p:txBody>
+          <a:bodyPr lIns="0" rIns="0" tIns="0" bIns="0">
+            <a:normAutofit/>
+          </a:bodyPr>
+          <a:p>
+            <a:endParaRPr b="0" lang="sv-SE" sz="3200" spc="-1" strike="noStrike">
+              <a:latin typeface="Arial"/>
+            </a:endParaRPr>
+          </a:p>
+        </p:txBody>
+      </p:sp>
+    </p:spTree>
+  </p:cSld>
+</p:sldLayout>
+</file>
+
+<file path=ppt/slideLayouts/slideLayout22.xml><?xml version="1.0" encoding="utf-8"?>
+<p:sldLayout xmlns:a="http://schemas.openxmlformats.org/drawingml/2006/main" xmlns:p="http://schemas.openxmlformats.org/presentationml/2006/main" xmlns:r="http://schemas.openxmlformats.org/officeDocument/2006/relationships" xmlns:p14="http://schemas.microsoft.com/office/powerpoint/2010/main" xmlns:p15="http://schemas.microsoft.com/office/powerpoint/2012/main" xmlns:mc="http://schemas.openxmlformats.org/markup-compatibility/2006" type="objOverTx" preserve="1">
+  <p:cSld name="Title, Content over Content">
+    <p:spTree>
+      <p:nvGrpSpPr>
+        <p:cNvPr id="1" name=""/>
+        <p:cNvGrpSpPr/>
+        <p:nvPr/>
+      </p:nvGrpSpPr>
+      <p:grpSpPr>
+        <a:xfrm>
+          <a:off x="0" y="0"/>
+          <a:ext cx="0" cy="0"/>
+          <a:chOff x="0" y="0"/>
+          <a:chExt cx="0" cy="0"/>
+        </a:xfrm>
+      </p:grpSpPr>
+      <p:sp>
+        <p:nvSpPr>
+          <p:cNvPr id="61" name="PlaceHolder 1"/>
+          <p:cNvSpPr>
+            <a:spLocks noGrp="1"/>
+          </p:cNvSpPr>
+          <p:nvPr>
+            <p:ph type="title"/>
+          </p:nvPr>
+        </p:nvSpPr>
+        <p:spPr>
+          <a:xfrm>
+            <a:off x="609480" y="273600"/>
+            <a:ext cx="10972440" cy="1144800"/>
+          </a:xfrm>
+          <a:prstGeom prst="rect">
+            <a:avLst/>
+          </a:prstGeom>
+        </p:spPr>
+        <p:txBody>
+          <a:bodyPr lIns="0" rIns="0" tIns="0" bIns="0" anchor="ctr">
+            <a:noAutofit/>
+          </a:bodyPr>
+          <a:p>
+            <a:pPr algn="ctr"/>
+            <a:endParaRPr b="0" lang="sv-SE" sz="4400" spc="-1" strike="noStrike">
+              <a:latin typeface="Arial"/>
+            </a:endParaRPr>
+          </a:p>
+        </p:txBody>
+      </p:sp>
+      <p:sp>
+        <p:nvSpPr>
+          <p:cNvPr id="62" name="PlaceHolder 2"/>
+          <p:cNvSpPr>
+            <a:spLocks noGrp="1"/>
+          </p:cNvSpPr>
+          <p:nvPr>
+            <p:ph type="body"/>
+          </p:nvPr>
+        </p:nvSpPr>
+        <p:spPr>
+          <a:xfrm>
+            <a:off x="609480" y="1604520"/>
+            <a:ext cx="10972440" cy="1896840"/>
+          </a:xfrm>
+          <a:prstGeom prst="rect">
+            <a:avLst/>
+          </a:prstGeom>
+        </p:spPr>
+        <p:txBody>
+          <a:bodyPr lIns="0" rIns="0" tIns="0" bIns="0">
+            <a:normAutofit/>
+          </a:bodyPr>
+          <a:p>
+            <a:endParaRPr b="0" lang="sv-SE" sz="3200" spc="-1" strike="noStrike">
+              <a:latin typeface="Arial"/>
+            </a:endParaRPr>
+          </a:p>
+        </p:txBody>
+      </p:sp>
+      <p:sp>
+        <p:nvSpPr>
+          <p:cNvPr id="63" name="PlaceHolder 3"/>
+          <p:cNvSpPr>
+            <a:spLocks noGrp="1"/>
+          </p:cNvSpPr>
+          <p:nvPr>
+            <p:ph type="body"/>
+          </p:nvPr>
+        </p:nvSpPr>
+        <p:spPr>
+          <a:xfrm>
+            <a:off x="609480" y="3682080"/>
+            <a:ext cx="10972440" cy="1896840"/>
+          </a:xfrm>
+          <a:prstGeom prst="rect">
+            <a:avLst/>
+          </a:prstGeom>
+        </p:spPr>
+        <p:txBody>
+          <a:bodyPr lIns="0" rIns="0" tIns="0" bIns="0">
+            <a:normAutofit/>
+          </a:bodyPr>
+          <a:p>
+            <a:endParaRPr b="0" lang="sv-SE" sz="3200" spc="-1" strike="noStrike">
+              <a:latin typeface="Arial"/>
+            </a:endParaRPr>
+          </a:p>
+        </p:txBody>
+      </p:sp>
+    </p:spTree>
+  </p:cSld>
+</p:sldLayout>
+</file>
+
+<file path=ppt/slideLayouts/slideLayout23.xml><?xml version="1.0" encoding="utf-8"?>
+<p:sldLayout xmlns:a="http://schemas.openxmlformats.org/drawingml/2006/main" xmlns:p="http://schemas.openxmlformats.org/presentationml/2006/main" xmlns:r="http://schemas.openxmlformats.org/officeDocument/2006/relationships" xmlns:p14="http://schemas.microsoft.com/office/powerpoint/2010/main" xmlns:p15="http://schemas.microsoft.com/office/powerpoint/2012/main" xmlns:mc="http://schemas.openxmlformats.org/markup-compatibility/2006" type="fourObj" preserve="1">
+  <p:cSld name="Title, 4 Content">
+    <p:spTree>
+      <p:nvGrpSpPr>
+        <p:cNvPr id="1" name=""/>
+        <p:cNvGrpSpPr/>
+        <p:nvPr/>
+      </p:nvGrpSpPr>
+      <p:grpSpPr>
+        <a:xfrm>
+          <a:off x="0" y="0"/>
+          <a:ext cx="0" cy="0"/>
+          <a:chOff x="0" y="0"/>
+          <a:chExt cx="0" cy="0"/>
+        </a:xfrm>
+      </p:grpSpPr>
+      <p:sp>
+        <p:nvSpPr>
+          <p:cNvPr id="64" name="PlaceHolder 1"/>
+          <p:cNvSpPr>
+            <a:spLocks noGrp="1"/>
+          </p:cNvSpPr>
+          <p:nvPr>
+            <p:ph type="title"/>
+          </p:nvPr>
+        </p:nvSpPr>
+        <p:spPr>
+          <a:xfrm>
+            <a:off x="609480" y="273600"/>
+            <a:ext cx="10972440" cy="1144800"/>
+          </a:xfrm>
+          <a:prstGeom prst="rect">
+            <a:avLst/>
+          </a:prstGeom>
+        </p:spPr>
+        <p:txBody>
+          <a:bodyPr lIns="0" rIns="0" tIns="0" bIns="0" anchor="ctr">
+            <a:noAutofit/>
+          </a:bodyPr>
+          <a:p>
+            <a:pPr algn="ctr"/>
+            <a:endParaRPr b="0" lang="sv-SE" sz="4400" spc="-1" strike="noStrike">
+              <a:latin typeface="Arial"/>
+            </a:endParaRPr>
+          </a:p>
+        </p:txBody>
+      </p:sp>
+      <p:sp>
+        <p:nvSpPr>
+          <p:cNvPr id="65" name="PlaceHolder 2"/>
+          <p:cNvSpPr>
+            <a:spLocks noGrp="1"/>
+          </p:cNvSpPr>
+          <p:nvPr>
+            <p:ph type="body"/>
+          </p:nvPr>
+        </p:nvSpPr>
+        <p:spPr>
+          <a:xfrm>
+            <a:off x="609480" y="1604520"/>
+            <a:ext cx="5354280" cy="1896840"/>
+          </a:xfrm>
+          <a:prstGeom prst="rect">
+            <a:avLst/>
+          </a:prstGeom>
+        </p:spPr>
+        <p:txBody>
+          <a:bodyPr lIns="0" rIns="0" tIns="0" bIns="0">
+            <a:normAutofit/>
+          </a:bodyPr>
+          <a:p>
+            <a:endParaRPr b="0" lang="sv-SE" sz="3200" spc="-1" strike="noStrike">
+              <a:latin typeface="Arial"/>
+            </a:endParaRPr>
+          </a:p>
+        </p:txBody>
+      </p:sp>
+      <p:sp>
+        <p:nvSpPr>
+          <p:cNvPr id="66" name="PlaceHolder 3"/>
+          <p:cNvSpPr>
+            <a:spLocks noGrp="1"/>
+          </p:cNvSpPr>
+          <p:nvPr>
+            <p:ph type="body"/>
+          </p:nvPr>
+        </p:nvSpPr>
+        <p:spPr>
+          <a:xfrm>
+            <a:off x="6231960" y="1604520"/>
+            <a:ext cx="5354280" cy="1896840"/>
+          </a:xfrm>
+          <a:prstGeom prst="rect">
+            <a:avLst/>
+          </a:prstGeom>
+        </p:spPr>
+        <p:txBody>
+          <a:bodyPr lIns="0" rIns="0" tIns="0" bIns="0">
+            <a:normAutofit/>
+          </a:bodyPr>
+          <a:p>
+            <a:endParaRPr b="0" lang="sv-SE" sz="3200" spc="-1" strike="noStrike">
+              <a:latin typeface="Arial"/>
+            </a:endParaRPr>
+          </a:p>
+        </p:txBody>
+      </p:sp>
+      <p:sp>
+        <p:nvSpPr>
+          <p:cNvPr id="67" name="PlaceHolder 4"/>
+          <p:cNvSpPr>
+            <a:spLocks noGrp="1"/>
+          </p:cNvSpPr>
+          <p:nvPr>
+            <p:ph type="body"/>
+          </p:nvPr>
+        </p:nvSpPr>
+        <p:spPr>
+          <a:xfrm>
+            <a:off x="609480" y="3682080"/>
+            <a:ext cx="5354280" cy="1896840"/>
+          </a:xfrm>
+          <a:prstGeom prst="rect">
+            <a:avLst/>
+          </a:prstGeom>
+        </p:spPr>
+        <p:txBody>
+          <a:bodyPr lIns="0" rIns="0" tIns="0" bIns="0">
+            <a:normAutofit/>
+          </a:bodyPr>
+          <a:p>
+            <a:endParaRPr b="0" lang="sv-SE" sz="3200" spc="-1" strike="noStrike">
+              <a:latin typeface="Arial"/>
+            </a:endParaRPr>
+          </a:p>
+        </p:txBody>
+      </p:sp>
+      <p:sp>
+        <p:nvSpPr>
+          <p:cNvPr id="68" name="PlaceHolder 5"/>
+          <p:cNvSpPr>
+            <a:spLocks noGrp="1"/>
+          </p:cNvSpPr>
+          <p:nvPr>
+            <p:ph type="body"/>
+          </p:nvPr>
+        </p:nvSpPr>
+        <p:spPr>
+          <a:xfrm>
+            <a:off x="6231960" y="3682080"/>
+            <a:ext cx="5354280" cy="1896840"/>
+          </a:xfrm>
+          <a:prstGeom prst="rect">
+            <a:avLst/>
+          </a:prstGeom>
+        </p:spPr>
+        <p:txBody>
+          <a:bodyPr lIns="0" rIns="0" tIns="0" bIns="0">
+            <a:normAutofit/>
+          </a:bodyPr>
+          <a:p>
+            <a:endParaRPr b="0" lang="sv-SE" sz="3200" spc="-1" strike="noStrike">
+              <a:latin typeface="Arial"/>
+            </a:endParaRPr>
+          </a:p>
+        </p:txBody>
+      </p:sp>
+    </p:spTree>
+  </p:cSld>
+</p:sldLayout>
+</file>
+
+<file path=ppt/slideLayouts/slideLayout24.xml><?xml version="1.0" encoding="utf-8"?>
+<p:sldLayout xmlns:a="http://schemas.openxmlformats.org/drawingml/2006/main" xmlns:p="http://schemas.openxmlformats.org/presentationml/2006/main" xmlns:r="http://schemas.openxmlformats.org/officeDocument/2006/relationships" xmlns:p14="http://schemas.microsoft.com/office/powerpoint/2010/main" xmlns:p15="http://schemas.microsoft.com/office/powerpoint/2012/main" xmlns:mc="http://schemas.openxmlformats.org/markup-compatibility/2006" type="blank" preserve="1">
+  <p:cSld name="Title, 6 Content">
+    <p:spTree>
+      <p:nvGrpSpPr>
+        <p:cNvPr id="1" name=""/>
+        <p:cNvGrpSpPr/>
+        <p:nvPr/>
+      </p:nvGrpSpPr>
+      <p:grpSpPr>
+        <a:xfrm>
+          <a:off x="0" y="0"/>
+          <a:ext cx="0" cy="0"/>
+          <a:chOff x="0" y="0"/>
+          <a:chExt cx="0" cy="0"/>
+        </a:xfrm>
+      </p:grpSpPr>
+      <p:sp>
+        <p:nvSpPr>
+          <p:cNvPr id="69" name="PlaceHolder 1"/>
+          <p:cNvSpPr>
+            <a:spLocks noGrp="1"/>
+          </p:cNvSpPr>
+          <p:nvPr>
+            <p:ph type="title"/>
+          </p:nvPr>
+        </p:nvSpPr>
+        <p:spPr>
+          <a:xfrm>
+            <a:off x="609480" y="273600"/>
+            <a:ext cx="10972440" cy="1144800"/>
+          </a:xfrm>
+          <a:prstGeom prst="rect">
+            <a:avLst/>
+          </a:prstGeom>
+        </p:spPr>
+        <p:txBody>
+          <a:bodyPr lIns="0" rIns="0" tIns="0" bIns="0" anchor="ctr">
+            <a:noAutofit/>
+          </a:bodyPr>
+          <a:p>
+            <a:pPr algn="ctr"/>
+            <a:endParaRPr b="0" lang="sv-SE" sz="4400" spc="-1" strike="noStrike">
+              <a:latin typeface="Arial"/>
+            </a:endParaRPr>
+          </a:p>
+        </p:txBody>
+      </p:sp>
+      <p:sp>
+        <p:nvSpPr>
+          <p:cNvPr id="70" name="PlaceHolder 2"/>
+          <p:cNvSpPr>
+            <a:spLocks noGrp="1"/>
+          </p:cNvSpPr>
+          <p:nvPr>
+            <p:ph type="body"/>
+          </p:nvPr>
+        </p:nvSpPr>
+        <p:spPr>
+          <a:xfrm>
+            <a:off x="609480" y="1604520"/>
+            <a:ext cx="3533040" cy="1896840"/>
+          </a:xfrm>
+          <a:prstGeom prst="rect">
+            <a:avLst/>
+          </a:prstGeom>
+        </p:spPr>
+        <p:txBody>
+          <a:bodyPr lIns="0" rIns="0" tIns="0" bIns="0">
+            <a:normAutofit/>
+          </a:bodyPr>
+          <a:p>
+            <a:endParaRPr b="0" lang="sv-SE" sz="3200" spc="-1" strike="noStrike">
+              <a:latin typeface="Arial"/>
+            </a:endParaRPr>
+          </a:p>
+        </p:txBody>
+      </p:sp>
+      <p:sp>
+        <p:nvSpPr>
+          <p:cNvPr id="71" name="PlaceHolder 3"/>
+          <p:cNvSpPr>
+            <a:spLocks noGrp="1"/>
+          </p:cNvSpPr>
+          <p:nvPr>
+            <p:ph type="body"/>
+          </p:nvPr>
+        </p:nvSpPr>
+        <p:spPr>
+          <a:xfrm>
+            <a:off x="4319640" y="1604520"/>
+            <a:ext cx="3533040" cy="1896840"/>
+          </a:xfrm>
+          <a:prstGeom prst="rect">
+            <a:avLst/>
+          </a:prstGeom>
+        </p:spPr>
+        <p:txBody>
+          <a:bodyPr lIns="0" rIns="0" tIns="0" bIns="0">
+            <a:normAutofit/>
+          </a:bodyPr>
+          <a:p>
+            <a:endParaRPr b="0" lang="sv-SE" sz="3200" spc="-1" strike="noStrike">
+              <a:latin typeface="Arial"/>
+            </a:endParaRPr>
+          </a:p>
+        </p:txBody>
+      </p:sp>
+      <p:sp>
+        <p:nvSpPr>
+          <p:cNvPr id="72" name="PlaceHolder 4"/>
+          <p:cNvSpPr>
+            <a:spLocks noGrp="1"/>
+          </p:cNvSpPr>
+          <p:nvPr>
+            <p:ph type="body"/>
+          </p:nvPr>
+        </p:nvSpPr>
+        <p:spPr>
+          <a:xfrm>
+            <a:off x="8029800" y="1604520"/>
+            <a:ext cx="3533040" cy="1896840"/>
+          </a:xfrm>
+          <a:prstGeom prst="rect">
+            <a:avLst/>
+          </a:prstGeom>
+        </p:spPr>
+        <p:txBody>
+          <a:bodyPr lIns="0" rIns="0" tIns="0" bIns="0">
+            <a:normAutofit/>
+          </a:bodyPr>
+          <a:p>
+            <a:endParaRPr b="0" lang="sv-SE" sz="3200" spc="-1" strike="noStrike">
+              <a:latin typeface="Arial"/>
+            </a:endParaRPr>
+          </a:p>
+        </p:txBody>
+      </p:sp>
+      <p:sp>
+        <p:nvSpPr>
+          <p:cNvPr id="73" name="PlaceHolder 5"/>
+          <p:cNvSpPr>
+            <a:spLocks noGrp="1"/>
+          </p:cNvSpPr>
+          <p:nvPr>
+            <p:ph type="body"/>
+          </p:nvPr>
+        </p:nvSpPr>
+        <p:spPr>
+          <a:xfrm>
+            <a:off x="609480" y="3682080"/>
+            <a:ext cx="3533040" cy="1896840"/>
+          </a:xfrm>
+          <a:prstGeom prst="rect">
+            <a:avLst/>
+          </a:prstGeom>
+        </p:spPr>
+        <p:txBody>
+          <a:bodyPr lIns="0" rIns="0" tIns="0" bIns="0">
+            <a:normAutofit/>
+          </a:bodyPr>
+          <a:p>
+            <a:endParaRPr b="0" lang="sv-SE" sz="3200" spc="-1" strike="noStrike">
+              <a:latin typeface="Arial"/>
+            </a:endParaRPr>
+          </a:p>
+        </p:txBody>
+      </p:sp>
+      <p:sp>
+        <p:nvSpPr>
+          <p:cNvPr id="74" name="PlaceHolder 6"/>
+          <p:cNvSpPr>
+            <a:spLocks noGrp="1"/>
+          </p:cNvSpPr>
+          <p:nvPr>
+            <p:ph type="body"/>
+          </p:nvPr>
+        </p:nvSpPr>
+        <p:spPr>
+          <a:xfrm>
+            <a:off x="4319640" y="3682080"/>
+            <a:ext cx="3533040" cy="1896840"/>
+          </a:xfrm>
+          <a:prstGeom prst="rect">
+            <a:avLst/>
+          </a:prstGeom>
+        </p:spPr>
+        <p:txBody>
+          <a:bodyPr lIns="0" rIns="0" tIns="0" bIns="0">
+            <a:normAutofit/>
+          </a:bodyPr>
+          <a:p>
+            <a:endParaRPr b="0" lang="sv-SE" sz="3200" spc="-1" strike="noStrike">
+              <a:latin typeface="Arial"/>
+            </a:endParaRPr>
+          </a:p>
+        </p:txBody>
+      </p:sp>
+      <p:sp>
+        <p:nvSpPr>
+          <p:cNvPr id="75" name="PlaceHolder 7"/>
+          <p:cNvSpPr>
+            <a:spLocks noGrp="1"/>
+          </p:cNvSpPr>
+          <p:nvPr>
+            <p:ph type="body"/>
+          </p:nvPr>
+        </p:nvSpPr>
+        <p:spPr>
+          <a:xfrm>
+            <a:off x="8029800" y="3682080"/>
+            <a:ext cx="3533040" cy="1896840"/>
+          </a:xfrm>
+          <a:prstGeom prst="rect">
+            <a:avLst/>
+          </a:prstGeom>
+        </p:spPr>
+        <p:txBody>
+          <a:bodyPr lIns="0" rIns="0" tIns="0" bIns="0">
+            <a:normAutofit/>
+          </a:bodyPr>
+          <a:p>
             <a:endParaRPr b="0" lang="sv-SE" sz="3200" spc="-1" strike="noStrike">
               <a:latin typeface="Arial"/>
             </a:endParaRPr>
@@ -1423,19 +2781,31 @@
               <a:rPr b="0" lang="sv-SE" sz="4400" spc="-1" strike="noStrike">
                 <a:latin typeface="Arial"/>
               </a:rPr>
-              <a:t>Click to </a:t>
+              <a:t>Click </a:t>
             </a:r>
             <a:r>
               <a:rPr b="0" lang="sv-SE" sz="4400" spc="-1" strike="noStrike">
                 <a:latin typeface="Arial"/>
               </a:rPr>
-              <a:t>edit the </a:t>
+              <a:t>to edit </a:t>
             </a:r>
             <a:r>
               <a:rPr b="0" lang="sv-SE" sz="4400" spc="-1" strike="noStrike">
                 <a:latin typeface="Arial"/>
               </a:rPr>
-              <a:t>title text </a:t>
+              <a:t>the </a:t>
+            </a:r>
+            <a:r>
+              <a:rPr b="0" lang="sv-SE" sz="4400" spc="-1" strike="noStrike">
+                <a:latin typeface="Arial"/>
+              </a:rPr>
+              <a:t>title </a:t>
+            </a:r>
+            <a:r>
+              <a:rPr b="0" lang="sv-SE" sz="4400" spc="-1" strike="noStrike">
+                <a:latin typeface="Arial"/>
+              </a:rPr>
+              <a:t>text </a:t>
             </a:r>
             <a:r>
               <a:rPr b="0" lang="sv-SE" sz="4400" spc="-1" strike="noStrike">
@@ -1644,6 +3014,266 @@
     <p:sldLayoutId id="2147483658" r:id="rId11"/>
     <p:sldLayoutId id="2147483659" r:id="rId12"/>
     <p:sldLayoutId id="2147483660" r:id="rId13"/>
+  </p:sldLayoutIdLst>
+</p:sldMaster>
+</file>
+
+<file path=ppt/slideMasters/slideMaster2.xml><?xml version="1.0" encoding="utf-8"?>
+<p:sldMaster xmlns:a="http://schemas.openxmlformats.org/drawingml/2006/main" xmlns:p="http://schemas.openxmlformats.org/presentationml/2006/main" xmlns:r="http://schemas.openxmlformats.org/officeDocument/2006/relationships" xmlns:p14="http://schemas.microsoft.com/office/powerpoint/2010/main" xmlns:p15="http://schemas.microsoft.com/office/powerpoint/2012/main" xmlns:mc="http://schemas.openxmlformats.org/markup-compatibility/2006">
+  <p:cSld>
+    <p:bg>
+      <p:bgPr>
+        <a:solidFill>
+          <a:srgbClr val="ffffff"/>
+        </a:solidFill>
+      </p:bgPr>
+    </p:bg>
+    <p:spTree>
+      <p:nvGrpSpPr>
+        <p:cNvPr id="1" name=""/>
+        <p:cNvGrpSpPr/>
+        <p:nvPr/>
+      </p:nvGrpSpPr>
+      <p:grpSpPr>
+        <a:xfrm>
+          <a:off x="0" y="0"/>
+          <a:ext cx="0" cy="0"/>
+          <a:chOff x="0" y="0"/>
+          <a:chExt cx="0" cy="0"/>
+        </a:xfrm>
+      </p:grpSpPr>
+      <p:sp>
+        <p:nvSpPr>
+          <p:cNvPr id="38" name="PlaceHolder 1"/>
+          <p:cNvSpPr>
+            <a:spLocks noGrp="1"/>
+          </p:cNvSpPr>
+          <p:nvPr>
+            <p:ph type="title"/>
+          </p:nvPr>
+        </p:nvSpPr>
+        <p:spPr>
+          <a:xfrm>
+            <a:off x="609480" y="273600"/>
+            <a:ext cx="10972440" cy="1144800"/>
+          </a:xfrm>
+          <a:prstGeom prst="rect">
+            <a:avLst/>
+          </a:prstGeom>
+        </p:spPr>
+        <p:txBody>
+          <a:bodyPr lIns="0" rIns="0" tIns="0" bIns="0" anchor="ctr">
+            <a:noAutofit/>
+          </a:bodyPr>
+          <a:p>
+            <a:pPr algn="ctr"/>
+            <a:r>
+              <a:rPr b="0" lang="sv-SE" sz="4400" spc="-1" strike="noStrike">
+                <a:latin typeface="Arial"/>
+              </a:rPr>
+              <a:t>Click to edit the title text format</a:t>
+            </a:r>
+            <a:endParaRPr b="0" lang="sv-SE" sz="4400" spc="-1" strike="noStrike">
+              <a:latin typeface="Arial"/>
+            </a:endParaRPr>
+          </a:p>
+        </p:txBody>
+      </p:sp>
+      <p:sp>
+        <p:nvSpPr>
+          <p:cNvPr id="39" name="PlaceHolder 2"/>
+          <p:cNvSpPr>
+            <a:spLocks noGrp="1"/>
+          </p:cNvSpPr>
+          <p:nvPr>
+            <p:ph type="body"/>
+          </p:nvPr>
+        </p:nvSpPr>
+        <p:spPr>
+          <a:xfrm>
+            <a:off x="609480" y="1604520"/>
+            <a:ext cx="10972440" cy="3977280"/>
+          </a:xfrm>
+          <a:prstGeom prst="rect">
+            <a:avLst/>
+          </a:prstGeom>
+        </p:spPr>
+        <p:txBody>
+          <a:bodyPr lIns="0" rIns="0" tIns="0" bIns="0">
+            <a:normAutofit/>
+          </a:bodyPr>
+          <a:p>
+            <a:pPr marL="432000" indent="-324000">
+              <a:spcBef>
+                <a:spcPts val="1417"/>
+              </a:spcBef>
+              <a:buClr>
+                <a:srgbClr val="000000"/>
+              </a:buClr>
+              <a:buSzPct val="45000"/>
+              <a:buFont typeface="Wingdings" charset="2"/>
+              <a:buChar char=""/>
+            </a:pPr>
+            <a:r>
+              <a:rPr b="0" lang="sv-SE" sz="3200" spc="-1" strike="noStrike">
+                <a:latin typeface="Arial"/>
+              </a:rPr>
+              <a:t>Click to edit the outline text format</a:t>
+            </a:r>
+            <a:endParaRPr b="0" lang="sv-SE" sz="3200" spc="-1" strike="noStrike">
+              <a:latin typeface="Arial"/>
+            </a:endParaRPr>
+          </a:p>
+          <a:p>
+            <a:pPr lvl="1" marL="864000" indent="-324000">
+              <a:spcBef>
+                <a:spcPts val="1134"/>
+              </a:spcBef>
+              <a:buClr>
+                <a:srgbClr val="000000"/>
+              </a:buClr>
+              <a:buSzPct val="75000"/>
+              <a:buFont typeface="Symbol" charset="2"/>
+              <a:buChar char=""/>
+            </a:pPr>
+            <a:r>
+              <a:rPr b="0" lang="sv-SE" sz="2800" spc="-1" strike="noStrike">
+                <a:latin typeface="Arial"/>
+              </a:rPr>
+              <a:t>Second Outline Level</a:t>
+            </a:r>
+            <a:endParaRPr b="0" lang="sv-SE" sz="2800" spc="-1" strike="noStrike">
+              <a:latin typeface="Arial"/>
+            </a:endParaRPr>
+          </a:p>
+          <a:p>
+            <a:pPr lvl="2" marL="1296000" indent="-288000">
+              <a:spcBef>
+                <a:spcPts val="850"/>
+              </a:spcBef>
+              <a:buClr>
+                <a:srgbClr val="000000"/>
+              </a:buClr>
+              <a:buSzPct val="45000"/>
+              <a:buFont typeface="Wingdings" charset="2"/>
+              <a:buChar char=""/>
+            </a:pPr>
+            <a:r>
+              <a:rPr b="0" lang="sv-SE" sz="2400" spc="-1" strike="noStrike">
+                <a:latin typeface="Arial"/>
+              </a:rPr>
+              <a:t>Third Outline Level</a:t>
+            </a:r>
+            <a:endParaRPr b="0" lang="sv-SE" sz="2400" spc="-1" strike="noStrike">
+              <a:latin typeface="Arial"/>
+            </a:endParaRPr>
+          </a:p>
+          <a:p>
+            <a:pPr lvl="3" marL="1728000" indent="-216000">
+              <a:spcBef>
+                <a:spcPts val="567"/>
+              </a:spcBef>
+              <a:buClr>
+                <a:srgbClr val="000000"/>
+              </a:buClr>
+              <a:buSzPct val="75000"/>
+              <a:buFont typeface="Symbol" charset="2"/>
+              <a:buChar char=""/>
+            </a:pPr>
+            <a:r>
+              <a:rPr b="0" lang="sv-SE" sz="2000" spc="-1" strike="noStrike">
+                <a:latin typeface="Arial"/>
+              </a:rPr>
+              <a:t>Fourth Outline Level</a:t>
+            </a:r>
+            <a:endParaRPr b="0" lang="sv-SE" sz="2000" spc="-1" strike="noStrike">
+              <a:latin typeface="Arial"/>
+            </a:endParaRPr>
+          </a:p>
+          <a:p>
+            <a:pPr lvl="4" marL="2160000" indent="-216000">
+              <a:spcBef>
+                <a:spcPts val="283"/>
+              </a:spcBef>
+              <a:buClr>
+                <a:srgbClr val="000000"/>
+              </a:buClr>
+              <a:buSzPct val="45000"/>
+              <a:buFont typeface="Wingdings" charset="2"/>
+              <a:buChar char=""/>
+            </a:pPr>
+            <a:r>
+              <a:rPr b="0" lang="sv-SE" sz="2000" spc="-1" strike="noStrike">
+                <a:latin typeface="Arial"/>
+              </a:rPr>
+              <a:t>Fifth Outline Level</a:t>
+            </a:r>
+            <a:endParaRPr b="0" lang="sv-SE" sz="2000" spc="-1" strike="noStrike">
+              <a:latin typeface="Arial"/>
+            </a:endParaRPr>
+          </a:p>
+          <a:p>
+            <a:pPr lvl="5" marL="2592000" indent="-216000">
+              <a:spcBef>
+                <a:spcPts val="283"/>
+              </a:spcBef>
+              <a:buClr>
+                <a:srgbClr val="000000"/>
+              </a:buClr>
+              <a:buSzPct val="45000"/>
+              <a:buFont typeface="Wingdings" charset="2"/>
+              <a:buChar char=""/>
+            </a:pPr>
+            <a:r>
+              <a:rPr b="0" lang="sv-SE" sz="2000" spc="-1" strike="noStrike">
+                <a:latin typeface="Arial"/>
+              </a:rPr>
+              <a:t>Sixth Outline Level</a:t>
+            </a:r>
+            <a:endParaRPr b="0" lang="sv-SE" sz="2000" spc="-1" strike="noStrike">
+              <a:latin typeface="Arial"/>
+            </a:endParaRPr>
+          </a:p>
+          <a:p>
+            <a:pPr lvl="6" marL="3024000" indent="-216000">
+              <a:spcBef>
+                <a:spcPts val="283"/>
+              </a:spcBef>
+              <a:buClr>
+                <a:srgbClr val="000000"/>
+              </a:buClr>
+              <a:buSzPct val="45000"/>
+              <a:buFont typeface="Wingdings" charset="2"/>
+              <a:buChar char=""/>
+            </a:pPr>
+            <a:r>
+              <a:rPr b="0" lang="sv-SE" sz="2000" spc="-1" strike="noStrike">
+                <a:latin typeface="Arial"/>
+              </a:rPr>
+              <a:t>Seventh Outline Level</a:t>
+            </a:r>
+            <a:endParaRPr b="0" lang="sv-SE" sz="2000" spc="-1" strike="noStrike">
+              <a:latin typeface="Arial"/>
+            </a:endParaRPr>
+          </a:p>
+        </p:txBody>
+      </p:sp>
+    </p:spTree>
+  </p:cSld>
+  <p:clrMap bg1="lt1" bg2="lt2" tx1="dk1" tx2="dk2" accent1="accent1" accent2="accent2" accent3="accent3" accent4="accent4" accent5="accent5" accent6="accent6" hlink="hlink" folHlink="folHlink"/>
+  <p:sldLayoutIdLst>
+    <p:sldLayoutId id="2147483662" r:id="rId2"/>
+    <p:sldLayoutId id="2147483663" r:id="rId3"/>
+    <p:sldLayoutId id="2147483664" r:id="rId4"/>
+    <p:sldLayoutId id="2147483665" r:id="rId5"/>
+    <p:sldLayoutId id="2147483666" r:id="rId6"/>
+    <p:sldLayoutId id="2147483667" r:id="rId7"/>
+    <p:sldLayoutId id="2147483668" r:id="rId8"/>
+    <p:sldLayoutId id="2147483669" r:id="rId9"/>
+    <p:sldLayoutId id="2147483670" r:id="rId10"/>
+    <p:sldLayoutId id="2147483671" r:id="rId11"/>
+    <p:sldLayoutId id="2147483672" r:id="rId12"/>
+    <p:sldLayoutId id="2147483673" r:id="rId13"/>
   </p:sldLayoutIdLst>
 </p:sldMaster>
 </file>
@@ -1667,14 +3297,14 @@
       </p:grpSpPr>
       <p:sp>
         <p:nvSpPr>
-          <p:cNvPr id="38" name="CustomShape 1"/>
+          <p:cNvPr id="76" name="CustomShape 1"/>
           <p:cNvSpPr/>
           <p:nvPr/>
         </p:nvSpPr>
         <p:spPr>
           <a:xfrm>
             <a:off x="3564360" y="3875400"/>
-            <a:ext cx="1510200" cy="515880"/>
+            <a:ext cx="1509840" cy="515880"/>
           </a:xfrm>
           <a:prstGeom prst="rect">
             <a:avLst/>
@@ -1718,14 +3348,14 @@
       </p:sp>
       <p:sp>
         <p:nvSpPr>
-          <p:cNvPr id="39" name="CustomShape 2"/>
+          <p:cNvPr id="77" name="CustomShape 2"/>
           <p:cNvSpPr/>
           <p:nvPr/>
         </p:nvSpPr>
         <p:spPr>
           <a:xfrm>
             <a:off x="72000" y="81000"/>
-            <a:ext cx="2232000" cy="363960"/>
+            <a:ext cx="2231640" cy="363960"/>
           </a:xfrm>
           <a:prstGeom prst="rect">
             <a:avLst/>
@@ -1771,14 +3401,14 @@
       </p:sp>
       <p:sp>
         <p:nvSpPr>
-          <p:cNvPr id="40" name="CustomShape 3"/>
+          <p:cNvPr id="78" name="CustomShape 3"/>
           <p:cNvSpPr/>
           <p:nvPr/>
         </p:nvSpPr>
         <p:spPr>
           <a:xfrm>
             <a:off x="7812000" y="1188000"/>
-            <a:ext cx="1996200" cy="987480"/>
+            <a:ext cx="1995840" cy="987120"/>
           </a:xfrm>
           <a:prstGeom prst="roundRect">
             <a:avLst>
@@ -1836,14 +3466,14 @@
       </p:sp>
       <p:sp>
         <p:nvSpPr>
-          <p:cNvPr id="41" name="CustomShape 4"/>
+          <p:cNvPr id="79" name="CustomShape 4"/>
           <p:cNvSpPr/>
           <p:nvPr/>
         </p:nvSpPr>
         <p:spPr>
           <a:xfrm>
             <a:off x="4176000" y="1512720"/>
-            <a:ext cx="3382920" cy="430200"/>
+            <a:ext cx="3382560" cy="429840"/>
           </a:xfrm>
           <a:custGeom>
             <a:avLst/>
@@ -1897,14 +3527,14 @@
       </p:sp>
       <p:sp>
         <p:nvSpPr>
-          <p:cNvPr id="42" name="CustomShape 5"/>
+          <p:cNvPr id="80" name="CustomShape 5"/>
           <p:cNvSpPr/>
           <p:nvPr/>
         </p:nvSpPr>
         <p:spPr>
           <a:xfrm>
             <a:off x="6804000" y="3875400"/>
-            <a:ext cx="1773000" cy="515880"/>
+            <a:ext cx="1772640" cy="515880"/>
           </a:xfrm>
           <a:prstGeom prst="rect">
             <a:avLst/>
@@ -1948,7 +3578,7 @@
       </p:sp>
       <p:sp>
         <p:nvSpPr>
-          <p:cNvPr id="43" name="Line 6"/>
+          <p:cNvPr id="81" name="Line 6"/>
           <p:cNvSpPr/>
           <p:nvPr/>
         </p:nvSpPr>
@@ -1976,7 +3606,7 @@
       </p:sp>
       <p:sp>
         <p:nvSpPr>
-          <p:cNvPr id="44" name="Line 7"/>
+          <p:cNvPr id="82" name="Line 7"/>
           <p:cNvSpPr/>
           <p:nvPr/>
         </p:nvSpPr>
@@ -2005,7 +3635,7 @@
       </p:sp>
       <p:sp>
         <p:nvSpPr>
-          <p:cNvPr id="45" name="Line 8"/>
+          <p:cNvPr id="83" name="Line 8"/>
           <p:cNvSpPr/>
           <p:nvPr/>
         </p:nvSpPr>
@@ -2033,14 +3663,14 @@
       </p:sp>
       <p:sp>
         <p:nvSpPr>
-          <p:cNvPr id="46" name="CustomShape 9"/>
+          <p:cNvPr id="84" name="CustomShape 9"/>
           <p:cNvSpPr/>
           <p:nvPr/>
         </p:nvSpPr>
         <p:spPr>
           <a:xfrm>
             <a:off x="8604000" y="3600000"/>
-            <a:ext cx="3105000" cy="302760"/>
+            <a:ext cx="3104640" cy="302760"/>
           </a:xfrm>
           <a:prstGeom prst="rect">
             <a:avLst/>
@@ -2084,14 +3714,14 @@
       </p:sp>
       <p:sp>
         <p:nvSpPr>
-          <p:cNvPr id="47" name="CustomShape 10"/>
+          <p:cNvPr id="85" name="CustomShape 10"/>
           <p:cNvSpPr/>
           <p:nvPr/>
         </p:nvSpPr>
         <p:spPr>
           <a:xfrm>
             <a:off x="5022360" y="4668120"/>
-            <a:ext cx="2284200" cy="1414440"/>
+            <a:ext cx="2283840" cy="1414080"/>
           </a:xfrm>
           <a:prstGeom prst="roundRect">
             <a:avLst>
@@ -2167,14 +3797,14 @@
       </p:sp>
       <p:sp>
         <p:nvSpPr>
-          <p:cNvPr id="48" name="CustomShape 11"/>
+          <p:cNvPr id="86" name="CustomShape 11"/>
           <p:cNvSpPr/>
           <p:nvPr/>
         </p:nvSpPr>
         <p:spPr>
           <a:xfrm>
             <a:off x="5022360" y="4668120"/>
-            <a:ext cx="2284200" cy="1414440"/>
+            <a:ext cx="2283840" cy="1414080"/>
           </a:xfrm>
           <a:prstGeom prst="roundRect">
             <a:avLst>
@@ -2250,14 +3880,14 @@
       </p:sp>
       <p:sp>
         <p:nvSpPr>
-          <p:cNvPr id="49" name="CustomShape 12"/>
+          <p:cNvPr id="87" name="CustomShape 12"/>
           <p:cNvSpPr/>
           <p:nvPr/>
         </p:nvSpPr>
         <p:spPr>
           <a:xfrm>
             <a:off x="1890720" y="5760000"/>
-            <a:ext cx="1996200" cy="987480"/>
+            <a:ext cx="1995840" cy="987120"/>
           </a:xfrm>
           <a:prstGeom prst="roundRect">
             <a:avLst>
@@ -2315,14 +3945,14 @@
       </p:sp>
       <p:sp>
         <p:nvSpPr>
-          <p:cNvPr id="50" name="CustomShape 13"/>
+          <p:cNvPr id="88" name="CustomShape 13"/>
           <p:cNvSpPr/>
           <p:nvPr/>
         </p:nvSpPr>
         <p:spPr>
           <a:xfrm>
             <a:off x="3276000" y="4952520"/>
-            <a:ext cx="1773000" cy="302760"/>
+            <a:ext cx="1772640" cy="302760"/>
           </a:xfrm>
           <a:prstGeom prst="rect">
             <a:avLst/>
@@ -2366,7 +3996,7 @@
       </p:sp>
       <p:sp>
         <p:nvSpPr>
-          <p:cNvPr id="51" name="Line 14"/>
+          <p:cNvPr id="89" name="Line 14"/>
           <p:cNvSpPr/>
           <p:nvPr/>
         </p:nvSpPr>
@@ -2394,7 +4024,7 @@
       </p:sp>
       <p:sp>
         <p:nvSpPr>
-          <p:cNvPr id="52" name="Line 15"/>
+          <p:cNvPr id="90" name="Line 15"/>
           <p:cNvSpPr/>
           <p:nvPr/>
         </p:nvSpPr>
@@ -2423,14 +4053,14 @@
       </p:sp>
       <p:sp>
         <p:nvSpPr>
-          <p:cNvPr id="53" name="CustomShape 16"/>
+          <p:cNvPr id="91" name="CustomShape 16"/>
           <p:cNvSpPr/>
           <p:nvPr/>
         </p:nvSpPr>
         <p:spPr>
           <a:xfrm flipH="1" rot="16305600">
-            <a:off x="1412280" y="3830040"/>
-            <a:ext cx="3122280" cy="288000"/>
+            <a:off x="1411920" y="3830040"/>
+            <a:ext cx="3121920" cy="287280"/>
           </a:xfrm>
           <a:custGeom>
             <a:avLst/>
@@ -2484,14 +4114,14 @@
       </p:sp>
       <p:sp>
         <p:nvSpPr>
-          <p:cNvPr id="54" name="CustomShape 17"/>
+          <p:cNvPr id="92" name="CustomShape 17"/>
           <p:cNvSpPr/>
           <p:nvPr/>
         </p:nvSpPr>
         <p:spPr>
           <a:xfrm>
             <a:off x="1682280" y="655920"/>
-            <a:ext cx="2284200" cy="1414440"/>
+            <a:ext cx="2283840" cy="1414080"/>
           </a:xfrm>
           <a:prstGeom prst="roundRect">
             <a:avLst>
@@ -2545,14 +4175,14 @@
       </p:sp>
       <p:sp>
         <p:nvSpPr>
-          <p:cNvPr id="55" name="CustomShape 18"/>
+          <p:cNvPr id="93" name="CustomShape 18"/>
           <p:cNvSpPr/>
           <p:nvPr/>
         </p:nvSpPr>
         <p:spPr>
           <a:xfrm>
             <a:off x="162720" y="2683440"/>
-            <a:ext cx="1060200" cy="987480"/>
+            <a:ext cx="1059840" cy="987120"/>
           </a:xfrm>
           <a:prstGeom prst="roundRect">
             <a:avLst>
@@ -2610,14 +4240,14 @@
       </p:sp>
       <p:sp>
         <p:nvSpPr>
-          <p:cNvPr id="56" name="CustomShape 19"/>
+          <p:cNvPr id="94" name="CustomShape 19"/>
           <p:cNvSpPr/>
           <p:nvPr/>
         </p:nvSpPr>
         <p:spPr>
           <a:xfrm>
             <a:off x="1368000" y="2664000"/>
-            <a:ext cx="1222920" cy="987480"/>
+            <a:ext cx="1222560" cy="987120"/>
           </a:xfrm>
           <a:prstGeom prst="roundRect">
             <a:avLst>
@@ -2675,7 +4305,7 @@
       </p:sp>
       <p:sp>
         <p:nvSpPr>
-          <p:cNvPr id="57" name="Line 20"/>
+          <p:cNvPr id="95" name="Line 20"/>
           <p:cNvSpPr/>
           <p:nvPr/>
         </p:nvSpPr>
@@ -2704,7 +4334,7 @@
       </p:sp>
       <p:sp>
         <p:nvSpPr>
-          <p:cNvPr id="58" name="Line 21"/>
+          <p:cNvPr id="96" name="Line 21"/>
           <p:cNvSpPr/>
           <p:nvPr/>
         </p:nvSpPr>
@@ -2733,14 +4363,14 @@
       </p:sp>
       <p:sp>
         <p:nvSpPr>
-          <p:cNvPr id="59" name="CustomShape 22"/>
+          <p:cNvPr id="97" name="CustomShape 22"/>
           <p:cNvSpPr/>
           <p:nvPr/>
         </p:nvSpPr>
         <p:spPr>
           <a:xfrm>
             <a:off x="5040000" y="541080"/>
-            <a:ext cx="2232000" cy="912960"/>
+            <a:ext cx="2231640" cy="912600"/>
           </a:xfrm>
           <a:prstGeom prst="rect">
             <a:avLst/>
@@ -2826,14 +4456,14 @@
       </p:sp>
       <p:sp>
         <p:nvSpPr>
-          <p:cNvPr id="60" name="CustomShape 23"/>
+          <p:cNvPr id="98" name="CustomShape 23"/>
           <p:cNvSpPr/>
           <p:nvPr/>
         </p:nvSpPr>
         <p:spPr>
           <a:xfrm>
             <a:off x="1512000" y="4329720"/>
-            <a:ext cx="1224000" cy="638280"/>
+            <a:ext cx="1223640" cy="638280"/>
           </a:xfrm>
           <a:prstGeom prst="rect">
             <a:avLst/>
@@ -2909,14 +4539,14 @@
       </p:grpSpPr>
       <p:sp>
         <p:nvSpPr>
-          <p:cNvPr id="61" name="CustomShape 1"/>
+          <p:cNvPr id="99" name="CustomShape 1"/>
           <p:cNvSpPr/>
           <p:nvPr/>
         </p:nvSpPr>
         <p:spPr>
           <a:xfrm>
             <a:off x="10584000" y="4700160"/>
-            <a:ext cx="1492920" cy="987480"/>
+            <a:ext cx="1492560" cy="987120"/>
           </a:xfrm>
           <a:prstGeom prst="roundRect">
             <a:avLst>
@@ -2974,14 +4604,14 @@
       </p:sp>
       <p:sp>
         <p:nvSpPr>
-          <p:cNvPr id="62" name="CustomShape 2"/>
+          <p:cNvPr id="100" name="CustomShape 2"/>
           <p:cNvSpPr/>
           <p:nvPr/>
         </p:nvSpPr>
         <p:spPr>
           <a:xfrm>
             <a:off x="10410840" y="4484160"/>
-            <a:ext cx="1492920" cy="987480"/>
+            <a:ext cx="1492560" cy="987120"/>
           </a:xfrm>
           <a:prstGeom prst="roundRect">
             <a:avLst>
@@ -3039,14 +4669,14 @@
       </p:sp>
       <p:sp>
         <p:nvSpPr>
-          <p:cNvPr id="63" name="CustomShape 3"/>
+          <p:cNvPr id="101" name="CustomShape 3"/>
           <p:cNvSpPr/>
           <p:nvPr/>
         </p:nvSpPr>
         <p:spPr>
           <a:xfrm>
             <a:off x="72000" y="81000"/>
-            <a:ext cx="2232000" cy="363960"/>
+            <a:ext cx="2231640" cy="363960"/>
           </a:xfrm>
           <a:prstGeom prst="rect">
             <a:avLst/>
@@ -3092,14 +4722,14 @@
       </p:sp>
       <p:sp>
         <p:nvSpPr>
-          <p:cNvPr id="64" name="CustomShape 4"/>
+          <p:cNvPr id="102" name="CustomShape 4"/>
           <p:cNvSpPr/>
           <p:nvPr/>
         </p:nvSpPr>
         <p:spPr>
           <a:xfrm>
             <a:off x="3132000" y="792000"/>
-            <a:ext cx="5327640" cy="5471640"/>
+            <a:ext cx="5327280" cy="5471280"/>
           </a:xfrm>
           <a:prstGeom prst="roundRect">
             <a:avLst>
@@ -3151,14 +4781,14 @@
       </p:sp>
       <p:sp>
         <p:nvSpPr>
-          <p:cNvPr id="65" name="CustomShape 5"/>
+          <p:cNvPr id="103" name="CustomShape 5"/>
           <p:cNvSpPr/>
           <p:nvPr/>
         </p:nvSpPr>
         <p:spPr>
           <a:xfrm>
             <a:off x="144000" y="3043800"/>
-            <a:ext cx="1492920" cy="987480"/>
+            <a:ext cx="1492560" cy="987120"/>
           </a:xfrm>
           <a:prstGeom prst="roundRect">
             <a:avLst>
@@ -3216,7 +4846,7 @@
       </p:sp>
       <p:pic>
         <p:nvPicPr>
-          <p:cNvPr id="66" name="" descr=""/>
+          <p:cNvPr id="104" name="" descr=""/>
           <p:cNvPicPr/>
           <p:nvPr/>
         </p:nvPicPr>
@@ -3229,7 +4859,7 @@
         <p:spPr>
           <a:xfrm>
             <a:off x="1548000" y="2736000"/>
-            <a:ext cx="3995640" cy="2673000"/>
+            <a:ext cx="3995280" cy="2672640"/>
           </a:xfrm>
           <a:prstGeom prst="rect">
             <a:avLst/>
@@ -3241,14 +4871,14 @@
       </p:pic>
       <p:sp>
         <p:nvSpPr>
-          <p:cNvPr id="67" name="CustomShape 6"/>
+          <p:cNvPr id="105" name="CustomShape 6"/>
           <p:cNvSpPr/>
           <p:nvPr/>
         </p:nvSpPr>
         <p:spPr>
           <a:xfrm>
             <a:off x="144360" y="4196160"/>
-            <a:ext cx="1636560" cy="987480"/>
+            <a:ext cx="1636200" cy="987120"/>
           </a:xfrm>
           <a:prstGeom prst="roundRect">
             <a:avLst>
@@ -3306,14 +4936,14 @@
       </p:sp>
       <p:sp>
         <p:nvSpPr>
-          <p:cNvPr id="68" name="CustomShape 7"/>
+          <p:cNvPr id="106" name="CustomShape 7"/>
           <p:cNvSpPr/>
           <p:nvPr/>
         </p:nvSpPr>
         <p:spPr>
           <a:xfrm>
             <a:off x="5669280" y="2520000"/>
-            <a:ext cx="2538360" cy="1512000"/>
+            <a:ext cx="2538000" cy="1511640"/>
           </a:xfrm>
           <a:prstGeom prst="rect">
             <a:avLst/>
@@ -3348,7 +4978,11 @@
             </a:pPr>
             <a:r>
               <a:rPr b="0" lang="sv-SE" sz="1800" spc="-1" strike="noStrike">
+                <a:solidFill>
+                  <a:srgbClr val="000000"/>
+                </a:solidFill>
                 <a:latin typeface="Arial"/>
+                <a:ea typeface="DejaVu Sans"/>
               </a:rPr>
               <a:t>Filtering</a:t>
             </a:r>
@@ -3364,7 +4998,11 @@
             </a:pPr>
             <a:r>
               <a:rPr b="0" lang="sv-SE" sz="1800" spc="-1" strike="noStrike">
+                <a:solidFill>
+                  <a:srgbClr val="000000"/>
+                </a:solidFill>
                 <a:latin typeface="Arial"/>
+                <a:ea typeface="DejaVu Sans"/>
               </a:rPr>
               <a:t>Data transformation</a:t>
             </a:r>
@@ -3380,7 +5018,11 @@
             </a:pPr>
             <a:r>
               <a:rPr b="0" lang="sv-SE" sz="1800" spc="-1" strike="noStrike">
+                <a:solidFill>
+                  <a:srgbClr val="000000"/>
+                </a:solidFill>
                 <a:latin typeface="Arial"/>
+                <a:ea typeface="DejaVu Sans"/>
               </a:rPr>
               <a:t>Data aggregation</a:t>
             </a:r>
@@ -3396,7 +5038,11 @@
             </a:pPr>
             <a:r>
               <a:rPr b="0" lang="sv-SE" sz="1800" spc="-1" strike="noStrike">
+                <a:solidFill>
+                  <a:srgbClr val="000000"/>
+                </a:solidFill>
                 <a:latin typeface="Arial"/>
+                <a:ea typeface="DejaVu Sans"/>
               </a:rPr>
               <a:t>(per Job)</a:t>
             </a:r>
@@ -3408,7 +5054,7 @@
       </p:sp>
       <p:pic>
         <p:nvPicPr>
-          <p:cNvPr id="69" name="" descr=""/>
+          <p:cNvPr id="107" name="" descr=""/>
           <p:cNvPicPr/>
           <p:nvPr/>
         </p:nvPicPr>
@@ -3421,7 +5067,7 @@
         <p:spPr>
           <a:xfrm>
             <a:off x="8208000" y="2880720"/>
-            <a:ext cx="1955520" cy="430920"/>
+            <a:ext cx="1955160" cy="430560"/>
           </a:xfrm>
           <a:prstGeom prst="rect">
             <a:avLst/>
@@ -3433,7 +5079,7 @@
       </p:pic>
       <p:pic>
         <p:nvPicPr>
-          <p:cNvPr id="70" name="" descr=""/>
+          <p:cNvPr id="108" name="" descr=""/>
           <p:cNvPicPr/>
           <p:nvPr/>
         </p:nvPicPr>
@@ -3446,7 +5092,7 @@
         <p:spPr>
           <a:xfrm>
             <a:off x="8268120" y="4536720"/>
-            <a:ext cx="1955520" cy="430920"/>
+            <a:ext cx="1955160" cy="430560"/>
           </a:xfrm>
           <a:prstGeom prst="rect">
             <a:avLst/>
@@ -3458,14 +5104,14 @@
       </p:pic>
       <p:sp>
         <p:nvSpPr>
-          <p:cNvPr id="71" name="CustomShape 8"/>
+          <p:cNvPr id="109" name="CustomShape 8"/>
           <p:cNvSpPr/>
           <p:nvPr/>
         </p:nvSpPr>
         <p:spPr>
           <a:xfrm>
             <a:off x="8639640" y="2443320"/>
-            <a:ext cx="2232000" cy="364320"/>
+            <a:ext cx="2231640" cy="363960"/>
           </a:xfrm>
           <a:prstGeom prst="rect">
             <a:avLst/>
@@ -3511,14 +5157,14 @@
       </p:sp>
       <p:sp>
         <p:nvSpPr>
-          <p:cNvPr id="72" name="CustomShape 9"/>
+          <p:cNvPr id="110" name="CustomShape 9"/>
           <p:cNvSpPr/>
           <p:nvPr/>
         </p:nvSpPr>
         <p:spPr>
           <a:xfrm>
             <a:off x="10152000" y="2592000"/>
-            <a:ext cx="1492920" cy="987480"/>
+            <a:ext cx="1492560" cy="987120"/>
           </a:xfrm>
           <a:prstGeom prst="roundRect">
             <a:avLst>
@@ -3596,14 +5242,14 @@
       </p:sp>
       <p:sp>
         <p:nvSpPr>
-          <p:cNvPr id="73" name="CustomShape 10"/>
+          <p:cNvPr id="111" name="CustomShape 10"/>
           <p:cNvSpPr/>
           <p:nvPr/>
         </p:nvSpPr>
         <p:spPr>
           <a:xfrm>
             <a:off x="8639640" y="4207320"/>
-            <a:ext cx="2232000" cy="364320"/>
+            <a:ext cx="2231640" cy="363960"/>
           </a:xfrm>
           <a:prstGeom prst="rect">
             <a:avLst/>
@@ -3649,14 +5295,14 @@
       </p:sp>
       <p:sp>
         <p:nvSpPr>
-          <p:cNvPr id="74" name="CustomShape 11"/>
+          <p:cNvPr id="112" name="CustomShape 11"/>
           <p:cNvSpPr/>
           <p:nvPr/>
         </p:nvSpPr>
         <p:spPr>
           <a:xfrm>
             <a:off x="10224000" y="4248000"/>
-            <a:ext cx="1492920" cy="987480"/>
+            <a:ext cx="1492560" cy="987120"/>
           </a:xfrm>
           <a:prstGeom prst="roundRect">
             <a:avLst>
@@ -3714,14 +5360,14 @@
       </p:sp>
       <p:sp>
         <p:nvSpPr>
-          <p:cNvPr id="75" name="CustomShape 12"/>
+          <p:cNvPr id="113" name="CustomShape 12"/>
           <p:cNvSpPr/>
           <p:nvPr/>
         </p:nvSpPr>
         <p:spPr>
           <a:xfrm>
             <a:off x="3671640" y="936000"/>
-            <a:ext cx="2232000" cy="363960"/>
+            <a:ext cx="2231640" cy="363960"/>
           </a:xfrm>
           <a:prstGeom prst="rect">
             <a:avLst/>
@@ -3767,14 +5413,14 @@
       </p:sp>
       <p:sp>
         <p:nvSpPr>
-          <p:cNvPr id="76" name="CustomShape 13"/>
+          <p:cNvPr id="114" name="CustomShape 13"/>
           <p:cNvSpPr/>
           <p:nvPr/>
         </p:nvSpPr>
         <p:spPr>
           <a:xfrm>
             <a:off x="5669280" y="4104000"/>
-            <a:ext cx="2538360" cy="1512000"/>
+            <a:ext cx="2538000" cy="1511640"/>
           </a:xfrm>
           <a:prstGeom prst="rect">
             <a:avLst/>
@@ -3809,7 +5455,11 @@
             </a:pPr>
             <a:r>
               <a:rPr b="0" lang="sv-SE" sz="1800" spc="-1" strike="noStrike">
+                <a:solidFill>
+                  <a:srgbClr val="000000"/>
+                </a:solidFill>
                 <a:latin typeface="Arial"/>
+                <a:ea typeface="DejaVu Sans"/>
               </a:rPr>
               <a:t>Filtering</a:t>
             </a:r>
@@ -3825,7 +5475,11 @@
             </a:pPr>
             <a:r>
               <a:rPr b="0" lang="sv-SE" sz="1800" spc="-1" strike="noStrike">
+                <a:solidFill>
+                  <a:srgbClr val="000000"/>
+                </a:solidFill>
                 <a:latin typeface="Arial"/>
+                <a:ea typeface="DejaVu Sans"/>
               </a:rPr>
               <a:t>Data transformation</a:t>
             </a:r>
@@ -3841,7 +5495,11 @@
             </a:pPr>
             <a:r>
               <a:rPr b="0" lang="sv-SE" sz="1800" spc="-1" strike="noStrike">
+                <a:solidFill>
+                  <a:srgbClr val="000000"/>
+                </a:solidFill>
                 <a:latin typeface="Arial"/>
+                <a:ea typeface="DejaVu Sans"/>
               </a:rPr>
               <a:t>Data aggregation</a:t>
             </a:r>
@@ -3857,7 +5515,11 @@
             </a:pPr>
             <a:r>
               <a:rPr b="0" lang="sv-SE" sz="1800" spc="-1" strike="noStrike">
+                <a:solidFill>
+                  <a:srgbClr val="000000"/>
+                </a:solidFill>
                 <a:latin typeface="Arial"/>
+                <a:ea typeface="DejaVu Sans"/>
               </a:rPr>
               <a:t>(per Job)</a:t>
             </a:r>
@@ -3901,6 +5563,1767 @@
           <a:chExt cx="0" cy="0"/>
         </a:xfrm>
       </p:grpSpPr>
+      <p:sp>
+        <p:nvSpPr>
+          <p:cNvPr id="115" name="CustomShape 1"/>
+          <p:cNvSpPr/>
+          <p:nvPr/>
+        </p:nvSpPr>
+        <p:spPr>
+          <a:xfrm>
+            <a:off x="9631080" y="271800"/>
+            <a:ext cx="1994400" cy="985680"/>
+          </a:xfrm>
+          <a:prstGeom prst="roundRect">
+            <a:avLst>
+              <a:gd name="adj" fmla="val 16667"/>
+            </a:avLst>
+          </a:prstGeom>
+          <a:solidFill>
+            <a:srgbClr val="7030a0"/>
+          </a:solidFill>
+          <a:ln>
+            <a:solidFill>
+              <a:srgbClr val="7030a0"/>
+            </a:solidFill>
+          </a:ln>
+        </p:spPr>
+        <p:style>
+          <a:lnRef idx="2">
+            <a:schemeClr val="accent1">
+              <a:shade val="50000"/>
+            </a:schemeClr>
+          </a:lnRef>
+          <a:fillRef idx="1">
+            <a:schemeClr val="accent1"/>
+          </a:fillRef>
+          <a:effectRef idx="0">
+            <a:schemeClr val="accent1"/>
+          </a:effectRef>
+          <a:fontRef idx="minor"/>
+        </p:style>
+        <p:txBody>
+          <a:bodyPr lIns="90000" rIns="90000" tIns="45000" bIns="45000" anchor="ctr">
+            <a:noAutofit/>
+          </a:bodyPr>
+          <a:p>
+            <a:pPr algn="ctr">
+              <a:lnSpc>
+                <a:spcPct val="100000"/>
+              </a:lnSpc>
+            </a:pPr>
+            <a:r>
+              <a:rPr b="0" lang="sv-SE" sz="1800" spc="-1" strike="noStrike">
+                <a:solidFill>
+                  <a:srgbClr val="ffffff"/>
+                </a:solidFill>
+                <a:latin typeface="Calibri"/>
+                <a:ea typeface="DejaVu Sans"/>
+              </a:rPr>
+              <a:t>PM Data Consumer</a:t>
+            </a:r>
+            <a:endParaRPr b="0" lang="sv-SE" sz="1800" spc="-1" strike="noStrike">
+              <a:latin typeface="Arial"/>
+            </a:endParaRPr>
+          </a:p>
+        </p:txBody>
+      </p:sp>
+      <p:sp>
+        <p:nvSpPr>
+          <p:cNvPr id="116" name="CustomShape 2"/>
+          <p:cNvSpPr/>
+          <p:nvPr/>
+        </p:nvSpPr>
+        <p:spPr>
+          <a:xfrm>
+            <a:off x="2844000" y="127800"/>
+            <a:ext cx="4101480" cy="4657680"/>
+          </a:xfrm>
+          <a:prstGeom prst="roundRect">
+            <a:avLst>
+              <a:gd name="adj" fmla="val 16667"/>
+            </a:avLst>
+          </a:prstGeom>
+          <a:solidFill>
+            <a:srgbClr val="7030a0"/>
+          </a:solidFill>
+          <a:ln>
+            <a:solidFill>
+              <a:srgbClr val="7030a0"/>
+            </a:solidFill>
+          </a:ln>
+        </p:spPr>
+        <p:style>
+          <a:lnRef idx="2">
+            <a:schemeClr val="accent1">
+              <a:shade val="50000"/>
+            </a:schemeClr>
+          </a:lnRef>
+          <a:fillRef idx="1">
+            <a:schemeClr val="accent1"/>
+          </a:fillRef>
+          <a:effectRef idx="0">
+            <a:schemeClr val="accent1"/>
+          </a:effectRef>
+          <a:fontRef idx="minor"/>
+        </p:style>
+      </p:sp>
+      <p:sp>
+        <p:nvSpPr>
+          <p:cNvPr id="117" name="CustomShape 3"/>
+          <p:cNvSpPr/>
+          <p:nvPr/>
+        </p:nvSpPr>
+        <p:spPr>
+          <a:xfrm>
+            <a:off x="9775080" y="1927800"/>
+            <a:ext cx="1994400" cy="985680"/>
+          </a:xfrm>
+          <a:prstGeom prst="roundRect">
+            <a:avLst>
+              <a:gd name="adj" fmla="val 16667"/>
+            </a:avLst>
+          </a:prstGeom>
+          <a:solidFill>
+            <a:srgbClr val="7030a0"/>
+          </a:solidFill>
+          <a:ln>
+            <a:solidFill>
+              <a:srgbClr val="7030a0"/>
+            </a:solidFill>
+          </a:ln>
+        </p:spPr>
+        <p:style>
+          <a:lnRef idx="2">
+            <a:schemeClr val="accent1">
+              <a:shade val="50000"/>
+            </a:schemeClr>
+          </a:lnRef>
+          <a:fillRef idx="1">
+            <a:schemeClr val="accent1"/>
+          </a:fillRef>
+          <a:effectRef idx="0">
+            <a:schemeClr val="accent1"/>
+          </a:effectRef>
+          <a:fontRef idx="minor"/>
+        </p:style>
+        <p:txBody>
+          <a:bodyPr lIns="90000" rIns="90000" tIns="45000" bIns="45000" anchor="ctr">
+            <a:noAutofit/>
+          </a:bodyPr>
+          <a:p>
+            <a:pPr algn="ctr">
+              <a:lnSpc>
+                <a:spcPct val="100000"/>
+              </a:lnSpc>
+            </a:pPr>
+            <a:r>
+              <a:rPr b="0" lang="sv-SE" sz="1800" spc="-1" strike="noStrike">
+                <a:solidFill>
+                  <a:srgbClr val="ffffff"/>
+                </a:solidFill>
+                <a:latin typeface="Calibri"/>
+                <a:ea typeface="DejaVu Sans"/>
+              </a:rPr>
+              <a:t>PM Data Consumer</a:t>
+            </a:r>
+            <a:endParaRPr b="0" lang="sv-SE" sz="1800" spc="-1" strike="noStrike">
+              <a:latin typeface="Arial"/>
+            </a:endParaRPr>
+          </a:p>
+        </p:txBody>
+      </p:sp>
+      <p:sp>
+        <p:nvSpPr>
+          <p:cNvPr id="118" name="CustomShape 4"/>
+          <p:cNvSpPr/>
+          <p:nvPr/>
+        </p:nvSpPr>
+        <p:spPr>
+          <a:xfrm>
+            <a:off x="9703080" y="3511800"/>
+            <a:ext cx="1994400" cy="985680"/>
+          </a:xfrm>
+          <a:prstGeom prst="roundRect">
+            <a:avLst>
+              <a:gd name="adj" fmla="val 16667"/>
+            </a:avLst>
+          </a:prstGeom>
+          <a:solidFill>
+            <a:srgbClr val="7030a0"/>
+          </a:solidFill>
+          <a:ln>
+            <a:solidFill>
+              <a:srgbClr val="7030a0"/>
+            </a:solidFill>
+          </a:ln>
+        </p:spPr>
+        <p:style>
+          <a:lnRef idx="2">
+            <a:schemeClr val="accent1">
+              <a:shade val="50000"/>
+            </a:schemeClr>
+          </a:lnRef>
+          <a:fillRef idx="1">
+            <a:schemeClr val="accent1"/>
+          </a:fillRef>
+          <a:effectRef idx="0">
+            <a:schemeClr val="accent1"/>
+          </a:effectRef>
+          <a:fontRef idx="minor"/>
+        </p:style>
+        <p:txBody>
+          <a:bodyPr lIns="90000" rIns="90000" tIns="45000" bIns="45000" anchor="ctr">
+            <a:noAutofit/>
+          </a:bodyPr>
+          <a:p>
+            <a:pPr algn="ctr">
+              <a:lnSpc>
+                <a:spcPct val="100000"/>
+              </a:lnSpc>
+            </a:pPr>
+            <a:r>
+              <a:rPr b="0" lang="sv-SE" sz="1800" spc="-1" strike="noStrike">
+                <a:solidFill>
+                  <a:srgbClr val="ffffff"/>
+                </a:solidFill>
+                <a:latin typeface="Calibri"/>
+                <a:ea typeface="DejaVu Sans"/>
+              </a:rPr>
+              <a:t>PM Data Consumer</a:t>
+            </a:r>
+            <a:endParaRPr b="0" lang="sv-SE" sz="1800" spc="-1" strike="noStrike">
+              <a:latin typeface="Arial"/>
+            </a:endParaRPr>
+          </a:p>
+        </p:txBody>
+      </p:sp>
+      <p:sp>
+        <p:nvSpPr>
+          <p:cNvPr id="119" name="CustomShape 5"/>
+          <p:cNvSpPr/>
+          <p:nvPr/>
+        </p:nvSpPr>
+        <p:spPr>
+          <a:xfrm>
+            <a:off x="7650360" y="180000"/>
+            <a:ext cx="1455120" cy="1182960"/>
+          </a:xfrm>
+          <a:prstGeom prst="rect">
+            <a:avLst/>
+          </a:prstGeom>
+          <a:blipFill rotWithShape="0">
+            <a:blip r:embed="rId1"/>
+            <a:stretch>
+              <a:fillRect/>
+            </a:stretch>
+          </a:blipFill>
+          <a:ln>
+            <a:noFill/>
+          </a:ln>
+        </p:spPr>
+        <p:style>
+          <a:lnRef idx="0"/>
+          <a:fillRef idx="0"/>
+          <a:effectRef idx="0"/>
+          <a:fontRef idx="minor"/>
+        </p:style>
+        <p:txBody>
+          <a:bodyPr lIns="0" rIns="0" tIns="45000" bIns="45000" anchor="ctr" anchorCtr="1">
+            <a:noAutofit/>
+          </a:bodyPr>
+          <a:p>
+            <a:pPr algn="ctr">
+              <a:lnSpc>
+                <a:spcPct val="100000"/>
+              </a:lnSpc>
+            </a:pPr>
+            <a:r>
+              <a:rPr b="0" lang="sv-SE" sz="1800" spc="-1" strike="noStrike">
+                <a:solidFill>
+                  <a:srgbClr val="000000"/>
+                </a:solidFill>
+                <a:latin typeface="Arial"/>
+                <a:ea typeface="DejaVu Sans"/>
+              </a:rPr>
+              <a:t>Topic A</a:t>
+            </a:r>
+            <a:endParaRPr b="0" lang="sv-SE" sz="1800" spc="-1" strike="noStrike">
+              <a:latin typeface="Arial"/>
+            </a:endParaRPr>
+          </a:p>
+        </p:txBody>
+      </p:sp>
+      <p:sp>
+        <p:nvSpPr>
+          <p:cNvPr id="120" name="CustomShape 6"/>
+          <p:cNvSpPr/>
+          <p:nvPr/>
+        </p:nvSpPr>
+        <p:spPr>
+          <a:xfrm>
+            <a:off x="7578360" y="1764000"/>
+            <a:ext cx="1455120" cy="1182960"/>
+          </a:xfrm>
+          <a:prstGeom prst="rect">
+            <a:avLst/>
+          </a:prstGeom>
+          <a:blipFill rotWithShape="0">
+            <a:blip r:embed="rId2"/>
+            <a:stretch>
+              <a:fillRect/>
+            </a:stretch>
+          </a:blipFill>
+          <a:ln>
+            <a:noFill/>
+          </a:ln>
+        </p:spPr>
+        <p:style>
+          <a:lnRef idx="0"/>
+          <a:fillRef idx="0"/>
+          <a:effectRef idx="0"/>
+          <a:fontRef idx="minor"/>
+        </p:style>
+        <p:txBody>
+          <a:bodyPr lIns="0" rIns="0" tIns="45000" bIns="45000" anchor="ctr" anchorCtr="1">
+            <a:noAutofit/>
+          </a:bodyPr>
+          <a:p>
+            <a:pPr algn="ctr">
+              <a:lnSpc>
+                <a:spcPct val="100000"/>
+              </a:lnSpc>
+            </a:pPr>
+            <a:r>
+              <a:rPr b="0" lang="sv-SE" sz="1800" spc="-1" strike="noStrike">
+                <a:solidFill>
+                  <a:srgbClr val="000000"/>
+                </a:solidFill>
+                <a:latin typeface="Arial"/>
+                <a:ea typeface="DejaVu Sans"/>
+              </a:rPr>
+              <a:t>Topic C</a:t>
+            </a:r>
+            <a:endParaRPr b="0" lang="sv-SE" sz="1800" spc="-1" strike="noStrike">
+              <a:latin typeface="Arial"/>
+            </a:endParaRPr>
+          </a:p>
+        </p:txBody>
+      </p:sp>
+      <p:sp>
+        <p:nvSpPr>
+          <p:cNvPr id="121" name="CustomShape 7"/>
+          <p:cNvSpPr/>
+          <p:nvPr/>
+        </p:nvSpPr>
+        <p:spPr>
+          <a:xfrm>
+            <a:off x="7614720" y="3420360"/>
+            <a:ext cx="1455120" cy="1182960"/>
+          </a:xfrm>
+          <a:prstGeom prst="rect">
+            <a:avLst/>
+          </a:prstGeom>
+          <a:blipFill rotWithShape="0">
+            <a:blip r:embed="rId3"/>
+            <a:stretch>
+              <a:fillRect/>
+            </a:stretch>
+          </a:blipFill>
+          <a:ln>
+            <a:noFill/>
+          </a:ln>
+        </p:spPr>
+        <p:style>
+          <a:lnRef idx="0"/>
+          <a:fillRef idx="0"/>
+          <a:effectRef idx="0"/>
+          <a:fontRef idx="minor"/>
+        </p:style>
+        <p:txBody>
+          <a:bodyPr lIns="0" rIns="0" tIns="45000" bIns="45000" anchor="ctr" anchorCtr="1">
+            <a:noAutofit/>
+          </a:bodyPr>
+          <a:p>
+            <a:pPr algn="ctr">
+              <a:lnSpc>
+                <a:spcPct val="100000"/>
+              </a:lnSpc>
+            </a:pPr>
+            <a:r>
+              <a:rPr b="0" lang="sv-SE" sz="1800" spc="-1" strike="noStrike">
+                <a:solidFill>
+                  <a:srgbClr val="000000"/>
+                </a:solidFill>
+                <a:latin typeface="Arial"/>
+                <a:ea typeface="DejaVu Sans"/>
+              </a:rPr>
+              <a:t>Topic C</a:t>
+            </a:r>
+            <a:endParaRPr b="0" lang="sv-SE" sz="1800" spc="-1" strike="noStrike">
+              <a:latin typeface="Arial"/>
+            </a:endParaRPr>
+          </a:p>
+        </p:txBody>
+      </p:sp>
+      <p:sp>
+        <p:nvSpPr>
+          <p:cNvPr id="122" name="CustomShape 8"/>
+          <p:cNvSpPr/>
+          <p:nvPr/>
+        </p:nvSpPr>
+        <p:spPr>
+          <a:xfrm>
+            <a:off x="5195880" y="191880"/>
+            <a:ext cx="1461600" cy="1425600"/>
+          </a:xfrm>
+          <a:prstGeom prst="rect">
+            <a:avLst/>
+          </a:prstGeom>
+          <a:blipFill rotWithShape="0">
+            <a:blip r:embed="rId4"/>
+            <a:stretch>
+              <a:fillRect/>
+            </a:stretch>
+          </a:blipFill>
+          <a:ln>
+            <a:noFill/>
+          </a:ln>
+        </p:spPr>
+        <p:style>
+          <a:lnRef idx="0"/>
+          <a:fillRef idx="0"/>
+          <a:effectRef idx="0"/>
+          <a:fontRef idx="minor"/>
+        </p:style>
+        <p:txBody>
+          <a:bodyPr lIns="0" rIns="0" tIns="45000" bIns="45000" anchor="ctr" anchorCtr="1">
+            <a:noAutofit/>
+          </a:bodyPr>
+          <a:p>
+            <a:pPr algn="ctr">
+              <a:lnSpc>
+                <a:spcPct val="100000"/>
+              </a:lnSpc>
+            </a:pPr>
+            <a:r>
+              <a:rPr b="0" lang="sv-SE" sz="1800" spc="-1" strike="noStrike">
+                <a:solidFill>
+                  <a:srgbClr val="000000"/>
+                </a:solidFill>
+                <a:latin typeface="Arial"/>
+                <a:ea typeface="DejaVu Sans"/>
+              </a:rPr>
+              <a:t>Job 1</a:t>
+            </a:r>
+            <a:endParaRPr b="0" lang="sv-SE" sz="1800" spc="-1" strike="noStrike">
+              <a:latin typeface="Arial"/>
+            </a:endParaRPr>
+          </a:p>
+        </p:txBody>
+      </p:sp>
+      <p:sp>
+        <p:nvSpPr>
+          <p:cNvPr id="123" name="CustomShape 9"/>
+          <p:cNvSpPr/>
+          <p:nvPr/>
+        </p:nvSpPr>
+        <p:spPr>
+          <a:xfrm>
+            <a:off x="5220000" y="1703880"/>
+            <a:ext cx="1461600" cy="1425600"/>
+          </a:xfrm>
+          <a:prstGeom prst="rect">
+            <a:avLst/>
+          </a:prstGeom>
+          <a:blipFill rotWithShape="0">
+            <a:blip r:embed="rId5"/>
+            <a:stretch>
+              <a:fillRect/>
+            </a:stretch>
+          </a:blipFill>
+          <a:ln>
+            <a:noFill/>
+          </a:ln>
+        </p:spPr>
+        <p:style>
+          <a:lnRef idx="0"/>
+          <a:fillRef idx="0"/>
+          <a:effectRef idx="0"/>
+          <a:fontRef idx="minor"/>
+        </p:style>
+        <p:txBody>
+          <a:bodyPr lIns="0" rIns="0" tIns="45000" bIns="45000" anchor="ctr" anchorCtr="1">
+            <a:noAutofit/>
+          </a:bodyPr>
+          <a:p>
+            <a:pPr algn="ctr">
+              <a:lnSpc>
+                <a:spcPct val="100000"/>
+              </a:lnSpc>
+            </a:pPr>
+            <a:r>
+              <a:rPr b="0" lang="sv-SE" sz="1800" spc="-1" strike="noStrike">
+                <a:solidFill>
+                  <a:srgbClr val="000000"/>
+                </a:solidFill>
+                <a:latin typeface="Arial"/>
+                <a:ea typeface="DejaVu Sans"/>
+              </a:rPr>
+              <a:t>Job 2</a:t>
+            </a:r>
+            <a:endParaRPr b="0" lang="sv-SE" sz="1800" spc="-1" strike="noStrike">
+              <a:latin typeface="Arial"/>
+            </a:endParaRPr>
+          </a:p>
+        </p:txBody>
+      </p:sp>
+      <p:sp>
+        <p:nvSpPr>
+          <p:cNvPr id="124" name="CustomShape 10"/>
+          <p:cNvSpPr/>
+          <p:nvPr/>
+        </p:nvSpPr>
+        <p:spPr>
+          <a:xfrm>
+            <a:off x="5231880" y="3096000"/>
+            <a:ext cx="1461600" cy="1425600"/>
+          </a:xfrm>
+          <a:prstGeom prst="rect">
+            <a:avLst/>
+          </a:prstGeom>
+          <a:blipFill rotWithShape="0">
+            <a:blip r:embed="rId6"/>
+            <a:stretch>
+              <a:fillRect/>
+            </a:stretch>
+          </a:blipFill>
+          <a:ln>
+            <a:noFill/>
+          </a:ln>
+        </p:spPr>
+        <p:style>
+          <a:lnRef idx="0"/>
+          <a:fillRef idx="0"/>
+          <a:effectRef idx="0"/>
+          <a:fontRef idx="minor"/>
+        </p:style>
+        <p:txBody>
+          <a:bodyPr lIns="0" rIns="0" tIns="45000" bIns="45000" anchor="ctr" anchorCtr="1">
+            <a:noAutofit/>
+          </a:bodyPr>
+          <a:p>
+            <a:pPr algn="ctr">
+              <a:lnSpc>
+                <a:spcPct val="100000"/>
+              </a:lnSpc>
+            </a:pPr>
+            <a:r>
+              <a:rPr b="0" lang="sv-SE" sz="1800" spc="-1" strike="noStrike">
+                <a:solidFill>
+                  <a:srgbClr val="000000"/>
+                </a:solidFill>
+                <a:latin typeface="Arial"/>
+                <a:ea typeface="DejaVu Sans"/>
+              </a:rPr>
+              <a:t>Job 3</a:t>
+            </a:r>
+            <a:endParaRPr b="0" lang="sv-SE" sz="1800" spc="-1" strike="noStrike">
+              <a:latin typeface="Arial"/>
+            </a:endParaRPr>
+          </a:p>
+        </p:txBody>
+      </p:sp>
+      <p:sp>
+        <p:nvSpPr>
+          <p:cNvPr id="125" name="CustomShape 11"/>
+          <p:cNvSpPr/>
+          <p:nvPr/>
+        </p:nvSpPr>
+        <p:spPr>
+          <a:xfrm>
+            <a:off x="2969280" y="2844000"/>
+            <a:ext cx="2032200" cy="1725480"/>
+          </a:xfrm>
+          <a:prstGeom prst="rect">
+            <a:avLst/>
+          </a:prstGeom>
+          <a:blipFill rotWithShape="0">
+            <a:blip r:embed="rId7"/>
+            <a:stretch>
+              <a:fillRect/>
+            </a:stretch>
+          </a:blipFill>
+          <a:ln>
+            <a:noFill/>
+          </a:ln>
+        </p:spPr>
+        <p:style>
+          <a:lnRef idx="0"/>
+          <a:fillRef idx="0"/>
+          <a:effectRef idx="0"/>
+          <a:fontRef idx="minor"/>
+        </p:style>
+        <p:txBody>
+          <a:bodyPr lIns="0" rIns="0" tIns="45000" bIns="45000" anchor="ctr" anchorCtr="1">
+            <a:noAutofit/>
+          </a:bodyPr>
+          <a:p>
+            <a:pPr algn="ctr">
+              <a:lnSpc>
+                <a:spcPct val="100000"/>
+              </a:lnSpc>
+            </a:pPr>
+            <a:r>
+              <a:rPr b="0" lang="sv-SE" sz="1800" spc="-1" strike="noStrike">
+                <a:solidFill>
+                  <a:srgbClr val="000000"/>
+                </a:solidFill>
+                <a:latin typeface="Arial"/>
+                <a:ea typeface="DejaVu Sans"/>
+              </a:rPr>
+              <a:t>ROP File Data</a:t>
+            </a:r>
+            <a:endParaRPr b="0" lang="sv-SE" sz="1800" spc="-1" strike="noStrike">
+              <a:latin typeface="Arial"/>
+            </a:endParaRPr>
+          </a:p>
+        </p:txBody>
+      </p:sp>
+      <p:sp>
+        <p:nvSpPr>
+          <p:cNvPr id="126" name="CustomShape 12"/>
+          <p:cNvSpPr/>
+          <p:nvPr/>
+        </p:nvSpPr>
+        <p:spPr>
+          <a:xfrm>
+            <a:off x="10063080" y="4303800"/>
+            <a:ext cx="1994400" cy="985680"/>
+          </a:xfrm>
+          <a:prstGeom prst="roundRect">
+            <a:avLst>
+              <a:gd name="adj" fmla="val 16667"/>
+            </a:avLst>
+          </a:prstGeom>
+          <a:solidFill>
+            <a:srgbClr val="7030a0"/>
+          </a:solidFill>
+          <a:ln>
+            <a:solidFill>
+              <a:srgbClr val="7030a0"/>
+            </a:solidFill>
+          </a:ln>
+        </p:spPr>
+        <p:style>
+          <a:lnRef idx="2">
+            <a:schemeClr val="accent1">
+              <a:shade val="50000"/>
+            </a:schemeClr>
+          </a:lnRef>
+          <a:fillRef idx="1">
+            <a:schemeClr val="accent1"/>
+          </a:fillRef>
+          <a:effectRef idx="0">
+            <a:schemeClr val="accent1"/>
+          </a:effectRef>
+          <a:fontRef idx="minor"/>
+        </p:style>
+        <p:txBody>
+          <a:bodyPr lIns="90000" rIns="90000" tIns="45000" bIns="45000" anchor="ctr">
+            <a:noAutofit/>
+          </a:bodyPr>
+          <a:p>
+            <a:pPr algn="ctr">
+              <a:lnSpc>
+                <a:spcPct val="100000"/>
+              </a:lnSpc>
+            </a:pPr>
+            <a:r>
+              <a:rPr b="0" lang="sv-SE" sz="1800" spc="-1" strike="noStrike">
+                <a:solidFill>
+                  <a:srgbClr val="ffffff"/>
+                </a:solidFill>
+                <a:latin typeface="Calibri"/>
+                <a:ea typeface="DejaVu Sans"/>
+              </a:rPr>
+              <a:t>PM Data Consumer</a:t>
+            </a:r>
+            <a:endParaRPr b="0" lang="sv-SE" sz="1800" spc="-1" strike="noStrike">
+              <a:latin typeface="Arial"/>
+            </a:endParaRPr>
+          </a:p>
+        </p:txBody>
+      </p:sp>
+      <p:sp>
+        <p:nvSpPr>
+          <p:cNvPr id="127" name="CustomShape 13"/>
+          <p:cNvSpPr/>
+          <p:nvPr/>
+        </p:nvSpPr>
+        <p:spPr>
+          <a:xfrm>
+            <a:off x="2089800" y="6048000"/>
+            <a:ext cx="5325480" cy="458640"/>
+          </a:xfrm>
+          <a:prstGeom prst="roundRect">
+            <a:avLst>
+              <a:gd name="adj" fmla="val 16667"/>
+            </a:avLst>
+          </a:prstGeom>
+          <a:solidFill>
+            <a:srgbClr val="2a6099"/>
+          </a:solidFill>
+          <a:ln/>
+        </p:spPr>
+        <p:style>
+          <a:lnRef idx="2">
+            <a:schemeClr val="accent1">
+              <a:shade val="50000"/>
+            </a:schemeClr>
+          </a:lnRef>
+          <a:fillRef idx="1">
+            <a:schemeClr val="accent1"/>
+          </a:fillRef>
+          <a:effectRef idx="0">
+            <a:schemeClr val="accent1"/>
+          </a:effectRef>
+          <a:fontRef idx="minor"/>
+        </p:style>
+        <p:txBody>
+          <a:bodyPr lIns="90000" rIns="90000" tIns="45000" bIns="45000" anchor="ctr">
+            <a:noAutofit/>
+          </a:bodyPr>
+          <a:p>
+            <a:pPr algn="ctr">
+              <a:lnSpc>
+                <a:spcPct val="100000"/>
+              </a:lnSpc>
+            </a:pPr>
+            <a:r>
+              <a:rPr b="0" lang="sv-SE" sz="1800" spc="-1" strike="noStrike">
+                <a:solidFill>
+                  <a:srgbClr val="000000"/>
+                </a:solidFill>
+                <a:latin typeface="Arial"/>
+                <a:ea typeface="DejaVu Sans"/>
+              </a:rPr>
+              <a:t>PM Files Data Store</a:t>
+            </a:r>
+            <a:endParaRPr b="0" lang="sv-SE" sz="1800" spc="-1" strike="noStrike">
+              <a:latin typeface="Arial"/>
+            </a:endParaRPr>
+          </a:p>
+        </p:txBody>
+      </p:sp>
+      <p:sp>
+        <p:nvSpPr>
+          <p:cNvPr id="128" name="CustomShape 14"/>
+          <p:cNvSpPr/>
+          <p:nvPr/>
+        </p:nvSpPr>
+        <p:spPr>
+          <a:xfrm>
+            <a:off x="414360" y="1764000"/>
+            <a:ext cx="1455120" cy="1182960"/>
+          </a:xfrm>
+          <a:prstGeom prst="rect">
+            <a:avLst/>
+          </a:prstGeom>
+          <a:blipFill rotWithShape="0">
+            <a:blip r:embed="rId8"/>
+            <a:stretch>
+              <a:fillRect/>
+            </a:stretch>
+          </a:blipFill>
+          <a:ln>
+            <a:noFill/>
+          </a:ln>
+        </p:spPr>
+        <p:style>
+          <a:lnRef idx="0"/>
+          <a:fillRef idx="0"/>
+          <a:effectRef idx="0"/>
+          <a:fontRef idx="minor"/>
+        </p:style>
+        <p:txBody>
+          <a:bodyPr lIns="0" rIns="0" tIns="45000" bIns="45000" anchor="ctr" anchorCtr="1">
+            <a:noAutofit/>
+          </a:bodyPr>
+          <a:p>
+            <a:pPr algn="ctr">
+              <a:lnSpc>
+                <a:spcPct val="100000"/>
+              </a:lnSpc>
+            </a:pPr>
+            <a:r>
+              <a:rPr b="0" lang="sv-SE" sz="1800" spc="-1" strike="noStrike">
+                <a:solidFill>
+                  <a:srgbClr val="000000"/>
+                </a:solidFill>
+                <a:latin typeface="Arial"/>
+                <a:ea typeface="DejaVu Sans"/>
+              </a:rPr>
+              <a:t>File Ready</a:t>
+            </a:r>
+            <a:endParaRPr b="0" lang="sv-SE" sz="1800" spc="-1" strike="noStrike">
+              <a:latin typeface="Arial"/>
+            </a:endParaRPr>
+          </a:p>
+        </p:txBody>
+      </p:sp>
+      <p:pic>
+        <p:nvPicPr>
+          <p:cNvPr id="129" name="" descr=""/>
+          <p:cNvPicPr/>
+          <p:nvPr/>
+        </p:nvPicPr>
+        <p:blipFill>
+          <a:blip r:embed="rId9"/>
+          <a:stretch/>
+        </p:blipFill>
+        <p:spPr>
+          <a:xfrm>
+            <a:off x="3454920" y="4680000"/>
+            <a:ext cx="756360" cy="1367280"/>
+          </a:xfrm>
+          <a:prstGeom prst="rect">
+            <a:avLst/>
+          </a:prstGeom>
+          <a:ln>
+            <a:noFill/>
+          </a:ln>
+        </p:spPr>
+      </p:pic>
+      <p:sp>
+        <p:nvSpPr>
+          <p:cNvPr id="130" name="TextShape 15"/>
+          <p:cNvSpPr txBox="1"/>
+          <p:nvPr/>
+        </p:nvSpPr>
+        <p:spPr>
+          <a:xfrm>
+            <a:off x="792000" y="288000"/>
+            <a:ext cx="2016000" cy="346320"/>
+          </a:xfrm>
+          <a:prstGeom prst="rect">
+            <a:avLst/>
+          </a:prstGeom>
+          <a:noFill/>
+          <a:ln>
+            <a:noFill/>
+          </a:ln>
+        </p:spPr>
+      </p:sp>
+      <p:sp>
+        <p:nvSpPr>
+          <p:cNvPr id="131" name="TextShape 16"/>
+          <p:cNvSpPr txBox="1"/>
+          <p:nvPr/>
+        </p:nvSpPr>
+        <p:spPr>
+          <a:xfrm>
+            <a:off x="144000" y="648000"/>
+            <a:ext cx="2664000" cy="858240"/>
+          </a:xfrm>
+          <a:prstGeom prst="rect">
+            <a:avLst/>
+          </a:prstGeom>
+          <a:noFill/>
+          <a:ln>
+            <a:noFill/>
+          </a:ln>
+        </p:spPr>
+        <p:txBody>
+          <a:bodyPr lIns="90000" rIns="90000" tIns="45000" bIns="45000">
+            <a:noAutofit/>
+          </a:bodyPr>
+          <a:p>
+            <a:r>
+              <a:rPr b="0" lang="sv-SE" sz="1800" spc="-1" strike="noStrike">
+                <a:latin typeface="Arial"/>
+              </a:rPr>
+              <a:t>PM Data Filtering/multiplexing</a:t>
+            </a:r>
+            <a:endParaRPr b="0" lang="sv-SE" sz="1800" spc="-1" strike="noStrike">
+              <a:latin typeface="Arial"/>
+            </a:endParaRPr>
+          </a:p>
+        </p:txBody>
+      </p:sp>
+    </p:spTree>
+  </p:cSld>
+  <mc:AlternateContent>
+    <mc:Choice Requires="p14">
+      <p:transition spd="slow" p14:dur="2000"/>
+    </mc:Choice>
+    <mc:Fallback>
+      <p:transition spd="slow"/>
+    </mc:Fallback>
+  </mc:AlternateContent>
+</p:sld>
+</file>
+
+<file path=ppt/slides/slide4.xml><?xml version="1.0" encoding="utf-8"?>
+<p:sld xmlns:a="http://schemas.openxmlformats.org/drawingml/2006/main" xmlns:p="http://schemas.openxmlformats.org/presentationml/2006/main" xmlns:r="http://schemas.openxmlformats.org/officeDocument/2006/relationships" xmlns:p14="http://schemas.microsoft.com/office/powerpoint/2010/main" xmlns:p15="http://schemas.microsoft.com/office/powerpoint/2012/main" xmlns:mc="http://schemas.openxmlformats.org/markup-compatibility/2006">
+  <p:cSld>
+    <p:spTree>
+      <p:nvGrpSpPr>
+        <p:cNvPr id="1" name=""/>
+        <p:cNvGrpSpPr/>
+        <p:nvPr/>
+      </p:nvGrpSpPr>
+      <p:grpSpPr>
+        <a:xfrm>
+          <a:off x="0" y="0"/>
+          <a:ext cx="0" cy="0"/>
+          <a:chOff x="0" y="0"/>
+          <a:chExt cx="0" cy="0"/>
+        </a:xfrm>
+      </p:grpSpPr>
+      <p:sp>
+        <p:nvSpPr>
+          <p:cNvPr id="132" name="CustomShape 1"/>
+          <p:cNvSpPr/>
+          <p:nvPr/>
+        </p:nvSpPr>
+        <p:spPr>
+          <a:xfrm>
+            <a:off x="9631080" y="271800"/>
+            <a:ext cx="1994400" cy="985680"/>
+          </a:xfrm>
+          <a:prstGeom prst="roundRect">
+            <a:avLst>
+              <a:gd name="adj" fmla="val 16667"/>
+            </a:avLst>
+          </a:prstGeom>
+          <a:solidFill>
+            <a:srgbClr val="7030a0"/>
+          </a:solidFill>
+          <a:ln>
+            <a:solidFill>
+              <a:srgbClr val="7030a0"/>
+            </a:solidFill>
+          </a:ln>
+        </p:spPr>
+        <p:style>
+          <a:lnRef idx="2">
+            <a:schemeClr val="accent1">
+              <a:shade val="50000"/>
+            </a:schemeClr>
+          </a:lnRef>
+          <a:fillRef idx="1">
+            <a:schemeClr val="accent1"/>
+          </a:fillRef>
+          <a:effectRef idx="0">
+            <a:schemeClr val="accent1"/>
+          </a:effectRef>
+          <a:fontRef idx="minor"/>
+        </p:style>
+        <p:txBody>
+          <a:bodyPr lIns="90000" rIns="90000" tIns="45000" bIns="45000" anchor="ctr">
+            <a:noAutofit/>
+          </a:bodyPr>
+          <a:p>
+            <a:pPr algn="ctr">
+              <a:lnSpc>
+                <a:spcPct val="100000"/>
+              </a:lnSpc>
+            </a:pPr>
+            <a:r>
+              <a:rPr b="0" lang="sv-SE" sz="1800" spc="-1" strike="noStrike">
+                <a:solidFill>
+                  <a:srgbClr val="ffffff"/>
+                </a:solidFill>
+                <a:latin typeface="Calibri"/>
+                <a:ea typeface="DejaVu Sans"/>
+              </a:rPr>
+              <a:t>PM Data Consumer</a:t>
+            </a:r>
+            <a:endParaRPr b="0" lang="sv-SE" sz="1800" spc="-1" strike="noStrike">
+              <a:latin typeface="Arial"/>
+            </a:endParaRPr>
+          </a:p>
+        </p:txBody>
+      </p:sp>
+      <p:sp>
+        <p:nvSpPr>
+          <p:cNvPr id="133" name="CustomShape 2"/>
+          <p:cNvSpPr/>
+          <p:nvPr/>
+        </p:nvSpPr>
+        <p:spPr>
+          <a:xfrm>
+            <a:off x="2844000" y="127800"/>
+            <a:ext cx="5220000" cy="4657680"/>
+          </a:xfrm>
+          <a:prstGeom prst="roundRect">
+            <a:avLst>
+              <a:gd name="adj" fmla="val 16667"/>
+            </a:avLst>
+          </a:prstGeom>
+          <a:solidFill>
+            <a:srgbClr val="7030a0"/>
+          </a:solidFill>
+          <a:ln>
+            <a:solidFill>
+              <a:srgbClr val="7030a0"/>
+            </a:solidFill>
+          </a:ln>
+        </p:spPr>
+        <p:style>
+          <a:lnRef idx="2">
+            <a:schemeClr val="accent1">
+              <a:shade val="50000"/>
+            </a:schemeClr>
+          </a:lnRef>
+          <a:fillRef idx="1">
+            <a:schemeClr val="accent1"/>
+          </a:fillRef>
+          <a:effectRef idx="0">
+            <a:schemeClr val="accent1"/>
+          </a:effectRef>
+          <a:fontRef idx="minor"/>
+        </p:style>
+      </p:sp>
+      <p:sp>
+        <p:nvSpPr>
+          <p:cNvPr id="134" name="CustomShape 3"/>
+          <p:cNvSpPr/>
+          <p:nvPr/>
+        </p:nvSpPr>
+        <p:spPr>
+          <a:xfrm>
+            <a:off x="9775080" y="1927800"/>
+            <a:ext cx="1994400" cy="985680"/>
+          </a:xfrm>
+          <a:prstGeom prst="roundRect">
+            <a:avLst>
+              <a:gd name="adj" fmla="val 16667"/>
+            </a:avLst>
+          </a:prstGeom>
+          <a:solidFill>
+            <a:srgbClr val="7030a0"/>
+          </a:solidFill>
+          <a:ln>
+            <a:solidFill>
+              <a:srgbClr val="7030a0"/>
+            </a:solidFill>
+          </a:ln>
+        </p:spPr>
+        <p:style>
+          <a:lnRef idx="2">
+            <a:schemeClr val="accent1">
+              <a:shade val="50000"/>
+            </a:schemeClr>
+          </a:lnRef>
+          <a:fillRef idx="1">
+            <a:schemeClr val="accent1"/>
+          </a:fillRef>
+          <a:effectRef idx="0">
+            <a:schemeClr val="accent1"/>
+          </a:effectRef>
+          <a:fontRef idx="minor"/>
+        </p:style>
+        <p:txBody>
+          <a:bodyPr lIns="90000" rIns="90000" tIns="45000" bIns="45000" anchor="ctr">
+            <a:noAutofit/>
+          </a:bodyPr>
+          <a:p>
+            <a:pPr algn="ctr">
+              <a:lnSpc>
+                <a:spcPct val="100000"/>
+              </a:lnSpc>
+            </a:pPr>
+            <a:r>
+              <a:rPr b="0" lang="sv-SE" sz="1800" spc="-1" strike="noStrike">
+                <a:solidFill>
+                  <a:srgbClr val="ffffff"/>
+                </a:solidFill>
+                <a:latin typeface="Calibri"/>
+                <a:ea typeface="DejaVu Sans"/>
+              </a:rPr>
+              <a:t>PM Data Consumer</a:t>
+            </a:r>
+            <a:endParaRPr b="0" lang="sv-SE" sz="1800" spc="-1" strike="noStrike">
+              <a:latin typeface="Arial"/>
+            </a:endParaRPr>
+          </a:p>
+        </p:txBody>
+      </p:sp>
+      <p:sp>
+        <p:nvSpPr>
+          <p:cNvPr id="135" name="CustomShape 4"/>
+          <p:cNvSpPr/>
+          <p:nvPr/>
+        </p:nvSpPr>
+        <p:spPr>
+          <a:xfrm>
+            <a:off x="9703080" y="3511800"/>
+            <a:ext cx="1994400" cy="985680"/>
+          </a:xfrm>
+          <a:prstGeom prst="roundRect">
+            <a:avLst>
+              <a:gd name="adj" fmla="val 16667"/>
+            </a:avLst>
+          </a:prstGeom>
+          <a:solidFill>
+            <a:srgbClr val="7030a0"/>
+          </a:solidFill>
+          <a:ln>
+            <a:solidFill>
+              <a:srgbClr val="7030a0"/>
+            </a:solidFill>
+          </a:ln>
+        </p:spPr>
+        <p:style>
+          <a:lnRef idx="2">
+            <a:schemeClr val="accent1">
+              <a:shade val="50000"/>
+            </a:schemeClr>
+          </a:lnRef>
+          <a:fillRef idx="1">
+            <a:schemeClr val="accent1"/>
+          </a:fillRef>
+          <a:effectRef idx="0">
+            <a:schemeClr val="accent1"/>
+          </a:effectRef>
+          <a:fontRef idx="minor"/>
+        </p:style>
+        <p:txBody>
+          <a:bodyPr lIns="90000" rIns="90000" tIns="45000" bIns="45000" anchor="ctr">
+            <a:noAutofit/>
+          </a:bodyPr>
+          <a:p>
+            <a:pPr algn="ctr">
+              <a:lnSpc>
+                <a:spcPct val="100000"/>
+              </a:lnSpc>
+            </a:pPr>
+            <a:r>
+              <a:rPr b="0" lang="sv-SE" sz="1800" spc="-1" strike="noStrike">
+                <a:solidFill>
+                  <a:srgbClr val="ffffff"/>
+                </a:solidFill>
+                <a:latin typeface="Calibri"/>
+                <a:ea typeface="DejaVu Sans"/>
+              </a:rPr>
+              <a:t>PM Data Consumer</a:t>
+            </a:r>
+            <a:endParaRPr b="0" lang="sv-SE" sz="1800" spc="-1" strike="noStrike">
+              <a:latin typeface="Arial"/>
+            </a:endParaRPr>
+          </a:p>
+        </p:txBody>
+      </p:sp>
+      <p:sp>
+        <p:nvSpPr>
+          <p:cNvPr id="136" name="CustomShape 5"/>
+          <p:cNvSpPr/>
+          <p:nvPr/>
+        </p:nvSpPr>
+        <p:spPr>
+          <a:xfrm>
+            <a:off x="8192880" y="1841040"/>
+            <a:ext cx="1455120" cy="1182960"/>
+          </a:xfrm>
+          <a:prstGeom prst="rect">
+            <a:avLst/>
+          </a:prstGeom>
+          <a:blipFill rotWithShape="0">
+            <a:blip r:embed="rId1"/>
+            <a:stretch>
+              <a:fillRect/>
+            </a:stretch>
+          </a:blipFill>
+          <a:ln>
+            <a:noFill/>
+          </a:ln>
+        </p:spPr>
+        <p:style>
+          <a:lnRef idx="0"/>
+          <a:fillRef idx="0"/>
+          <a:effectRef idx="0"/>
+          <a:fontRef idx="minor"/>
+        </p:style>
+        <p:txBody>
+          <a:bodyPr lIns="0" rIns="0" tIns="45000" bIns="45000" anchor="ctr" anchorCtr="1">
+            <a:noAutofit/>
+          </a:bodyPr>
+          <a:p>
+            <a:pPr algn="ctr">
+              <a:lnSpc>
+                <a:spcPct val="100000"/>
+              </a:lnSpc>
+            </a:pPr>
+            <a:r>
+              <a:rPr b="0" lang="sv-SE" sz="1800" spc="-1" strike="noStrike">
+                <a:solidFill>
+                  <a:srgbClr val="000000"/>
+                </a:solidFill>
+                <a:latin typeface="Arial"/>
+                <a:ea typeface="DejaVu Sans"/>
+              </a:rPr>
+              <a:t>Topic A</a:t>
+            </a:r>
+            <a:endParaRPr b="0" lang="sv-SE" sz="1800" spc="-1" strike="noStrike">
+              <a:latin typeface="Arial"/>
+            </a:endParaRPr>
+          </a:p>
+        </p:txBody>
+      </p:sp>
+      <p:sp>
+        <p:nvSpPr>
+          <p:cNvPr id="137" name="CustomShape 6"/>
+          <p:cNvSpPr/>
+          <p:nvPr/>
+        </p:nvSpPr>
+        <p:spPr>
+          <a:xfrm>
+            <a:off x="5195880" y="191880"/>
+            <a:ext cx="1461600" cy="1425600"/>
+          </a:xfrm>
+          <a:prstGeom prst="rect">
+            <a:avLst/>
+          </a:prstGeom>
+          <a:blipFill rotWithShape="0">
+            <a:blip r:embed="rId2"/>
+            <a:stretch>
+              <a:fillRect/>
+            </a:stretch>
+          </a:blipFill>
+          <a:ln>
+            <a:noFill/>
+          </a:ln>
+        </p:spPr>
+        <p:style>
+          <a:lnRef idx="0"/>
+          <a:fillRef idx="0"/>
+          <a:effectRef idx="0"/>
+          <a:fontRef idx="minor"/>
+        </p:style>
+        <p:txBody>
+          <a:bodyPr lIns="0" rIns="0" tIns="45000" bIns="45000" anchor="ctr" anchorCtr="1">
+            <a:noAutofit/>
+          </a:bodyPr>
+          <a:p>
+            <a:pPr algn="ctr">
+              <a:lnSpc>
+                <a:spcPct val="100000"/>
+              </a:lnSpc>
+            </a:pPr>
+            <a:r>
+              <a:rPr b="0" lang="sv-SE" sz="1800" spc="-1" strike="noStrike">
+                <a:solidFill>
+                  <a:srgbClr val="000000"/>
+                </a:solidFill>
+                <a:latin typeface="Arial"/>
+                <a:ea typeface="DejaVu Sans"/>
+              </a:rPr>
+              <a:t>Job 1</a:t>
+            </a:r>
+            <a:endParaRPr b="0" lang="sv-SE" sz="1800" spc="-1" strike="noStrike">
+              <a:latin typeface="Arial"/>
+            </a:endParaRPr>
+          </a:p>
+        </p:txBody>
+      </p:sp>
+      <p:sp>
+        <p:nvSpPr>
+          <p:cNvPr id="138" name="CustomShape 7"/>
+          <p:cNvSpPr/>
+          <p:nvPr/>
+        </p:nvSpPr>
+        <p:spPr>
+          <a:xfrm>
+            <a:off x="5220000" y="1703880"/>
+            <a:ext cx="1461600" cy="1425600"/>
+          </a:xfrm>
+          <a:prstGeom prst="rect">
+            <a:avLst/>
+          </a:prstGeom>
+          <a:blipFill rotWithShape="0">
+            <a:blip r:embed="rId3"/>
+            <a:stretch>
+              <a:fillRect/>
+            </a:stretch>
+          </a:blipFill>
+          <a:ln>
+            <a:noFill/>
+          </a:ln>
+        </p:spPr>
+        <p:style>
+          <a:lnRef idx="0"/>
+          <a:fillRef idx="0"/>
+          <a:effectRef idx="0"/>
+          <a:fontRef idx="minor"/>
+        </p:style>
+        <p:txBody>
+          <a:bodyPr lIns="0" rIns="0" tIns="45000" bIns="45000" anchor="ctr" anchorCtr="1">
+            <a:noAutofit/>
+          </a:bodyPr>
+          <a:p>
+            <a:pPr algn="ctr">
+              <a:lnSpc>
+                <a:spcPct val="100000"/>
+              </a:lnSpc>
+            </a:pPr>
+            <a:r>
+              <a:rPr b="0" lang="sv-SE" sz="1800" spc="-1" strike="noStrike">
+                <a:solidFill>
+                  <a:srgbClr val="000000"/>
+                </a:solidFill>
+                <a:latin typeface="Arial"/>
+                <a:ea typeface="DejaVu Sans"/>
+              </a:rPr>
+              <a:t>Job 2</a:t>
+            </a:r>
+            <a:endParaRPr b="0" lang="sv-SE" sz="1800" spc="-1" strike="noStrike">
+              <a:latin typeface="Arial"/>
+            </a:endParaRPr>
+          </a:p>
+        </p:txBody>
+      </p:sp>
+      <p:sp>
+        <p:nvSpPr>
+          <p:cNvPr id="139" name="CustomShape 8"/>
+          <p:cNvSpPr/>
+          <p:nvPr/>
+        </p:nvSpPr>
+        <p:spPr>
+          <a:xfrm>
+            <a:off x="5231880" y="3096000"/>
+            <a:ext cx="1461600" cy="1425600"/>
+          </a:xfrm>
+          <a:prstGeom prst="rect">
+            <a:avLst/>
+          </a:prstGeom>
+          <a:blipFill rotWithShape="0">
+            <a:blip r:embed="rId4"/>
+            <a:stretch>
+              <a:fillRect/>
+            </a:stretch>
+          </a:blipFill>
+          <a:ln>
+            <a:noFill/>
+          </a:ln>
+        </p:spPr>
+        <p:style>
+          <a:lnRef idx="0"/>
+          <a:fillRef idx="0"/>
+          <a:effectRef idx="0"/>
+          <a:fontRef idx="minor"/>
+        </p:style>
+        <p:txBody>
+          <a:bodyPr lIns="0" rIns="0" tIns="45000" bIns="45000" anchor="ctr" anchorCtr="1">
+            <a:noAutofit/>
+          </a:bodyPr>
+          <a:p>
+            <a:pPr algn="ctr">
+              <a:lnSpc>
+                <a:spcPct val="100000"/>
+              </a:lnSpc>
+            </a:pPr>
+            <a:r>
+              <a:rPr b="0" lang="sv-SE" sz="1800" spc="-1" strike="noStrike">
+                <a:solidFill>
+                  <a:srgbClr val="000000"/>
+                </a:solidFill>
+                <a:latin typeface="Arial"/>
+                <a:ea typeface="DejaVu Sans"/>
+              </a:rPr>
+              <a:t>Job 3</a:t>
+            </a:r>
+            <a:endParaRPr b="0" lang="sv-SE" sz="1800" spc="-1" strike="noStrike">
+              <a:latin typeface="Arial"/>
+            </a:endParaRPr>
+          </a:p>
+        </p:txBody>
+      </p:sp>
+      <p:sp>
+        <p:nvSpPr>
+          <p:cNvPr id="140" name="CustomShape 9"/>
+          <p:cNvSpPr/>
+          <p:nvPr/>
+        </p:nvSpPr>
+        <p:spPr>
+          <a:xfrm>
+            <a:off x="2969280" y="2844000"/>
+            <a:ext cx="2032200" cy="1725480"/>
+          </a:xfrm>
+          <a:prstGeom prst="rect">
+            <a:avLst/>
+          </a:prstGeom>
+          <a:blipFill rotWithShape="0">
+            <a:blip r:embed="rId5"/>
+            <a:stretch>
+              <a:fillRect/>
+            </a:stretch>
+          </a:blipFill>
+          <a:ln>
+            <a:noFill/>
+          </a:ln>
+        </p:spPr>
+        <p:style>
+          <a:lnRef idx="0"/>
+          <a:fillRef idx="0"/>
+          <a:effectRef idx="0"/>
+          <a:fontRef idx="minor"/>
+        </p:style>
+        <p:txBody>
+          <a:bodyPr lIns="0" rIns="0" tIns="45000" bIns="45000" anchor="ctr" anchorCtr="1">
+            <a:noAutofit/>
+          </a:bodyPr>
+          <a:p>
+            <a:pPr algn="ctr">
+              <a:lnSpc>
+                <a:spcPct val="100000"/>
+              </a:lnSpc>
+            </a:pPr>
+            <a:r>
+              <a:rPr b="0" lang="sv-SE" sz="1800" spc="-1" strike="noStrike">
+                <a:solidFill>
+                  <a:srgbClr val="000000"/>
+                </a:solidFill>
+                <a:latin typeface="Arial"/>
+                <a:ea typeface="DejaVu Sans"/>
+              </a:rPr>
+              <a:t>ROP File Data</a:t>
+            </a:r>
+            <a:endParaRPr b="0" lang="sv-SE" sz="1800" spc="-1" strike="noStrike">
+              <a:latin typeface="Arial"/>
+            </a:endParaRPr>
+          </a:p>
+        </p:txBody>
+      </p:sp>
+      <p:sp>
+        <p:nvSpPr>
+          <p:cNvPr id="141" name="CustomShape 10"/>
+          <p:cNvSpPr/>
+          <p:nvPr/>
+        </p:nvSpPr>
+        <p:spPr>
+          <a:xfrm>
+            <a:off x="10063080" y="4303800"/>
+            <a:ext cx="1994400" cy="985680"/>
+          </a:xfrm>
+          <a:prstGeom prst="roundRect">
+            <a:avLst>
+              <a:gd name="adj" fmla="val 16667"/>
+            </a:avLst>
+          </a:prstGeom>
+          <a:solidFill>
+            <a:srgbClr val="7030a0"/>
+          </a:solidFill>
+          <a:ln>
+            <a:solidFill>
+              <a:srgbClr val="7030a0"/>
+            </a:solidFill>
+          </a:ln>
+        </p:spPr>
+        <p:style>
+          <a:lnRef idx="2">
+            <a:schemeClr val="accent1">
+              <a:shade val="50000"/>
+            </a:schemeClr>
+          </a:lnRef>
+          <a:fillRef idx="1">
+            <a:schemeClr val="accent1"/>
+          </a:fillRef>
+          <a:effectRef idx="0">
+            <a:schemeClr val="accent1"/>
+          </a:effectRef>
+          <a:fontRef idx="minor"/>
+        </p:style>
+        <p:txBody>
+          <a:bodyPr lIns="90000" rIns="90000" tIns="45000" bIns="45000" anchor="ctr">
+            <a:noAutofit/>
+          </a:bodyPr>
+          <a:p>
+            <a:pPr algn="ctr">
+              <a:lnSpc>
+                <a:spcPct val="100000"/>
+              </a:lnSpc>
+            </a:pPr>
+            <a:r>
+              <a:rPr b="0" lang="sv-SE" sz="1800" spc="-1" strike="noStrike">
+                <a:solidFill>
+                  <a:srgbClr val="ffffff"/>
+                </a:solidFill>
+                <a:latin typeface="Calibri"/>
+                <a:ea typeface="DejaVu Sans"/>
+              </a:rPr>
+              <a:t>PM Data Consumer</a:t>
+            </a:r>
+            <a:endParaRPr b="0" lang="sv-SE" sz="1800" spc="-1" strike="noStrike">
+              <a:latin typeface="Arial"/>
+            </a:endParaRPr>
+          </a:p>
+        </p:txBody>
+      </p:sp>
+      <p:sp>
+        <p:nvSpPr>
+          <p:cNvPr id="142" name="CustomShape 11"/>
+          <p:cNvSpPr/>
+          <p:nvPr/>
+        </p:nvSpPr>
+        <p:spPr>
+          <a:xfrm>
+            <a:off x="2089800" y="6048000"/>
+            <a:ext cx="5325480" cy="458640"/>
+          </a:xfrm>
+          <a:prstGeom prst="roundRect">
+            <a:avLst>
+              <a:gd name="adj" fmla="val 16667"/>
+            </a:avLst>
+          </a:prstGeom>
+          <a:solidFill>
+            <a:srgbClr val="2a6099"/>
+          </a:solidFill>
+          <a:ln/>
+        </p:spPr>
+        <p:style>
+          <a:lnRef idx="2">
+            <a:schemeClr val="accent1">
+              <a:shade val="50000"/>
+            </a:schemeClr>
+          </a:lnRef>
+          <a:fillRef idx="1">
+            <a:schemeClr val="accent1"/>
+          </a:fillRef>
+          <a:effectRef idx="0">
+            <a:schemeClr val="accent1"/>
+          </a:effectRef>
+          <a:fontRef idx="minor"/>
+        </p:style>
+        <p:txBody>
+          <a:bodyPr lIns="90000" rIns="90000" tIns="45000" bIns="45000" anchor="ctr">
+            <a:noAutofit/>
+          </a:bodyPr>
+          <a:p>
+            <a:pPr algn="ctr">
+              <a:lnSpc>
+                <a:spcPct val="100000"/>
+              </a:lnSpc>
+            </a:pPr>
+            <a:r>
+              <a:rPr b="0" lang="sv-SE" sz="1800" spc="-1" strike="noStrike">
+                <a:solidFill>
+                  <a:srgbClr val="000000"/>
+                </a:solidFill>
+                <a:latin typeface="Arial"/>
+                <a:ea typeface="DejaVu Sans"/>
+              </a:rPr>
+              <a:t>PM Files Data Store</a:t>
+            </a:r>
+            <a:endParaRPr b="0" lang="sv-SE" sz="1800" spc="-1" strike="noStrike">
+              <a:latin typeface="Arial"/>
+            </a:endParaRPr>
+          </a:p>
+        </p:txBody>
+      </p:sp>
+      <p:sp>
+        <p:nvSpPr>
+          <p:cNvPr id="143" name="CustomShape 12"/>
+          <p:cNvSpPr/>
+          <p:nvPr/>
+        </p:nvSpPr>
+        <p:spPr>
+          <a:xfrm>
+            <a:off x="414360" y="1764000"/>
+            <a:ext cx="1455120" cy="1182960"/>
+          </a:xfrm>
+          <a:prstGeom prst="rect">
+            <a:avLst/>
+          </a:prstGeom>
+          <a:blipFill rotWithShape="0">
+            <a:blip r:embed="rId6"/>
+            <a:stretch>
+              <a:fillRect/>
+            </a:stretch>
+          </a:blipFill>
+          <a:ln>
+            <a:noFill/>
+          </a:ln>
+        </p:spPr>
+        <p:style>
+          <a:lnRef idx="0"/>
+          <a:fillRef idx="0"/>
+          <a:effectRef idx="0"/>
+          <a:fontRef idx="minor"/>
+        </p:style>
+        <p:txBody>
+          <a:bodyPr lIns="0" rIns="0" tIns="45000" bIns="45000" anchor="ctr" anchorCtr="1">
+            <a:noAutofit/>
+          </a:bodyPr>
+          <a:p>
+            <a:pPr algn="ctr">
+              <a:lnSpc>
+                <a:spcPct val="100000"/>
+              </a:lnSpc>
+            </a:pPr>
+            <a:r>
+              <a:rPr b="0" lang="sv-SE" sz="1800" spc="-1" strike="noStrike">
+                <a:solidFill>
+                  <a:srgbClr val="000000"/>
+                </a:solidFill>
+                <a:latin typeface="Arial"/>
+                <a:ea typeface="DejaVu Sans"/>
+              </a:rPr>
+              <a:t>File Ready</a:t>
+            </a:r>
+            <a:endParaRPr b="0" lang="sv-SE" sz="1800" spc="-1" strike="noStrike">
+              <a:latin typeface="Arial"/>
+            </a:endParaRPr>
+          </a:p>
+        </p:txBody>
+      </p:sp>
+      <p:pic>
+        <p:nvPicPr>
+          <p:cNvPr id="144" name="" descr=""/>
+          <p:cNvPicPr/>
+          <p:nvPr/>
+        </p:nvPicPr>
+        <p:blipFill>
+          <a:blip r:embed="rId7"/>
+          <a:stretch/>
+        </p:blipFill>
+        <p:spPr>
+          <a:xfrm>
+            <a:off x="3454920" y="4680000"/>
+            <a:ext cx="756360" cy="1367280"/>
+          </a:xfrm>
+          <a:prstGeom prst="rect">
+            <a:avLst/>
+          </a:prstGeom>
+          <a:ln>
+            <a:noFill/>
+          </a:ln>
+        </p:spPr>
+      </p:pic>
+      <p:sp>
+        <p:nvSpPr>
+          <p:cNvPr id="145" name="TextShape 13"/>
+          <p:cNvSpPr txBox="1"/>
+          <p:nvPr/>
+        </p:nvSpPr>
+        <p:spPr>
+          <a:xfrm>
+            <a:off x="144000" y="648000"/>
+            <a:ext cx="2664000" cy="858240"/>
+          </a:xfrm>
+          <a:prstGeom prst="rect">
+            <a:avLst/>
+          </a:prstGeom>
+          <a:noFill/>
+          <a:ln>
+            <a:noFill/>
+          </a:ln>
+        </p:spPr>
+        <p:txBody>
+          <a:bodyPr lIns="90000" rIns="90000" tIns="45000" bIns="45000">
+            <a:noAutofit/>
+          </a:bodyPr>
+          <a:p>
+            <a:r>
+              <a:rPr b="0" lang="sv-SE" sz="1800" spc="-1" strike="noStrike">
+                <a:latin typeface="Arial"/>
+              </a:rPr>
+              <a:t>PM Data Aggregation</a:t>
+            </a:r>
+            <a:endParaRPr b="0" lang="sv-SE" sz="1800" spc="-1" strike="noStrike">
+              <a:latin typeface="Arial"/>
+            </a:endParaRPr>
+          </a:p>
+          <a:p>
+            <a:r>
+              <a:rPr b="0" lang="sv-SE" sz="1800" spc="-1" strike="noStrike">
+                <a:latin typeface="Arial"/>
+              </a:rPr>
+              <a:t>Shared topic</a:t>
+            </a:r>
+            <a:endParaRPr b="0" lang="sv-SE" sz="1800" spc="-1" strike="noStrike">
+              <a:latin typeface="Arial"/>
+            </a:endParaRPr>
+          </a:p>
+        </p:txBody>
+      </p:sp>
+      <p:sp>
+        <p:nvSpPr>
+          <p:cNvPr id="146" name="CustomShape 14"/>
+          <p:cNvSpPr/>
+          <p:nvPr/>
+        </p:nvSpPr>
+        <p:spPr>
+          <a:xfrm>
+            <a:off x="6693480" y="1658520"/>
+            <a:ext cx="1314720" cy="1725480"/>
+          </a:xfrm>
+          <a:prstGeom prst="rect">
+            <a:avLst/>
+          </a:prstGeom>
+          <a:blipFill rotWithShape="0">
+            <a:blip r:embed="rId8"/>
+            <a:stretch>
+              <a:fillRect/>
+            </a:stretch>
+          </a:blipFill>
+          <a:ln>
+            <a:noFill/>
+          </a:ln>
+        </p:spPr>
+        <p:style>
+          <a:lnRef idx="0"/>
+          <a:fillRef idx="0"/>
+          <a:effectRef idx="0"/>
+          <a:fontRef idx="minor"/>
+        </p:style>
+        <p:txBody>
+          <a:bodyPr lIns="0" rIns="0" tIns="45000" bIns="45000" anchor="ctr" anchorCtr="1">
+            <a:noAutofit/>
+          </a:bodyPr>
+          <a:p>
+            <a:pPr algn="ctr">
+              <a:lnSpc>
+                <a:spcPct val="100000"/>
+              </a:lnSpc>
+            </a:pPr>
+            <a:r>
+              <a:rPr b="0" lang="sv-SE" sz="1800" spc="-1" strike="noStrike">
+                <a:solidFill>
+                  <a:srgbClr val="000000"/>
+                </a:solidFill>
+                <a:latin typeface="Arial"/>
+                <a:ea typeface="DejaVu Sans"/>
+              </a:rPr>
+              <a:t>Aggregated</a:t>
+            </a:r>
+            <a:endParaRPr b="0" lang="sv-SE" sz="1800" spc="-1" strike="noStrike">
+              <a:latin typeface="Arial"/>
+            </a:endParaRPr>
+          </a:p>
+          <a:p>
+            <a:pPr algn="ctr">
+              <a:lnSpc>
+                <a:spcPct val="100000"/>
+              </a:lnSpc>
+            </a:pPr>
+            <a:r>
+              <a:rPr b="0" lang="sv-SE" sz="1800" spc="-1" strike="noStrike">
+                <a:solidFill>
+                  <a:srgbClr val="000000"/>
+                </a:solidFill>
+                <a:latin typeface="Arial"/>
+                <a:ea typeface="DejaVu Sans"/>
+              </a:rPr>
+              <a:t>Filter</a:t>
+            </a:r>
+            <a:endParaRPr b="0" lang="sv-SE" sz="1800" spc="-1" strike="noStrike">
+              <a:latin typeface="Arial"/>
+            </a:endParaRPr>
+          </a:p>
+        </p:txBody>
+      </p:sp>
     </p:spTree>
   </p:cSld>
   <mc:AlternateContent>
@@ -3915,6 +7338,232 @@
 </file>
 
 <file path=ppt/theme/theme1.xml><?xml version="1.0" encoding="utf-8"?>
+<a:theme xmlns:a="http://schemas.openxmlformats.org/drawingml/2006/main" name="Office Theme">
+  <a:themeElements>
+    <a:clrScheme name="Office">
+      <a:dk1>
+        <a:sysClr val="windowText" lastClr="000000"/>
+      </a:dk1>
+      <a:lt1>
+        <a:sysClr val="window" lastClr="FFFFFF"/>
+      </a:lt1>
+      <a:dk2>
+        <a:srgbClr val="44546a"/>
+      </a:dk2>
+      <a:lt2>
+        <a:srgbClr val="e7e6e6"/>
+      </a:lt2>
+      <a:accent1>
+        <a:srgbClr val="4472c4"/>
+      </a:accent1>
+      <a:accent2>
+        <a:srgbClr val="ed7d31"/>
+      </a:accent2>
+      <a:accent3>
+        <a:srgbClr val="a5a5a5"/>
+      </a:accent3>
+      <a:accent4>
+        <a:srgbClr val="ffc000"/>
+      </a:accent4>
+      <a:accent5>
+        <a:srgbClr val="5b9bd5"/>
+      </a:accent5>
+      <a:accent6>
+        <a:srgbClr val="70ad47"/>
+      </a:accent6>
+      <a:hlink>
+        <a:srgbClr val="0563c1"/>
+      </a:hlink>
+      <a:folHlink>
+        <a:srgbClr val="954f72"/>
+      </a:folHlink>
+    </a:clrScheme>
+    <a:fontScheme name="Office">
+      <a:majorFont>
+        <a:latin typeface="Arial"/>
+        <a:ea typeface="DejaVu Sans"/>
+        <a:cs typeface="DejaVu Sans"/>
+      </a:majorFont>
+      <a:minorFont>
+        <a:latin typeface="Arial"/>
+        <a:ea typeface="DejaVu Sans"/>
+        <a:cs typeface="DejaVu Sans"/>
+      </a:minorFont>
+    </a:fontScheme>
+    <a:fmtScheme name="Office">
+      <a:fillStyleLst>
+        <a:solidFill>
+          <a:schemeClr val="phClr"/>
+        </a:solidFill>
+        <a:gradFill rotWithShape="1">
+          <a:gsLst>
+            <a:gs pos="0">
+              <a:schemeClr val="phClr">
+                <a:tint val="50000"/>
+                <a:satMod val="300000"/>
+              </a:schemeClr>
+            </a:gs>
+            <a:gs pos="35000">
+              <a:schemeClr val="phClr">
+                <a:tint val="37000"/>
+                <a:satMod val="300000"/>
+              </a:schemeClr>
+            </a:gs>
+            <a:gs pos="100000">
+              <a:schemeClr val="phClr">
+                <a:tint val="15000"/>
+                <a:satMod val="350000"/>
+              </a:schemeClr>
+            </a:gs>
+          </a:gsLst>
+          <a:lin ang="16200000" scaled="1"/>
+        </a:gradFill>
+        <a:gradFill rotWithShape="1">
+          <a:gsLst>
+            <a:gs pos="0">
+              <a:schemeClr val="phClr">
+                <a:shade val="51000"/>
+                <a:satMod val="130000"/>
+              </a:schemeClr>
+            </a:gs>
+            <a:gs pos="80000">
+              <a:schemeClr val="phClr">
+                <a:shade val="93000"/>
+                <a:satMod val="130000"/>
+              </a:schemeClr>
+            </a:gs>
+            <a:gs pos="100000">
+              <a:schemeClr val="phClr">
+                <a:shade val="94000"/>
+                <a:satMod val="135000"/>
+              </a:schemeClr>
+            </a:gs>
+          </a:gsLst>
+          <a:lin ang="16200000" scaled="0"/>
+        </a:gradFill>
+      </a:fillStyleLst>
+      <a:lnStyleLst>
+        <a:ln w="9525" cap="flat" cmpd="sng" algn="ctr">
+          <a:solidFill>
+            <a:schemeClr val="phClr">
+              <a:shade val="95000"/>
+              <a:satMod val="105000"/>
+            </a:schemeClr>
+          </a:solidFill>
+          <a:prstDash val="solid"/>
+          <a:miter/>
+        </a:ln>
+        <a:ln w="25400" cap="flat" cmpd="sng" algn="ctr">
+          <a:solidFill>
+            <a:schemeClr val="phClr"/>
+          </a:solidFill>
+          <a:prstDash val="solid"/>
+          <a:miter/>
+        </a:ln>
+        <a:ln w="38100" cap="flat" cmpd="sng" algn="ctr">
+          <a:solidFill>
+            <a:schemeClr val="phClr"/>
+          </a:solidFill>
+          <a:prstDash val="solid"/>
+          <a:miter/>
+        </a:ln>
+      </a:lnStyleLst>
+      <a:effectStyleLst>
+        <a:effectStyle>
+          <a:effectLst>
+            <a:outerShdw blurRad="40000" dist="20000" dir="5400000" rotWithShape="0">
+              <a:srgbClr val="000000">
+                <a:alpha val="38000"/>
+              </a:srgbClr>
+            </a:outerShdw>
+          </a:effectLst>
+        </a:effectStyle>
+        <a:effectStyle>
+          <a:effectLst>
+            <a:outerShdw blurRad="40000" dist="23000" dir="5400000" rotWithShape="0">
+              <a:srgbClr val="000000">
+                <a:alpha val="35000"/>
+              </a:srgbClr>
+            </a:outerShdw>
+          </a:effectLst>
+        </a:effectStyle>
+        <a:effectStyle>
+          <a:effectLst>
+            <a:outerShdw blurRad="40000" dist="23000" dir="5400000" rotWithShape="0">
+              <a:srgbClr val="000000">
+                <a:alpha val="35000"/>
+              </a:srgbClr>
+            </a:outerShdw>
+          </a:effectLst>
+          <a:scene3d>
+            <a:camera prst="orthographicFront">
+              <a:rot lat="0" lon="0" rev="0"/>
+            </a:camera>
+            <a:lightRig rig="threePt" dir="t">
+              <a:rot lat="0" lon="0" rev="1200000"/>
+            </a:lightRig>
+          </a:scene3d>
+          <a:sp3d>
+            <a:bevelT w="63500" h="25400"/>
+          </a:sp3d>
+        </a:effectStyle>
+      </a:effectStyleLst>
+      <a:bgFillStyleLst>
+        <a:solidFill>
+          <a:schemeClr val="phClr"/>
+        </a:solidFill>
+        <a:gradFill rotWithShape="1">
+          <a:gsLst>
+            <a:gs pos="0">
+              <a:schemeClr val="phClr">
+                <a:tint val="40000"/>
+                <a:satMod val="350000"/>
+              </a:schemeClr>
+            </a:gs>
+            <a:gs pos="40000">
+              <a:schemeClr val="phClr">
+                <a:tint val="45000"/>
+                <a:shade val="99000"/>
+                <a:satMod val="350000"/>
+              </a:schemeClr>
+            </a:gs>
+            <a:gs pos="100000">
+              <a:schemeClr val="phClr">
+                <a:shade val="20000"/>
+                <a:satMod val="255000"/>
+              </a:schemeClr>
+            </a:gs>
+          </a:gsLst>
+          <a:path path="circle">
+            <a:fillToRect l="50000" t="-80000" r="50000" b="180000"/>
+          </a:path>
+        </a:gradFill>
+        <a:gradFill rotWithShape="1">
+          <a:gsLst>
+            <a:gs pos="0">
+              <a:schemeClr val="phClr">
+                <a:tint val="80000"/>
+                <a:satMod val="300000"/>
+              </a:schemeClr>
+            </a:gs>
+            <a:gs pos="100000">
+              <a:schemeClr val="phClr">
+                <a:shade val="30000"/>
+                <a:satMod val="200000"/>
+              </a:schemeClr>
+            </a:gs>
+          </a:gsLst>
+          <a:path path="circle">
+            <a:fillToRect l="50000" t="50000" r="50000" b="50000"/>
+          </a:path>
+        </a:gradFill>
+      </a:bgFillStyleLst>
+    </a:fmtScheme>
+  </a:themeElements>
+</a:theme>
+</file>
+
+<file path=ppt/theme/theme2.xml><?xml version="1.0" encoding="utf-8"?>
 <a:theme xmlns:a="http://schemas.openxmlformats.org/drawingml/2006/main" name="Office Theme">
   <a:themeElements>
     <a:clrScheme name="Office">

</xml_diff>